<commit_message>
Updates to powerpoint slides
</commit_message>
<xml_diff>
--- a/Group Presentation.pptx
+++ b/Group Presentation.pptx
@@ -5,15 +5,21 @@
     <p:sldMasterId id="2147483648" r:id="rId1"/>
   </p:sldMasterIdLst>
   <p:notesMasterIdLst>
-    <p:notesMasterId r:id="rId8"/>
+    <p:notesMasterId r:id="rId14"/>
   </p:notesMasterIdLst>
   <p:sldIdLst>
     <p:sldId id="256" r:id="rId2"/>
     <p:sldId id="257" r:id="rId3"/>
     <p:sldId id="259" r:id="rId4"/>
     <p:sldId id="262" r:id="rId5"/>
-    <p:sldId id="258" r:id="rId6"/>
-    <p:sldId id="261" r:id="rId7"/>
+    <p:sldId id="267" r:id="rId6"/>
+    <p:sldId id="263" r:id="rId7"/>
+    <p:sldId id="264" r:id="rId8"/>
+    <p:sldId id="258" r:id="rId9"/>
+    <p:sldId id="265" r:id="rId10"/>
+    <p:sldId id="266" r:id="rId11"/>
+    <p:sldId id="261" r:id="rId12"/>
+    <p:sldId id="268" r:id="rId13"/>
   </p:sldIdLst>
   <p:sldSz cx="12192000" cy="6858000"/>
   <p:notesSz cx="6858000" cy="9144000"/>
@@ -112,6 +118,11 @@
       </a:defRPr>
     </a:lvl9pPr>
   </p:defaultTextStyle>
+  <p:extLst>
+    <p:ext uri="{EFAFB233-063F-42B5-8137-9DF3F51BA10A}">
+      <p15:sldGuideLst xmlns:p15="http://schemas.microsoft.com/office/powerpoint/2012/main"/>
+    </p:ext>
+  </p:extLst>
 </p:presentation>
 </file>
 
@@ -197,7 +208,7 @@
           <a:p>
             <a:fld id="{90821DF8-0FE3-4A22-A328-1A05EEE24AD8}" type="datetimeFigureOut">
               <a:rPr lang="en-US" smtClean="0"/>
-              <a:t>4/19/2023</a:t>
+              <a:t>4/23/2023</a:t>
             </a:fld>
             <a:endParaRPr lang="en-US"/>
           </a:p>
@@ -832,7 +843,7 @@
           <a:p>
             <a:fld id="{CA76F190-DC31-4DF0-961C-5D676364CFAF}" type="slidenum">
               <a:rPr lang="en-US" smtClean="0"/>
-              <a:t>6</a:t>
+              <a:t>11</a:t>
             </a:fld>
             <a:endParaRPr lang="en-US"/>
           </a:p>
@@ -842,6 +853,90 @@
     <p:extLst>
       <p:ext uri="{BB962C8B-B14F-4D97-AF65-F5344CB8AC3E}">
         <p14:creationId xmlns:p14="http://schemas.microsoft.com/office/powerpoint/2010/main" val="688593522"/>
+      </p:ext>
+    </p:extLst>
+  </p:cSld>
+  <p:clrMapOvr>
+    <a:masterClrMapping/>
+  </p:clrMapOvr>
+</p:notes>
+</file>
+
+<file path=ppt/notesSlides/notesSlide5.xml><?xml version="1.0" encoding="utf-8"?>
+<p:notes xmlns:a="http://schemas.openxmlformats.org/drawingml/2006/main" xmlns:r="http://schemas.openxmlformats.org/officeDocument/2006/relationships" xmlns:p="http://schemas.openxmlformats.org/presentationml/2006/main">
+  <p:cSld>
+    <p:spTree>
+      <p:nvGrpSpPr>
+        <p:cNvPr id="1" name=""/>
+        <p:cNvGrpSpPr/>
+        <p:nvPr/>
+      </p:nvGrpSpPr>
+      <p:grpSpPr>
+        <a:xfrm>
+          <a:off x="0" y="0"/>
+          <a:ext cx="0" cy="0"/>
+          <a:chOff x="0" y="0"/>
+          <a:chExt cx="0" cy="0"/>
+        </a:xfrm>
+      </p:grpSpPr>
+      <p:sp>
+        <p:nvSpPr>
+          <p:cNvPr id="2" name="Slide Image Placeholder 1"/>
+          <p:cNvSpPr>
+            <a:spLocks noGrp="1" noRot="1" noChangeAspect="1"/>
+          </p:cNvSpPr>
+          <p:nvPr>
+            <p:ph type="sldImg"/>
+          </p:nvPr>
+        </p:nvSpPr>
+        <p:spPr/>
+      </p:sp>
+      <p:sp>
+        <p:nvSpPr>
+          <p:cNvPr id="3" name="Notes Placeholder 2"/>
+          <p:cNvSpPr>
+            <a:spLocks noGrp="1"/>
+          </p:cNvSpPr>
+          <p:nvPr>
+            <p:ph type="body" idx="1"/>
+          </p:nvPr>
+        </p:nvSpPr>
+        <p:spPr/>
+        <p:txBody>
+          <a:bodyPr/>
+          <a:lstStyle/>
+          <a:p>
+            <a:endParaRPr lang="en-US" dirty="0"/>
+          </a:p>
+        </p:txBody>
+      </p:sp>
+      <p:sp>
+        <p:nvSpPr>
+          <p:cNvPr id="4" name="Slide Number Placeholder 3"/>
+          <p:cNvSpPr>
+            <a:spLocks noGrp="1"/>
+          </p:cNvSpPr>
+          <p:nvPr>
+            <p:ph type="sldNum" sz="quarter" idx="5"/>
+          </p:nvPr>
+        </p:nvSpPr>
+        <p:spPr/>
+        <p:txBody>
+          <a:bodyPr/>
+          <a:lstStyle/>
+          <a:p>
+            <a:fld id="{CA76F190-DC31-4DF0-961C-5D676364CFAF}" type="slidenum">
+              <a:rPr lang="en-US" smtClean="0"/>
+              <a:t>12</a:t>
+            </a:fld>
+            <a:endParaRPr lang="en-US"/>
+          </a:p>
+        </p:txBody>
+      </p:sp>
+    </p:spTree>
+    <p:extLst>
+      <p:ext uri="{BB962C8B-B14F-4D97-AF65-F5344CB8AC3E}">
+        <p14:creationId xmlns:p14="http://schemas.microsoft.com/office/powerpoint/2010/main" val="2044372699"/>
       </p:ext>
     </p:extLst>
   </p:cSld>
@@ -998,7 +1093,7 @@
           <a:p>
             <a:fld id="{D9E4FD32-2B89-411F-B9A9-D05298A1215C}" type="datetimeFigureOut">
               <a:rPr lang="en-US" smtClean="0"/>
-              <a:t>4/19/2023</a:t>
+              <a:t>4/23/2023</a:t>
             </a:fld>
             <a:endParaRPr lang="en-US"/>
           </a:p>
@@ -1196,7 +1291,7 @@
           <a:p>
             <a:fld id="{D9E4FD32-2B89-411F-B9A9-D05298A1215C}" type="datetimeFigureOut">
               <a:rPr lang="en-US" smtClean="0"/>
-              <a:t>4/19/2023</a:t>
+              <a:t>4/23/2023</a:t>
             </a:fld>
             <a:endParaRPr lang="en-US"/>
           </a:p>
@@ -1404,7 +1499,7 @@
           <a:p>
             <a:fld id="{D9E4FD32-2B89-411F-B9A9-D05298A1215C}" type="datetimeFigureOut">
               <a:rPr lang="en-US" smtClean="0"/>
-              <a:t>4/19/2023</a:t>
+              <a:t>4/23/2023</a:t>
             </a:fld>
             <a:endParaRPr lang="en-US"/>
           </a:p>
@@ -1602,7 +1697,7 @@
           <a:p>
             <a:fld id="{D9E4FD32-2B89-411F-B9A9-D05298A1215C}" type="datetimeFigureOut">
               <a:rPr lang="en-US" smtClean="0"/>
-              <a:t>4/19/2023</a:t>
+              <a:t>4/23/2023</a:t>
             </a:fld>
             <a:endParaRPr lang="en-US"/>
           </a:p>
@@ -1877,7 +1972,7 @@
           <a:p>
             <a:fld id="{D9E4FD32-2B89-411F-B9A9-D05298A1215C}" type="datetimeFigureOut">
               <a:rPr lang="en-US" smtClean="0"/>
-              <a:t>4/19/2023</a:t>
+              <a:t>4/23/2023</a:t>
             </a:fld>
             <a:endParaRPr lang="en-US"/>
           </a:p>
@@ -2142,7 +2237,7 @@
           <a:p>
             <a:fld id="{D9E4FD32-2B89-411F-B9A9-D05298A1215C}" type="datetimeFigureOut">
               <a:rPr lang="en-US" smtClean="0"/>
-              <a:t>4/19/2023</a:t>
+              <a:t>4/23/2023</a:t>
             </a:fld>
             <a:endParaRPr lang="en-US"/>
           </a:p>
@@ -2554,7 +2649,7 @@
           <a:p>
             <a:fld id="{D9E4FD32-2B89-411F-B9A9-D05298A1215C}" type="datetimeFigureOut">
               <a:rPr lang="en-US" smtClean="0"/>
-              <a:t>4/19/2023</a:t>
+              <a:t>4/23/2023</a:t>
             </a:fld>
             <a:endParaRPr lang="en-US"/>
           </a:p>
@@ -2695,7 +2790,7 @@
           <a:p>
             <a:fld id="{D9E4FD32-2B89-411F-B9A9-D05298A1215C}" type="datetimeFigureOut">
               <a:rPr lang="en-US" smtClean="0"/>
-              <a:t>4/19/2023</a:t>
+              <a:t>4/23/2023</a:t>
             </a:fld>
             <a:endParaRPr lang="en-US"/>
           </a:p>
@@ -2808,7 +2903,7 @@
           <a:p>
             <a:fld id="{D9E4FD32-2B89-411F-B9A9-D05298A1215C}" type="datetimeFigureOut">
               <a:rPr lang="en-US" smtClean="0"/>
-              <a:t>4/19/2023</a:t>
+              <a:t>4/23/2023</a:t>
             </a:fld>
             <a:endParaRPr lang="en-US"/>
           </a:p>
@@ -3119,7 +3214,7 @@
           <a:p>
             <a:fld id="{D9E4FD32-2B89-411F-B9A9-D05298A1215C}" type="datetimeFigureOut">
               <a:rPr lang="en-US" smtClean="0"/>
-              <a:t>4/19/2023</a:t>
+              <a:t>4/23/2023</a:t>
             </a:fld>
             <a:endParaRPr lang="en-US"/>
           </a:p>
@@ -3407,7 +3502,7 @@
           <a:p>
             <a:fld id="{D9E4FD32-2B89-411F-B9A9-D05298A1215C}" type="datetimeFigureOut">
               <a:rPr lang="en-US" smtClean="0"/>
-              <a:t>4/19/2023</a:t>
+              <a:t>4/23/2023</a:t>
             </a:fld>
             <a:endParaRPr lang="en-US"/>
           </a:p>
@@ -3648,7 +3743,7 @@
           <a:p>
             <a:fld id="{D9E4FD32-2B89-411F-B9A9-D05298A1215C}" type="datetimeFigureOut">
               <a:rPr lang="en-US" smtClean="0"/>
-              <a:t>4/19/2023</a:t>
+              <a:t>4/23/2023</a:t>
             </a:fld>
             <a:endParaRPr lang="en-US"/>
           </a:p>
@@ -4561,6 +4656,1453 @@
 </p:sld>
 </file>
 
+<file path=ppt/slides/slide10.xml><?xml version="1.0" encoding="utf-8"?>
+<p:sld xmlns:a="http://schemas.openxmlformats.org/drawingml/2006/main" xmlns:r="http://schemas.openxmlformats.org/officeDocument/2006/relationships" xmlns:p="http://schemas.openxmlformats.org/presentationml/2006/main">
+  <p:cSld>
+    <p:bg>
+      <p:bgPr>
+        <a:solidFill>
+          <a:schemeClr val="bg1"/>
+        </a:solidFill>
+        <a:effectLst/>
+      </p:bgPr>
+    </p:bg>
+    <p:spTree>
+      <p:nvGrpSpPr>
+        <p:cNvPr id="1" name=""/>
+        <p:cNvGrpSpPr/>
+        <p:nvPr/>
+      </p:nvGrpSpPr>
+      <p:grpSpPr>
+        <a:xfrm>
+          <a:off x="0" y="0"/>
+          <a:ext cx="0" cy="0"/>
+          <a:chOff x="0" y="0"/>
+          <a:chExt cx="0" cy="0"/>
+        </a:xfrm>
+      </p:grpSpPr>
+      <p:sp useBgFill="1">
+        <p:nvSpPr>
+          <p:cNvPr id="10" name="Rectangle 9">
+            <a:extLst>
+              <a:ext uri="{FF2B5EF4-FFF2-40B4-BE49-F238E27FC236}">
+                <a16:creationId xmlns:a16="http://schemas.microsoft.com/office/drawing/2014/main" id="{5DCB5928-DC7D-4612-9922-441966E15627}"/>
+              </a:ext>
+              <a:ext uri="{C183D7F6-B498-43B3-948B-1728B52AA6E4}">
+                <adec:decorative xmlns:adec="http://schemas.microsoft.com/office/drawing/2017/decorative" val="1"/>
+              </a:ext>
+            </a:extLst>
+          </p:cNvPr>
+          <p:cNvSpPr>
+            <a:spLocks noGrp="1" noRot="1" noChangeAspect="1" noMove="1" noResize="1" noEditPoints="1" noAdjustHandles="1" noChangeArrowheads="1" noChangeShapeType="1" noTextEdit="1"/>
+          </p:cNvSpPr>
+          <p:nvPr>
+            <p:extLst>
+              <p:ext uri="{386F3935-93C4-4BCD-93E2-E3B085C9AB24}">
+                <p16:designElem xmlns:p16="http://schemas.microsoft.com/office/powerpoint/2015/main" val="1"/>
+              </p:ext>
+            </p:extLst>
+          </p:nvPr>
+        </p:nvSpPr>
+        <p:spPr>
+          <a:xfrm>
+            <a:off x="0" y="0"/>
+            <a:ext cx="12192000" cy="6858000"/>
+          </a:xfrm>
+          <a:prstGeom prst="rect">
+            <a:avLst/>
+          </a:prstGeom>
+          <a:ln>
+            <a:noFill/>
+          </a:ln>
+        </p:spPr>
+        <p:style>
+          <a:lnRef idx="2">
+            <a:schemeClr val="accent1">
+              <a:shade val="50000"/>
+            </a:schemeClr>
+          </a:lnRef>
+          <a:fillRef idx="1">
+            <a:schemeClr val="accent1"/>
+          </a:fillRef>
+          <a:effectRef idx="0">
+            <a:schemeClr val="accent1"/>
+          </a:effectRef>
+          <a:fontRef idx="minor">
+            <a:schemeClr val="lt1"/>
+          </a:fontRef>
+        </p:style>
+        <p:txBody>
+          <a:bodyPr rtlCol="0" anchor="ctr"/>
+          <a:lstStyle/>
+          <a:p>
+            <a:pPr algn="ctr"/>
+            <a:endParaRPr lang="en-US"/>
+          </a:p>
+        </p:txBody>
+      </p:sp>
+      <p:sp useBgFill="1">
+        <p:nvSpPr>
+          <p:cNvPr id="12" name="Freeform: Shape 11">
+            <a:extLst>
+              <a:ext uri="{FF2B5EF4-FFF2-40B4-BE49-F238E27FC236}">
+                <a16:creationId xmlns:a16="http://schemas.microsoft.com/office/drawing/2014/main" id="{682C1161-1736-45EC-99B7-33F3CAE9D517}"/>
+              </a:ext>
+              <a:ext uri="{C183D7F6-B498-43B3-948B-1728B52AA6E4}">
+                <adec:decorative xmlns:adec="http://schemas.microsoft.com/office/drawing/2017/decorative" val="1"/>
+              </a:ext>
+            </a:extLst>
+          </p:cNvPr>
+          <p:cNvSpPr>
+            <a:spLocks noGrp="1" noRot="1" noChangeAspect="1" noMove="1" noResize="1" noEditPoints="1" noAdjustHandles="1" noChangeArrowheads="1" noChangeShapeType="1" noTextEdit="1"/>
+          </p:cNvSpPr>
+          <p:nvPr>
+            <p:extLst>
+              <p:ext uri="{386F3935-93C4-4BCD-93E2-E3B085C9AB24}">
+                <p16:designElem xmlns:p16="http://schemas.microsoft.com/office/powerpoint/2015/main" val="1"/>
+              </p:ext>
+            </p:extLst>
+          </p:nvPr>
+        </p:nvSpPr>
+        <p:spPr>
+          <a:xfrm>
+            <a:off x="0" y="0"/>
+            <a:ext cx="4959047" cy="6858000"/>
+          </a:xfrm>
+          <a:custGeom>
+            <a:avLst/>
+            <a:gdLst>
+              <a:gd name="connsiteX0" fmla="*/ 0 w 4959047"/>
+              <a:gd name="connsiteY0" fmla="*/ 0 h 6858000"/>
+              <a:gd name="connsiteX1" fmla="*/ 4110127 w 4959047"/>
+              <a:gd name="connsiteY1" fmla="*/ 0 h 6858000"/>
+              <a:gd name="connsiteX2" fmla="*/ 4179024 w 4959047"/>
+              <a:gd name="connsiteY2" fmla="*/ 123368 h 6858000"/>
+              <a:gd name="connsiteX3" fmla="*/ 4959047 w 4959047"/>
+              <a:gd name="connsiteY3" fmla="*/ 3429000 h 6858000"/>
+              <a:gd name="connsiteX4" fmla="*/ 4179024 w 4959047"/>
+              <a:gd name="connsiteY4" fmla="*/ 6734633 h 6858000"/>
+              <a:gd name="connsiteX5" fmla="*/ 4110127 w 4959047"/>
+              <a:gd name="connsiteY5" fmla="*/ 6858000 h 6858000"/>
+              <a:gd name="connsiteX6" fmla="*/ 0 w 4959047"/>
+              <a:gd name="connsiteY6" fmla="*/ 6858000 h 6858000"/>
+            </a:gdLst>
+            <a:ahLst/>
+            <a:cxnLst>
+              <a:cxn ang="0">
+                <a:pos x="connsiteX0" y="connsiteY0"/>
+              </a:cxn>
+              <a:cxn ang="0">
+                <a:pos x="connsiteX1" y="connsiteY1"/>
+              </a:cxn>
+              <a:cxn ang="0">
+                <a:pos x="connsiteX2" y="connsiteY2"/>
+              </a:cxn>
+              <a:cxn ang="0">
+                <a:pos x="connsiteX3" y="connsiteY3"/>
+              </a:cxn>
+              <a:cxn ang="0">
+                <a:pos x="connsiteX4" y="connsiteY4"/>
+              </a:cxn>
+              <a:cxn ang="0">
+                <a:pos x="connsiteX5" y="connsiteY5"/>
+              </a:cxn>
+              <a:cxn ang="0">
+                <a:pos x="connsiteX6" y="connsiteY6"/>
+              </a:cxn>
+            </a:cxnLst>
+            <a:rect l="l" t="t" r="r" b="b"/>
+            <a:pathLst>
+              <a:path w="4959047" h="6858000">
+                <a:moveTo>
+                  <a:pt x="0" y="0"/>
+                </a:moveTo>
+                <a:lnTo>
+                  <a:pt x="4110127" y="0"/>
+                </a:lnTo>
+                <a:lnTo>
+                  <a:pt x="4179024" y="123368"/>
+                </a:lnTo>
+                <a:cubicBezTo>
+                  <a:pt x="4668929" y="1045156"/>
+                  <a:pt x="4959047" y="2189404"/>
+                  <a:pt x="4959047" y="3429000"/>
+                </a:cubicBezTo>
+                <a:cubicBezTo>
+                  <a:pt x="4959047" y="4668597"/>
+                  <a:pt x="4668929" y="5812845"/>
+                  <a:pt x="4179024" y="6734633"/>
+                </a:cubicBezTo>
+                <a:lnTo>
+                  <a:pt x="4110127" y="6858000"/>
+                </a:lnTo>
+                <a:lnTo>
+                  <a:pt x="0" y="6858000"/>
+                </a:lnTo>
+                <a:close/>
+              </a:path>
+            </a:pathLst>
+          </a:custGeom>
+          <a:ln w="9525">
+            <a:solidFill>
+              <a:srgbClr val="E6E6E6"/>
+            </a:solidFill>
+          </a:ln>
+          <a:effectLst>
+            <a:outerShdw blurRad="76200" dist="38100" algn="l" rotWithShape="0">
+              <a:schemeClr val="bg1">
+                <a:lumMod val="85000"/>
+                <a:alpha val="50000"/>
+              </a:schemeClr>
+            </a:outerShdw>
+          </a:effectLst>
+        </p:spPr>
+        <p:style>
+          <a:lnRef idx="2">
+            <a:schemeClr val="accent1">
+              <a:shade val="50000"/>
+            </a:schemeClr>
+          </a:lnRef>
+          <a:fillRef idx="1">
+            <a:schemeClr val="accent1"/>
+          </a:fillRef>
+          <a:effectRef idx="0">
+            <a:schemeClr val="accent1"/>
+          </a:effectRef>
+          <a:fontRef idx="minor">
+            <a:schemeClr val="lt1"/>
+          </a:fontRef>
+        </p:style>
+        <p:txBody>
+          <a:bodyPr wrap="square" rtlCol="0" anchor="ctr">
+            <a:noAutofit/>
+          </a:bodyPr>
+          <a:lstStyle/>
+          <a:p>
+            <a:pPr marL="0" marR="0" lvl="0" indent="0" algn="ctr" defTabSz="914400" rtl="0" eaLnBrk="1" fontAlgn="auto" latinLnBrk="0" hangingPunct="1">
+              <a:lnSpc>
+                <a:spcPct val="100000"/>
+              </a:lnSpc>
+              <a:spcBef>
+                <a:spcPts val="0"/>
+              </a:spcBef>
+              <a:spcAft>
+                <a:spcPts val="0"/>
+              </a:spcAft>
+              <a:buClrTx/>
+              <a:buSzTx/>
+              <a:buFontTx/>
+              <a:buNone/>
+              <a:tabLst/>
+              <a:defRPr/>
+            </a:pPr>
+            <a:endParaRPr kumimoji="0" lang="en-US" sz="1800" b="0" i="0" u="none" strike="noStrike" kern="1200" cap="none" spc="0" normalizeH="0" baseline="0" noProof="0">
+              <a:ln>
+                <a:noFill/>
+              </a:ln>
+              <a:solidFill>
+                <a:prstClr val="white"/>
+              </a:solidFill>
+              <a:effectLst/>
+              <a:uLnTx/>
+              <a:uFillTx/>
+              <a:latin typeface="Calibri" panose="020F0502020204030204"/>
+              <a:ea typeface="+mn-ea"/>
+              <a:cs typeface="+mn-cs"/>
+            </a:endParaRPr>
+          </a:p>
+        </p:txBody>
+      </p:sp>
+      <p:sp useBgFill="1">
+        <p:nvSpPr>
+          <p:cNvPr id="14" name="Freeform: Shape 13">
+            <a:extLst>
+              <a:ext uri="{FF2B5EF4-FFF2-40B4-BE49-F238E27FC236}">
+                <a16:creationId xmlns:a16="http://schemas.microsoft.com/office/drawing/2014/main" id="{84D4DDB8-B68F-45B0-9F62-C4279996F672}"/>
+              </a:ext>
+              <a:ext uri="{C183D7F6-B498-43B3-948B-1728B52AA6E4}">
+                <adec:decorative xmlns:adec="http://schemas.microsoft.com/office/drawing/2017/decorative" val="1"/>
+              </a:ext>
+            </a:extLst>
+          </p:cNvPr>
+          <p:cNvSpPr>
+            <a:spLocks noGrp="1" noRot="1" noChangeAspect="1" noMove="1" noResize="1" noEditPoints="1" noAdjustHandles="1" noChangeArrowheads="1" noChangeShapeType="1" noTextEdit="1"/>
+          </p:cNvSpPr>
+          <p:nvPr>
+            <p:extLst>
+              <p:ext uri="{386F3935-93C4-4BCD-93E2-E3B085C9AB24}">
+                <p16:designElem xmlns:p16="http://schemas.microsoft.com/office/powerpoint/2015/main" val="1"/>
+              </p:ext>
+            </p:extLst>
+          </p:nvPr>
+        </p:nvSpPr>
+        <p:spPr>
+          <a:xfrm>
+            <a:off x="0" y="0"/>
+            <a:ext cx="4948887" cy="6858000"/>
+          </a:xfrm>
+          <a:custGeom>
+            <a:avLst/>
+            <a:gdLst>
+              <a:gd name="connsiteX0" fmla="*/ 0 w 4948887"/>
+              <a:gd name="connsiteY0" fmla="*/ 0 h 6858000"/>
+              <a:gd name="connsiteX1" fmla="*/ 4099967 w 4948887"/>
+              <a:gd name="connsiteY1" fmla="*/ 0 h 6858000"/>
+              <a:gd name="connsiteX2" fmla="*/ 4168864 w 4948887"/>
+              <a:gd name="connsiteY2" fmla="*/ 123368 h 6858000"/>
+              <a:gd name="connsiteX3" fmla="*/ 4948887 w 4948887"/>
+              <a:gd name="connsiteY3" fmla="*/ 3429000 h 6858000"/>
+              <a:gd name="connsiteX4" fmla="*/ 4168864 w 4948887"/>
+              <a:gd name="connsiteY4" fmla="*/ 6734633 h 6858000"/>
+              <a:gd name="connsiteX5" fmla="*/ 4099967 w 4948887"/>
+              <a:gd name="connsiteY5" fmla="*/ 6858000 h 6858000"/>
+              <a:gd name="connsiteX6" fmla="*/ 0 w 4948887"/>
+              <a:gd name="connsiteY6" fmla="*/ 6858000 h 6858000"/>
+            </a:gdLst>
+            <a:ahLst/>
+            <a:cxnLst>
+              <a:cxn ang="0">
+                <a:pos x="connsiteX0" y="connsiteY0"/>
+              </a:cxn>
+              <a:cxn ang="0">
+                <a:pos x="connsiteX1" y="connsiteY1"/>
+              </a:cxn>
+              <a:cxn ang="0">
+                <a:pos x="connsiteX2" y="connsiteY2"/>
+              </a:cxn>
+              <a:cxn ang="0">
+                <a:pos x="connsiteX3" y="connsiteY3"/>
+              </a:cxn>
+              <a:cxn ang="0">
+                <a:pos x="connsiteX4" y="connsiteY4"/>
+              </a:cxn>
+              <a:cxn ang="0">
+                <a:pos x="connsiteX5" y="connsiteY5"/>
+              </a:cxn>
+              <a:cxn ang="0">
+                <a:pos x="connsiteX6" y="connsiteY6"/>
+              </a:cxn>
+            </a:cxnLst>
+            <a:rect l="l" t="t" r="r" b="b"/>
+            <a:pathLst>
+              <a:path w="4948887" h="6858000">
+                <a:moveTo>
+                  <a:pt x="0" y="0"/>
+                </a:moveTo>
+                <a:lnTo>
+                  <a:pt x="4099967" y="0"/>
+                </a:lnTo>
+                <a:lnTo>
+                  <a:pt x="4168864" y="123368"/>
+                </a:lnTo>
+                <a:cubicBezTo>
+                  <a:pt x="4658769" y="1045156"/>
+                  <a:pt x="4948887" y="2189404"/>
+                  <a:pt x="4948887" y="3429000"/>
+                </a:cubicBezTo>
+                <a:cubicBezTo>
+                  <a:pt x="4948887" y="4668597"/>
+                  <a:pt x="4658769" y="5812845"/>
+                  <a:pt x="4168864" y="6734633"/>
+                </a:cubicBezTo>
+                <a:lnTo>
+                  <a:pt x="4099967" y="6858000"/>
+                </a:lnTo>
+                <a:lnTo>
+                  <a:pt x="0" y="6858000"/>
+                </a:lnTo>
+                <a:close/>
+              </a:path>
+            </a:pathLst>
+          </a:custGeom>
+          <a:ln w="9525">
+            <a:noFill/>
+          </a:ln>
+          <a:effectLst/>
+        </p:spPr>
+        <p:style>
+          <a:lnRef idx="2">
+            <a:schemeClr val="accent1">
+              <a:shade val="50000"/>
+            </a:schemeClr>
+          </a:lnRef>
+          <a:fillRef idx="1">
+            <a:schemeClr val="accent1"/>
+          </a:fillRef>
+          <a:effectRef idx="0">
+            <a:schemeClr val="accent1"/>
+          </a:effectRef>
+          <a:fontRef idx="minor">
+            <a:schemeClr val="lt1"/>
+          </a:fontRef>
+        </p:style>
+        <p:txBody>
+          <a:bodyPr wrap="square" rtlCol="0" anchor="ctr">
+            <a:noAutofit/>
+          </a:bodyPr>
+          <a:lstStyle/>
+          <a:p>
+            <a:pPr marL="0" marR="0" lvl="0" indent="0" algn="ctr" defTabSz="914400" rtl="0" eaLnBrk="1" fontAlgn="auto" latinLnBrk="0" hangingPunct="1">
+              <a:lnSpc>
+                <a:spcPct val="100000"/>
+              </a:lnSpc>
+              <a:spcBef>
+                <a:spcPts val="0"/>
+              </a:spcBef>
+              <a:spcAft>
+                <a:spcPts val="0"/>
+              </a:spcAft>
+              <a:buClrTx/>
+              <a:buSzTx/>
+              <a:buFontTx/>
+              <a:buNone/>
+              <a:tabLst/>
+              <a:defRPr/>
+            </a:pPr>
+            <a:endParaRPr kumimoji="0" lang="en-US" sz="1800" b="0" i="0" u="none" strike="noStrike" kern="1200" cap="none" spc="0" normalizeH="0" baseline="0" noProof="0">
+              <a:ln>
+                <a:noFill/>
+              </a:ln>
+              <a:solidFill>
+                <a:prstClr val="white"/>
+              </a:solidFill>
+              <a:effectLst/>
+              <a:uLnTx/>
+              <a:uFillTx/>
+              <a:latin typeface="Calibri" panose="020F0502020204030204"/>
+              <a:ea typeface="+mn-ea"/>
+              <a:cs typeface="+mn-cs"/>
+            </a:endParaRPr>
+          </a:p>
+        </p:txBody>
+      </p:sp>
+      <p:sp>
+        <p:nvSpPr>
+          <p:cNvPr id="2" name="Title 1">
+            <a:extLst>
+              <a:ext uri="{FF2B5EF4-FFF2-40B4-BE49-F238E27FC236}">
+                <a16:creationId xmlns:a16="http://schemas.microsoft.com/office/drawing/2014/main" id="{433F3966-12F0-DD61-965B-208AF4F973F0}"/>
+              </a:ext>
+            </a:extLst>
+          </p:cNvPr>
+          <p:cNvSpPr>
+            <a:spLocks noGrp="1"/>
+          </p:cNvSpPr>
+          <p:nvPr>
+            <p:ph type="title"/>
+          </p:nvPr>
+        </p:nvSpPr>
+        <p:spPr>
+          <a:xfrm>
+            <a:off x="477981" y="1122363"/>
+            <a:ext cx="4023360" cy="3204134"/>
+          </a:xfrm>
+        </p:spPr>
+        <p:txBody>
+          <a:bodyPr vert="horz" lIns="91440" tIns="45720" rIns="91440" bIns="45720" rtlCol="0" anchor="b">
+            <a:normAutofit/>
+          </a:bodyPr>
+          <a:lstStyle/>
+          <a:p>
+            <a:r>
+              <a:rPr lang="en-US" sz="4800" kern="1200" dirty="0">
+                <a:solidFill>
+                  <a:schemeClr val="tx1"/>
+                </a:solidFill>
+                <a:latin typeface="+mj-lt"/>
+                <a:ea typeface="+mj-ea"/>
+                <a:cs typeface="+mj-cs"/>
+              </a:rPr>
+              <a:t>Results </a:t>
+            </a:r>
+          </a:p>
+        </p:txBody>
+      </p:sp>
+      <p:sp>
+        <p:nvSpPr>
+          <p:cNvPr id="16" name="Rectangle 15">
+            <a:extLst>
+              <a:ext uri="{FF2B5EF4-FFF2-40B4-BE49-F238E27FC236}">
+                <a16:creationId xmlns:a16="http://schemas.microsoft.com/office/drawing/2014/main" id="{AF2F604E-43BE-4DC3-B983-E071523364F8}"/>
+              </a:ext>
+              <a:ext uri="{C183D7F6-B498-43B3-948B-1728B52AA6E4}">
+                <adec:decorative xmlns:adec="http://schemas.microsoft.com/office/drawing/2017/decorative" val="1"/>
+              </a:ext>
+            </a:extLst>
+          </p:cNvPr>
+          <p:cNvSpPr>
+            <a:spLocks noGrp="1" noRot="1" noChangeAspect="1" noMove="1" noResize="1" noEditPoints="1" noAdjustHandles="1" noChangeArrowheads="1" noChangeShapeType="1" noTextEdit="1"/>
+          </p:cNvSpPr>
+          <p:nvPr>
+            <p:extLst>
+              <p:ext uri="{386F3935-93C4-4BCD-93E2-E3B085C9AB24}">
+                <p16:designElem xmlns:p16="http://schemas.microsoft.com/office/powerpoint/2015/main" val="1"/>
+              </p:ext>
+            </p:extLst>
+          </p:nvPr>
+        </p:nvSpPr>
+        <p:spPr>
+          <a:xfrm rot="5400000">
+            <a:off x="759921" y="346791"/>
+            <a:ext cx="146304" cy="704088"/>
+          </a:xfrm>
+          <a:prstGeom prst="rect">
+            <a:avLst/>
+          </a:prstGeom>
+          <a:solidFill>
+            <a:schemeClr val="accent2"/>
+          </a:solidFill>
+          <a:ln>
+            <a:noFill/>
+          </a:ln>
+        </p:spPr>
+        <p:style>
+          <a:lnRef idx="2">
+            <a:schemeClr val="accent1">
+              <a:shade val="50000"/>
+            </a:schemeClr>
+          </a:lnRef>
+          <a:fillRef idx="1">
+            <a:schemeClr val="accent1"/>
+          </a:fillRef>
+          <a:effectRef idx="0">
+            <a:schemeClr val="accent1"/>
+          </a:effectRef>
+          <a:fontRef idx="minor">
+            <a:schemeClr val="lt1"/>
+          </a:fontRef>
+        </p:style>
+        <p:txBody>
+          <a:bodyPr rtlCol="0" anchor="ctr"/>
+          <a:lstStyle/>
+          <a:p>
+            <a:pPr algn="ctr"/>
+            <a:endParaRPr lang="en-US">
+              <a:solidFill>
+                <a:prstClr val="white"/>
+              </a:solidFill>
+              <a:latin typeface="Calibri" panose="020F0502020204030204"/>
+            </a:endParaRPr>
+          </a:p>
+        </p:txBody>
+      </p:sp>
+      <p:sp>
+        <p:nvSpPr>
+          <p:cNvPr id="18" name="Rectangle 17">
+            <a:extLst>
+              <a:ext uri="{FF2B5EF4-FFF2-40B4-BE49-F238E27FC236}">
+                <a16:creationId xmlns:a16="http://schemas.microsoft.com/office/drawing/2014/main" id="{08C9B587-E65E-4B52-B37C-ABEBB6E87928}"/>
+              </a:ext>
+              <a:ext uri="{C183D7F6-B498-43B3-948B-1728B52AA6E4}">
+                <adec:decorative xmlns:adec="http://schemas.microsoft.com/office/drawing/2017/decorative" val="1"/>
+              </a:ext>
+            </a:extLst>
+          </p:cNvPr>
+          <p:cNvSpPr>
+            <a:spLocks noGrp="1" noRot="1" noChangeAspect="1" noMove="1" noResize="1" noEditPoints="1" noAdjustHandles="1" noChangeArrowheads="1" noChangeShapeType="1" noTextEdit="1"/>
+          </p:cNvSpPr>
+          <p:nvPr>
+            <p:extLst>
+              <p:ext uri="{386F3935-93C4-4BCD-93E2-E3B085C9AB24}">
+                <p16:designElem xmlns:p16="http://schemas.microsoft.com/office/powerpoint/2015/main" val="1"/>
+              </p:ext>
+            </p:extLst>
+          </p:nvPr>
+        </p:nvSpPr>
+        <p:spPr>
+          <a:xfrm>
+            <a:off x="481029" y="4546920"/>
+            <a:ext cx="4023360" cy="18288"/>
+          </a:xfrm>
+          <a:prstGeom prst="rect">
+            <a:avLst/>
+          </a:prstGeom>
+          <a:solidFill>
+            <a:srgbClr val="D5D5D5"/>
+          </a:solidFill>
+          <a:ln w="3175">
+            <a:noFill/>
+          </a:ln>
+          <a:effectLst/>
+        </p:spPr>
+        <p:style>
+          <a:lnRef idx="2">
+            <a:schemeClr val="accent1">
+              <a:shade val="50000"/>
+            </a:schemeClr>
+          </a:lnRef>
+          <a:fillRef idx="1">
+            <a:schemeClr val="accent1"/>
+          </a:fillRef>
+          <a:effectRef idx="0">
+            <a:schemeClr val="accent1"/>
+          </a:effectRef>
+          <a:fontRef idx="minor">
+            <a:schemeClr val="lt1"/>
+          </a:fontRef>
+        </p:style>
+        <p:txBody>
+          <a:bodyPr rtlCol="0" anchor="ctr"/>
+          <a:lstStyle/>
+          <a:p>
+            <a:pPr marL="0" marR="0" lvl="0" indent="0" algn="ctr" defTabSz="914400" rtl="0" eaLnBrk="1" fontAlgn="auto" latinLnBrk="0" hangingPunct="1">
+              <a:lnSpc>
+                <a:spcPct val="100000"/>
+              </a:lnSpc>
+              <a:spcBef>
+                <a:spcPts val="0"/>
+              </a:spcBef>
+              <a:spcAft>
+                <a:spcPts val="0"/>
+              </a:spcAft>
+              <a:buClrTx/>
+              <a:buSzTx/>
+              <a:buFontTx/>
+              <a:buNone/>
+              <a:tabLst/>
+              <a:defRPr/>
+            </a:pPr>
+            <a:endParaRPr kumimoji="0" lang="en-US" sz="1800" b="0" i="0" u="none" strike="noStrike" kern="1200" cap="none" spc="0" normalizeH="0" baseline="0" noProof="0">
+              <a:ln>
+                <a:noFill/>
+              </a:ln>
+              <a:solidFill>
+                <a:prstClr val="white"/>
+              </a:solidFill>
+              <a:effectLst/>
+              <a:uLnTx/>
+              <a:uFillTx/>
+              <a:latin typeface="Calibri" panose="020F0502020204030204"/>
+              <a:ea typeface="+mn-ea"/>
+              <a:cs typeface="+mn-cs"/>
+            </a:endParaRPr>
+          </a:p>
+        </p:txBody>
+      </p:sp>
+      <p:pic>
+        <p:nvPicPr>
+          <p:cNvPr id="4" name="Picture 3">
+            <a:extLst>
+              <a:ext uri="{FF2B5EF4-FFF2-40B4-BE49-F238E27FC236}">
+                <a16:creationId xmlns:a16="http://schemas.microsoft.com/office/drawing/2014/main" id="{DC935B33-6A16-7C6D-550A-91D5B898E5D8}"/>
+              </a:ext>
+            </a:extLst>
+          </p:cNvPr>
+          <p:cNvPicPr>
+            <a:picLocks noChangeAspect="1"/>
+          </p:cNvPicPr>
+          <p:nvPr/>
+        </p:nvPicPr>
+        <p:blipFill>
+          <a:blip r:embed="rId2"/>
+          <a:stretch>
+            <a:fillRect/>
+          </a:stretch>
+        </p:blipFill>
+        <p:spPr>
+          <a:xfrm>
+            <a:off x="6949232" y="625683"/>
+            <a:ext cx="2886478" cy="2191056"/>
+          </a:xfrm>
+          <a:prstGeom prst="rect">
+            <a:avLst/>
+          </a:prstGeom>
+        </p:spPr>
+      </p:pic>
+      <p:pic>
+        <p:nvPicPr>
+          <p:cNvPr id="7" name="Picture 6">
+            <a:extLst>
+              <a:ext uri="{FF2B5EF4-FFF2-40B4-BE49-F238E27FC236}">
+                <a16:creationId xmlns:a16="http://schemas.microsoft.com/office/drawing/2014/main" id="{BB878B44-C758-73B8-D803-EBB9962984C0}"/>
+              </a:ext>
+            </a:extLst>
+          </p:cNvPr>
+          <p:cNvPicPr>
+            <a:picLocks noChangeAspect="1"/>
+          </p:cNvPicPr>
+          <p:nvPr/>
+        </p:nvPicPr>
+        <p:blipFill>
+          <a:blip r:embed="rId3"/>
+          <a:stretch>
+            <a:fillRect/>
+          </a:stretch>
+        </p:blipFill>
+        <p:spPr>
+          <a:xfrm>
+            <a:off x="6977811" y="3451147"/>
+            <a:ext cx="2829320" cy="2257740"/>
+          </a:xfrm>
+          <a:prstGeom prst="rect">
+            <a:avLst/>
+          </a:prstGeom>
+        </p:spPr>
+      </p:pic>
+    </p:spTree>
+    <p:extLst>
+      <p:ext uri="{BB962C8B-B14F-4D97-AF65-F5344CB8AC3E}">
+        <p14:creationId xmlns:p14="http://schemas.microsoft.com/office/powerpoint/2010/main" val="3428343853"/>
+      </p:ext>
+    </p:extLst>
+  </p:cSld>
+  <p:clrMapOvr>
+    <a:masterClrMapping/>
+  </p:clrMapOvr>
+</p:sld>
+</file>
+
+<file path=ppt/slides/slide11.xml><?xml version="1.0" encoding="utf-8"?>
+<p:sld xmlns:a="http://schemas.openxmlformats.org/drawingml/2006/main" xmlns:r="http://schemas.openxmlformats.org/officeDocument/2006/relationships" xmlns:p="http://schemas.openxmlformats.org/presentationml/2006/main">
+  <p:cSld>
+    <p:bg>
+      <p:bgPr>
+        <a:solidFill>
+          <a:schemeClr val="bg1"/>
+        </a:solidFill>
+        <a:effectLst/>
+      </p:bgPr>
+    </p:bg>
+    <p:spTree>
+      <p:nvGrpSpPr>
+        <p:cNvPr id="1" name=""/>
+        <p:cNvGrpSpPr/>
+        <p:nvPr/>
+      </p:nvGrpSpPr>
+      <p:grpSpPr>
+        <a:xfrm>
+          <a:off x="0" y="0"/>
+          <a:ext cx="0" cy="0"/>
+          <a:chOff x="0" y="0"/>
+          <a:chExt cx="0" cy="0"/>
+        </a:xfrm>
+      </p:grpSpPr>
+      <p:sp useBgFill="1">
+        <p:nvSpPr>
+          <p:cNvPr id="4103" name="Rectangle 4102">
+            <a:extLst>
+              <a:ext uri="{FF2B5EF4-FFF2-40B4-BE49-F238E27FC236}">
+                <a16:creationId xmlns:a16="http://schemas.microsoft.com/office/drawing/2014/main" id="{04812C46-200A-4DEB-A05E-3ED6C68C2387}"/>
+              </a:ext>
+              <a:ext uri="{C183D7F6-B498-43B3-948B-1728B52AA6E4}">
+                <adec:decorative xmlns:adec="http://schemas.microsoft.com/office/drawing/2017/decorative" val="1"/>
+              </a:ext>
+            </a:extLst>
+          </p:cNvPr>
+          <p:cNvSpPr>
+            <a:spLocks noGrp="1" noRot="1" noChangeAspect="1" noMove="1" noResize="1" noEditPoints="1" noAdjustHandles="1" noChangeArrowheads="1" noChangeShapeType="1" noTextEdit="1"/>
+          </p:cNvSpPr>
+          <p:nvPr>
+            <p:extLst>
+              <p:ext uri="{386F3935-93C4-4BCD-93E2-E3B085C9AB24}">
+                <p16:designElem xmlns:p16="http://schemas.microsoft.com/office/powerpoint/2015/main" val="1"/>
+              </p:ext>
+            </p:extLst>
+          </p:nvPr>
+        </p:nvSpPr>
+        <p:spPr>
+          <a:xfrm>
+            <a:off x="3049" y="0"/>
+            <a:ext cx="12188952" cy="6858000"/>
+          </a:xfrm>
+          <a:prstGeom prst="rect">
+            <a:avLst/>
+          </a:prstGeom>
+          <a:ln>
+            <a:noFill/>
+          </a:ln>
+        </p:spPr>
+        <p:style>
+          <a:lnRef idx="2">
+            <a:schemeClr val="accent1">
+              <a:shade val="50000"/>
+            </a:schemeClr>
+          </a:lnRef>
+          <a:fillRef idx="1">
+            <a:schemeClr val="accent1"/>
+          </a:fillRef>
+          <a:effectRef idx="0">
+            <a:schemeClr val="accent1"/>
+          </a:effectRef>
+          <a:fontRef idx="minor">
+            <a:schemeClr val="lt1"/>
+          </a:fontRef>
+        </p:style>
+        <p:txBody>
+          <a:bodyPr rtlCol="0" anchor="ctr"/>
+          <a:lstStyle/>
+          <a:p>
+            <a:pPr algn="ctr"/>
+            <a:endParaRPr lang="en-US"/>
+          </a:p>
+        </p:txBody>
+      </p:sp>
+      <p:pic>
+        <p:nvPicPr>
+          <p:cNvPr id="4098" name="Picture 2" descr="Blockchain Without Cryptocurrencies | Application Of Blockchain ...">
+            <a:extLst>
+              <a:ext uri="{FF2B5EF4-FFF2-40B4-BE49-F238E27FC236}">
+                <a16:creationId xmlns:a16="http://schemas.microsoft.com/office/drawing/2014/main" id="{CCD245A9-AB93-38B5-078A-65C3F1C3B743}"/>
+              </a:ext>
+            </a:extLst>
+          </p:cNvPr>
+          <p:cNvPicPr>
+            <a:picLocks noChangeAspect="1" noChangeArrowheads="1"/>
+          </p:cNvPicPr>
+          <p:nvPr/>
+        </p:nvPicPr>
+        <p:blipFill rotWithShape="1">
+          <a:blip r:embed="rId3">
+            <a:extLst>
+              <a:ext uri="{28A0092B-C50C-407E-A947-70E740481C1C}">
+                <a14:useLocalDpi xmlns:a14="http://schemas.microsoft.com/office/drawing/2010/main" val="0"/>
+              </a:ext>
+            </a:extLst>
+          </a:blip>
+          <a:srcRect l="9727" r="10962"/>
+          <a:stretch/>
+        </p:blipFill>
+        <p:spPr bwMode="auto">
+          <a:xfrm>
+            <a:off x="2522356" y="10"/>
+            <a:ext cx="9669642" cy="6857990"/>
+          </a:xfrm>
+          <a:prstGeom prst="rect">
+            <a:avLst/>
+          </a:prstGeom>
+          <a:noFill/>
+          <a:extLst>
+            <a:ext uri="{909E8E84-426E-40DD-AFC4-6F175D3DCCD1}">
+              <a14:hiddenFill xmlns:a14="http://schemas.microsoft.com/office/drawing/2010/main">
+                <a:solidFill>
+                  <a:srgbClr val="FFFFFF"/>
+                </a:solidFill>
+              </a14:hiddenFill>
+            </a:ext>
+          </a:extLst>
+        </p:spPr>
+      </p:pic>
+      <p:sp>
+        <p:nvSpPr>
+          <p:cNvPr id="4105" name="Rectangle 4104">
+            <a:extLst>
+              <a:ext uri="{FF2B5EF4-FFF2-40B4-BE49-F238E27FC236}">
+                <a16:creationId xmlns:a16="http://schemas.microsoft.com/office/drawing/2014/main" id="{D1EA859B-E555-4109-94F3-6700E046E008}"/>
+              </a:ext>
+              <a:ext uri="{C183D7F6-B498-43B3-948B-1728B52AA6E4}">
+                <adec:decorative xmlns:adec="http://schemas.microsoft.com/office/drawing/2017/decorative" val="1"/>
+              </a:ext>
+            </a:extLst>
+          </p:cNvPr>
+          <p:cNvSpPr>
+            <a:spLocks noGrp="1" noRot="1" noChangeAspect="1" noMove="1" noResize="1" noEditPoints="1" noAdjustHandles="1" noChangeArrowheads="1" noChangeShapeType="1" noTextEdit="1"/>
+          </p:cNvSpPr>
+          <p:nvPr>
+            <p:extLst>
+              <p:ext uri="{386F3935-93C4-4BCD-93E2-E3B085C9AB24}">
+                <p16:designElem xmlns:p16="http://schemas.microsoft.com/office/powerpoint/2015/main" val="1"/>
+              </p:ext>
+            </p:extLst>
+          </p:nvPr>
+        </p:nvSpPr>
+        <p:spPr>
+          <a:xfrm>
+            <a:off x="-1" y="0"/>
+            <a:ext cx="7390263" cy="6858000"/>
+          </a:xfrm>
+          <a:prstGeom prst="rect">
+            <a:avLst/>
+          </a:prstGeom>
+          <a:gradFill>
+            <a:gsLst>
+              <a:gs pos="48000">
+                <a:schemeClr val="bg1"/>
+              </a:gs>
+              <a:gs pos="35000">
+                <a:schemeClr val="bg1">
+                  <a:alpha val="77000"/>
+                </a:schemeClr>
+              </a:gs>
+              <a:gs pos="19000">
+                <a:schemeClr val="bg1">
+                  <a:alpha val="38000"/>
+                </a:schemeClr>
+              </a:gs>
+              <a:gs pos="0">
+                <a:schemeClr val="bg1">
+                  <a:alpha val="0"/>
+                </a:schemeClr>
+              </a:gs>
+              <a:gs pos="100000">
+                <a:schemeClr val="bg1"/>
+              </a:gs>
+            </a:gsLst>
+            <a:lin ang="10800000" scaled="0"/>
+          </a:gradFill>
+          <a:ln>
+            <a:noFill/>
+          </a:ln>
+        </p:spPr>
+        <p:style>
+          <a:lnRef idx="2">
+            <a:schemeClr val="accent1">
+              <a:shade val="50000"/>
+            </a:schemeClr>
+          </a:lnRef>
+          <a:fillRef idx="1">
+            <a:schemeClr val="accent1"/>
+          </a:fillRef>
+          <a:effectRef idx="0">
+            <a:schemeClr val="accent1"/>
+          </a:effectRef>
+          <a:fontRef idx="minor">
+            <a:schemeClr val="lt1"/>
+          </a:fontRef>
+        </p:style>
+        <p:txBody>
+          <a:bodyPr rtlCol="0" anchor="ctr"/>
+          <a:lstStyle/>
+          <a:p>
+            <a:pPr algn="ctr"/>
+            <a:endParaRPr lang="en-US" dirty="0"/>
+          </a:p>
+        </p:txBody>
+      </p:sp>
+      <p:sp>
+        <p:nvSpPr>
+          <p:cNvPr id="2" name="Title 1">
+            <a:extLst>
+              <a:ext uri="{FF2B5EF4-FFF2-40B4-BE49-F238E27FC236}">
+                <a16:creationId xmlns:a16="http://schemas.microsoft.com/office/drawing/2014/main" id="{FDE60BE8-E5C4-D834-18F0-85A649B2A206}"/>
+              </a:ext>
+            </a:extLst>
+          </p:cNvPr>
+          <p:cNvSpPr>
+            <a:spLocks noGrp="1"/>
+          </p:cNvSpPr>
+          <p:nvPr>
+            <p:ph type="title"/>
+          </p:nvPr>
+        </p:nvSpPr>
+        <p:spPr>
+          <a:xfrm>
+            <a:off x="838200" y="365125"/>
+            <a:ext cx="3822189" cy="1899912"/>
+          </a:xfrm>
+        </p:spPr>
+        <p:txBody>
+          <a:bodyPr>
+            <a:normAutofit/>
+          </a:bodyPr>
+          <a:lstStyle/>
+          <a:p>
+            <a:r>
+              <a:rPr lang="en-US" sz="4000"/>
+              <a:t>Conclusion</a:t>
+            </a:r>
+          </a:p>
+        </p:txBody>
+      </p:sp>
+      <p:sp>
+        <p:nvSpPr>
+          <p:cNvPr id="3" name="Content Placeholder 2">
+            <a:extLst>
+              <a:ext uri="{FF2B5EF4-FFF2-40B4-BE49-F238E27FC236}">
+                <a16:creationId xmlns:a16="http://schemas.microsoft.com/office/drawing/2014/main" id="{D32B1F32-1F5E-7D73-9CAD-4ECA0C99BE69}"/>
+              </a:ext>
+            </a:extLst>
+          </p:cNvPr>
+          <p:cNvSpPr>
+            <a:spLocks noGrp="1"/>
+          </p:cNvSpPr>
+          <p:nvPr>
+            <p:ph idx="1"/>
+          </p:nvPr>
+        </p:nvSpPr>
+        <p:spPr>
+          <a:xfrm>
+            <a:off x="838200" y="2434201"/>
+            <a:ext cx="3822189" cy="3742762"/>
+          </a:xfrm>
+        </p:spPr>
+        <p:txBody>
+          <a:bodyPr>
+            <a:normAutofit/>
+          </a:bodyPr>
+          <a:lstStyle/>
+          <a:p>
+            <a:endParaRPr lang="en-US" sz="2000"/>
+          </a:p>
+        </p:txBody>
+      </p:sp>
+    </p:spTree>
+    <p:extLst>
+      <p:ext uri="{BB962C8B-B14F-4D97-AF65-F5344CB8AC3E}">
+        <p14:creationId xmlns:p14="http://schemas.microsoft.com/office/powerpoint/2010/main" val="4240213321"/>
+      </p:ext>
+    </p:extLst>
+  </p:cSld>
+  <p:clrMapOvr>
+    <a:masterClrMapping/>
+  </p:clrMapOvr>
+</p:sld>
+</file>
+
+<file path=ppt/slides/slide12.xml><?xml version="1.0" encoding="utf-8"?>
+<p:sld xmlns:a="http://schemas.openxmlformats.org/drawingml/2006/main" xmlns:r="http://schemas.openxmlformats.org/officeDocument/2006/relationships" xmlns:p="http://schemas.openxmlformats.org/presentationml/2006/main">
+  <p:cSld>
+    <p:bg>
+      <p:bgPr>
+        <a:solidFill>
+          <a:schemeClr val="bg1"/>
+        </a:solidFill>
+        <a:effectLst/>
+      </p:bgPr>
+    </p:bg>
+    <p:spTree>
+      <p:nvGrpSpPr>
+        <p:cNvPr id="1" name=""/>
+        <p:cNvGrpSpPr/>
+        <p:nvPr/>
+      </p:nvGrpSpPr>
+      <p:grpSpPr>
+        <a:xfrm>
+          <a:off x="0" y="0"/>
+          <a:ext cx="0" cy="0"/>
+          <a:chOff x="0" y="0"/>
+          <a:chExt cx="0" cy="0"/>
+        </a:xfrm>
+      </p:grpSpPr>
+      <p:sp useBgFill="1">
+        <p:nvSpPr>
+          <p:cNvPr id="1044" name="Rectangle 1043">
+            <a:extLst>
+              <a:ext uri="{FF2B5EF4-FFF2-40B4-BE49-F238E27FC236}">
+                <a16:creationId xmlns:a16="http://schemas.microsoft.com/office/drawing/2014/main" id="{0671A8AE-40A1-4631-A6B8-581AFF065482}"/>
+              </a:ext>
+              <a:ext uri="{C183D7F6-B498-43B3-948B-1728B52AA6E4}">
+                <adec:decorative xmlns:adec="http://schemas.microsoft.com/office/drawing/2017/decorative" val="1"/>
+              </a:ext>
+            </a:extLst>
+          </p:cNvPr>
+          <p:cNvSpPr>
+            <a:spLocks noGrp="1" noRot="1" noChangeAspect="1" noMove="1" noResize="1" noEditPoints="1" noAdjustHandles="1" noChangeArrowheads="1" noChangeShapeType="1" noTextEdit="1"/>
+          </p:cNvSpPr>
+          <p:nvPr>
+            <p:extLst>
+              <p:ext uri="{386F3935-93C4-4BCD-93E2-E3B085C9AB24}">
+                <p16:designElem xmlns:p16="http://schemas.microsoft.com/office/powerpoint/2015/main" val="1"/>
+              </p:ext>
+            </p:extLst>
+          </p:nvPr>
+        </p:nvSpPr>
+        <p:spPr>
+          <a:xfrm>
+            <a:off x="0" y="0"/>
+            <a:ext cx="12192000" cy="6858000"/>
+          </a:xfrm>
+          <a:prstGeom prst="rect">
+            <a:avLst/>
+          </a:prstGeom>
+          <a:ln>
+            <a:noFill/>
+          </a:ln>
+        </p:spPr>
+        <p:style>
+          <a:lnRef idx="2">
+            <a:schemeClr val="accent1">
+              <a:shade val="50000"/>
+            </a:schemeClr>
+          </a:lnRef>
+          <a:fillRef idx="1">
+            <a:schemeClr val="accent1"/>
+          </a:fillRef>
+          <a:effectRef idx="0">
+            <a:schemeClr val="accent1"/>
+          </a:effectRef>
+          <a:fontRef idx="minor">
+            <a:schemeClr val="lt1"/>
+          </a:fontRef>
+        </p:style>
+        <p:txBody>
+          <a:bodyPr rtlCol="0" anchor="ctr"/>
+          <a:lstStyle/>
+          <a:p>
+            <a:pPr algn="ctr"/>
+            <a:endParaRPr lang="en-US"/>
+          </a:p>
+        </p:txBody>
+      </p:sp>
+      <p:pic>
+        <p:nvPicPr>
+          <p:cNvPr id="1028" name="Picture 4">
+            <a:extLst>
+              <a:ext uri="{FF2B5EF4-FFF2-40B4-BE49-F238E27FC236}">
+                <a16:creationId xmlns:a16="http://schemas.microsoft.com/office/drawing/2014/main" id="{F2BFB367-AAE9-9D2E-BC66-03988139BD81}"/>
+              </a:ext>
+            </a:extLst>
+          </p:cNvPr>
+          <p:cNvPicPr>
+            <a:picLocks noChangeAspect="1" noChangeArrowheads="1"/>
+          </p:cNvPicPr>
+          <p:nvPr/>
+        </p:nvPicPr>
+        <p:blipFill rotWithShape="1">
+          <a:blip r:embed="rId3">
+            <a:extLst>
+              <a:ext uri="{28A0092B-C50C-407E-A947-70E740481C1C}">
+                <a14:useLocalDpi xmlns:a14="http://schemas.microsoft.com/office/drawing/2010/main" val="0"/>
+              </a:ext>
+            </a:extLst>
+          </a:blip>
+          <a:srcRect t="25663" r="9092" b="31184"/>
+          <a:stretch/>
+        </p:blipFill>
+        <p:spPr bwMode="auto">
+          <a:xfrm>
+            <a:off x="3523488" y="10"/>
+            <a:ext cx="8668512" cy="6857990"/>
+          </a:xfrm>
+          <a:prstGeom prst="rect">
+            <a:avLst/>
+          </a:prstGeom>
+          <a:noFill/>
+          <a:extLst>
+            <a:ext uri="{909E8E84-426E-40DD-AFC4-6F175D3DCCD1}">
+              <a14:hiddenFill xmlns:a14="http://schemas.microsoft.com/office/drawing/2010/main">
+                <a:solidFill>
+                  <a:srgbClr val="FFFFFF"/>
+                </a:solidFill>
+              </a14:hiddenFill>
+            </a:ext>
+          </a:extLst>
+        </p:spPr>
+      </p:pic>
+      <p:sp>
+        <p:nvSpPr>
+          <p:cNvPr id="1046" name="Rectangle 1045">
+            <a:extLst>
+              <a:ext uri="{FF2B5EF4-FFF2-40B4-BE49-F238E27FC236}">
+                <a16:creationId xmlns:a16="http://schemas.microsoft.com/office/drawing/2014/main" id="{AB58EF07-17C2-48CF-ABB0-EEF1F17CB8F0}"/>
+              </a:ext>
+              <a:ext uri="{C183D7F6-B498-43B3-948B-1728B52AA6E4}">
+                <adec:decorative xmlns:adec="http://schemas.microsoft.com/office/drawing/2017/decorative" val="1"/>
+              </a:ext>
+            </a:extLst>
+          </p:cNvPr>
+          <p:cNvSpPr>
+            <a:spLocks noGrp="1" noRot="1" noChangeAspect="1" noMove="1" noResize="1" noEditPoints="1" noAdjustHandles="1" noChangeArrowheads="1" noChangeShapeType="1" noTextEdit="1"/>
+          </p:cNvSpPr>
+          <p:nvPr>
+            <p:extLst>
+              <p:ext uri="{386F3935-93C4-4BCD-93E2-E3B085C9AB24}">
+                <p16:designElem xmlns:p16="http://schemas.microsoft.com/office/powerpoint/2015/main" val="1"/>
+              </p:ext>
+            </p:extLst>
+          </p:nvPr>
+        </p:nvSpPr>
+        <p:spPr>
+          <a:xfrm>
+            <a:off x="3" y="0"/>
+            <a:ext cx="9339206" cy="6858000"/>
+          </a:xfrm>
+          <a:prstGeom prst="rect">
+            <a:avLst/>
+          </a:prstGeom>
+          <a:gradFill>
+            <a:gsLst>
+              <a:gs pos="58000">
+                <a:schemeClr val="bg1"/>
+              </a:gs>
+              <a:gs pos="33000">
+                <a:schemeClr val="bg1">
+                  <a:alpha val="64000"/>
+                </a:schemeClr>
+              </a:gs>
+              <a:gs pos="0">
+                <a:schemeClr val="bg1">
+                  <a:alpha val="0"/>
+                </a:schemeClr>
+              </a:gs>
+              <a:gs pos="100000">
+                <a:schemeClr val="bg1"/>
+              </a:gs>
+            </a:gsLst>
+            <a:lin ang="10800000" scaled="0"/>
+          </a:gradFill>
+          <a:ln>
+            <a:noFill/>
+          </a:ln>
+        </p:spPr>
+        <p:style>
+          <a:lnRef idx="2">
+            <a:schemeClr val="accent1">
+              <a:shade val="50000"/>
+            </a:schemeClr>
+          </a:lnRef>
+          <a:fillRef idx="1">
+            <a:schemeClr val="accent1"/>
+          </a:fillRef>
+          <a:effectRef idx="0">
+            <a:schemeClr val="accent1"/>
+          </a:effectRef>
+          <a:fontRef idx="minor">
+            <a:schemeClr val="lt1"/>
+          </a:fontRef>
+        </p:style>
+        <p:txBody>
+          <a:bodyPr rtlCol="0" anchor="ctr"/>
+          <a:lstStyle/>
+          <a:p>
+            <a:pPr algn="ctr"/>
+            <a:endParaRPr lang="en-US" dirty="0"/>
+          </a:p>
+        </p:txBody>
+      </p:sp>
+      <p:sp>
+        <p:nvSpPr>
+          <p:cNvPr id="2" name="Title 1">
+            <a:extLst>
+              <a:ext uri="{FF2B5EF4-FFF2-40B4-BE49-F238E27FC236}">
+                <a16:creationId xmlns:a16="http://schemas.microsoft.com/office/drawing/2014/main" id="{B70A61A3-EDC5-CD24-1CA5-DDC8DA890381}"/>
+              </a:ext>
+            </a:extLst>
+          </p:cNvPr>
+          <p:cNvSpPr>
+            <a:spLocks noGrp="1"/>
+          </p:cNvSpPr>
+          <p:nvPr>
+            <p:ph type="ctrTitle"/>
+          </p:nvPr>
+        </p:nvSpPr>
+        <p:spPr>
+          <a:xfrm>
+            <a:off x="477981" y="1122363"/>
+            <a:ext cx="4023360" cy="3204134"/>
+          </a:xfrm>
+        </p:spPr>
+        <p:txBody>
+          <a:bodyPr anchor="b">
+            <a:normAutofit/>
+          </a:bodyPr>
+          <a:lstStyle/>
+          <a:p>
+            <a:pPr algn="l"/>
+            <a:r>
+              <a:rPr lang="en-US" sz="4800"/>
+              <a:t>Questions?</a:t>
+            </a:r>
+            <a:endParaRPr lang="en-US" sz="4800" dirty="0"/>
+          </a:p>
+        </p:txBody>
+      </p:sp>
+      <p:sp>
+        <p:nvSpPr>
+          <p:cNvPr id="5" name="Subtitle 4">
+            <a:extLst>
+              <a:ext uri="{FF2B5EF4-FFF2-40B4-BE49-F238E27FC236}">
+                <a16:creationId xmlns:a16="http://schemas.microsoft.com/office/drawing/2014/main" id="{B5BDDB39-EE86-78C8-84DE-B3D0D7F8F340}"/>
+              </a:ext>
+            </a:extLst>
+          </p:cNvPr>
+          <p:cNvSpPr>
+            <a:spLocks noGrp="1"/>
+          </p:cNvSpPr>
+          <p:nvPr>
+            <p:ph type="subTitle" idx="1"/>
+          </p:nvPr>
+        </p:nvSpPr>
+        <p:spPr>
+          <a:xfrm>
+            <a:off x="477980" y="4872922"/>
+            <a:ext cx="4023359" cy="1208141"/>
+          </a:xfrm>
+        </p:spPr>
+        <p:txBody>
+          <a:bodyPr>
+            <a:normAutofit/>
+          </a:bodyPr>
+          <a:lstStyle/>
+          <a:p>
+            <a:pPr algn="l"/>
+            <a:endParaRPr lang="en-US" sz="2000"/>
+          </a:p>
+        </p:txBody>
+      </p:sp>
+      <p:sp>
+        <p:nvSpPr>
+          <p:cNvPr id="1048" name="Rectangle 1047">
+            <a:extLst>
+              <a:ext uri="{FF2B5EF4-FFF2-40B4-BE49-F238E27FC236}">
+                <a16:creationId xmlns:a16="http://schemas.microsoft.com/office/drawing/2014/main" id="{AF2F604E-43BE-4DC3-B983-E071523364F8}"/>
+              </a:ext>
+              <a:ext uri="{C183D7F6-B498-43B3-948B-1728B52AA6E4}">
+                <adec:decorative xmlns:adec="http://schemas.microsoft.com/office/drawing/2017/decorative" val="1"/>
+              </a:ext>
+            </a:extLst>
+          </p:cNvPr>
+          <p:cNvSpPr>
+            <a:spLocks noGrp="1" noRot="1" noChangeAspect="1" noMove="1" noResize="1" noEditPoints="1" noAdjustHandles="1" noChangeArrowheads="1" noChangeShapeType="1" noTextEdit="1"/>
+          </p:cNvSpPr>
+          <p:nvPr>
+            <p:extLst>
+              <p:ext uri="{386F3935-93C4-4BCD-93E2-E3B085C9AB24}">
+                <p16:designElem xmlns:p16="http://schemas.microsoft.com/office/powerpoint/2015/main" val="1"/>
+              </p:ext>
+            </p:extLst>
+          </p:nvPr>
+        </p:nvSpPr>
+        <p:spPr>
+          <a:xfrm rot="5400000">
+            <a:off x="759921" y="346791"/>
+            <a:ext cx="146304" cy="704088"/>
+          </a:xfrm>
+          <a:prstGeom prst="rect">
+            <a:avLst/>
+          </a:prstGeom>
+          <a:solidFill>
+            <a:schemeClr val="accent2"/>
+          </a:solidFill>
+          <a:ln>
+            <a:noFill/>
+          </a:ln>
+        </p:spPr>
+        <p:style>
+          <a:lnRef idx="2">
+            <a:schemeClr val="accent1">
+              <a:shade val="50000"/>
+            </a:schemeClr>
+          </a:lnRef>
+          <a:fillRef idx="1">
+            <a:schemeClr val="accent1"/>
+          </a:fillRef>
+          <a:effectRef idx="0">
+            <a:schemeClr val="accent1"/>
+          </a:effectRef>
+          <a:fontRef idx="minor">
+            <a:schemeClr val="lt1"/>
+          </a:fontRef>
+        </p:style>
+        <p:txBody>
+          <a:bodyPr rtlCol="0" anchor="ctr"/>
+          <a:lstStyle/>
+          <a:p>
+            <a:pPr algn="ctr"/>
+            <a:endParaRPr lang="en-US">
+              <a:solidFill>
+                <a:prstClr val="white"/>
+              </a:solidFill>
+              <a:latin typeface="Calibri" panose="020F0502020204030204"/>
+            </a:endParaRPr>
+          </a:p>
+        </p:txBody>
+      </p:sp>
+      <p:sp>
+        <p:nvSpPr>
+          <p:cNvPr id="1050" name="Rectangle 1049">
+            <a:extLst>
+              <a:ext uri="{FF2B5EF4-FFF2-40B4-BE49-F238E27FC236}">
+                <a16:creationId xmlns:a16="http://schemas.microsoft.com/office/drawing/2014/main" id="{08C9B587-E65E-4B52-B37C-ABEBB6E87928}"/>
+              </a:ext>
+              <a:ext uri="{C183D7F6-B498-43B3-948B-1728B52AA6E4}">
+                <adec:decorative xmlns:adec="http://schemas.microsoft.com/office/drawing/2017/decorative" val="1"/>
+              </a:ext>
+            </a:extLst>
+          </p:cNvPr>
+          <p:cNvSpPr>
+            <a:spLocks noGrp="1" noRot="1" noChangeAspect="1" noMove="1" noResize="1" noEditPoints="1" noAdjustHandles="1" noChangeArrowheads="1" noChangeShapeType="1" noTextEdit="1"/>
+          </p:cNvSpPr>
+          <p:nvPr>
+            <p:extLst>
+              <p:ext uri="{386F3935-93C4-4BCD-93E2-E3B085C9AB24}">
+                <p16:designElem xmlns:p16="http://schemas.microsoft.com/office/powerpoint/2015/main" val="1"/>
+              </p:ext>
+            </p:extLst>
+          </p:nvPr>
+        </p:nvSpPr>
+        <p:spPr>
+          <a:xfrm>
+            <a:off x="481029" y="4546920"/>
+            <a:ext cx="3977640" cy="18288"/>
+          </a:xfrm>
+          <a:prstGeom prst="rect">
+            <a:avLst/>
+          </a:prstGeom>
+          <a:solidFill>
+            <a:schemeClr val="tx1"/>
+          </a:solidFill>
+          <a:ln w="3175">
+            <a:noFill/>
+          </a:ln>
+          <a:effectLst/>
+        </p:spPr>
+        <p:style>
+          <a:lnRef idx="2">
+            <a:schemeClr val="accent1">
+              <a:shade val="50000"/>
+            </a:schemeClr>
+          </a:lnRef>
+          <a:fillRef idx="1">
+            <a:schemeClr val="accent1"/>
+          </a:fillRef>
+          <a:effectRef idx="0">
+            <a:schemeClr val="accent1"/>
+          </a:effectRef>
+          <a:fontRef idx="minor">
+            <a:schemeClr val="lt1"/>
+          </a:fontRef>
+        </p:style>
+        <p:txBody>
+          <a:bodyPr rtlCol="0" anchor="ctr"/>
+          <a:lstStyle/>
+          <a:p>
+            <a:pPr marL="0" marR="0" lvl="0" indent="0" algn="ctr" defTabSz="914400" rtl="0" eaLnBrk="1" fontAlgn="auto" latinLnBrk="0" hangingPunct="1">
+              <a:lnSpc>
+                <a:spcPct val="100000"/>
+              </a:lnSpc>
+              <a:spcBef>
+                <a:spcPts val="0"/>
+              </a:spcBef>
+              <a:spcAft>
+                <a:spcPts val="0"/>
+              </a:spcAft>
+              <a:buClrTx/>
+              <a:buSzTx/>
+              <a:buFontTx/>
+              <a:buNone/>
+              <a:tabLst/>
+              <a:defRPr/>
+            </a:pPr>
+            <a:endParaRPr kumimoji="0" lang="en-US" sz="1800" b="0" i="0" u="none" strike="noStrike" kern="1200" cap="none" spc="0" normalizeH="0" baseline="0" noProof="0">
+              <a:ln>
+                <a:noFill/>
+              </a:ln>
+              <a:solidFill>
+                <a:prstClr val="white"/>
+              </a:solidFill>
+              <a:effectLst/>
+              <a:uLnTx/>
+              <a:uFillTx/>
+              <a:latin typeface="Calibri" panose="020F0502020204030204"/>
+              <a:ea typeface="+mn-ea"/>
+              <a:cs typeface="+mn-cs"/>
+            </a:endParaRPr>
+          </a:p>
+        </p:txBody>
+      </p:sp>
+    </p:spTree>
+    <p:extLst>
+      <p:ext uri="{BB962C8B-B14F-4D97-AF65-F5344CB8AC3E}">
+        <p14:creationId xmlns:p14="http://schemas.microsoft.com/office/powerpoint/2010/main" val="149102603"/>
+      </p:ext>
+    </p:extLst>
+  </p:cSld>
+  <p:clrMapOvr>
+    <a:overrideClrMapping bg1="dk1" tx1="lt1" bg2="dk2" tx2="lt2" accent1="accent1" accent2="accent2" accent3="accent3" accent4="accent4" accent5="accent5" accent6="accent6" hlink="hlink" folHlink="folHlink"/>
+  </p:clrMapOvr>
+</p:sld>
+</file>
+
 <file path=ppt/slides/slide2.xml><?xml version="1.0" encoding="utf-8"?>
 <p:sld xmlns:a="http://schemas.openxmlformats.org/drawingml/2006/main" xmlns:r="http://schemas.openxmlformats.org/officeDocument/2006/relationships" xmlns:p="http://schemas.openxmlformats.org/presentationml/2006/main">
   <p:cSld>
@@ -10277,7 +11819,7 @@
           <a:p>
             <a:r>
               <a:rPr lang="en-US" sz="4000" dirty="0"/>
-              <a:t>Results</a:t>
+              <a:t>Methodology</a:t>
             </a:r>
           </a:p>
         </p:txBody>
@@ -10365,6 +11907,17 @@
               </a:rPr>
               <a:t>Original Performance Model</a:t>
             </a:r>
+          </a:p>
+          <a:p>
+            <a:pPr marL="0" indent="0">
+              <a:buNone/>
+            </a:pPr>
+            <a:r>
+              <a:rPr lang="en-US" sz="1800" dirty="0">
+                <a:latin typeface="NimbusRomNo9L-ReguItal"/>
+              </a:rPr>
+              <a:t>New Performance Model</a:t>
+            </a:r>
             <a:endParaRPr lang="en-US" sz="2000" dirty="0"/>
           </a:p>
         </p:txBody>
@@ -10372,7 +11925,7 @@
     </p:spTree>
     <p:extLst>
       <p:ext uri="{BB962C8B-B14F-4D97-AF65-F5344CB8AC3E}">
-        <p14:creationId xmlns:p14="http://schemas.microsoft.com/office/powerpoint/2010/main" val="2145009233"/>
+        <p14:creationId xmlns:p14="http://schemas.microsoft.com/office/powerpoint/2010/main" val="1475478525"/>
       </p:ext>
     </p:extLst>
   </p:cSld>
@@ -10409,10 +11962,10 @@
       </p:grpSpPr>
       <p:sp useBgFill="1">
         <p:nvSpPr>
-          <p:cNvPr id="4103" name="Rectangle 4102">
+          <p:cNvPr id="10" name="Rectangle 9">
             <a:extLst>
               <a:ext uri="{FF2B5EF4-FFF2-40B4-BE49-F238E27FC236}">
-                <a16:creationId xmlns:a16="http://schemas.microsoft.com/office/drawing/2014/main" id="{04812C46-200A-4DEB-A05E-3ED6C68C2387}"/>
+                <a16:creationId xmlns:a16="http://schemas.microsoft.com/office/drawing/2014/main" id="{5DCB5928-DC7D-4612-9922-441966E15627}"/>
               </a:ext>
               <a:ext uri="{C183D7F6-B498-43B3-948B-1728B52AA6E4}">
                 <adec:decorative xmlns:adec="http://schemas.microsoft.com/office/drawing/2017/decorative" val="1"/>
@@ -10432,7 +11985,1399 @@
         </p:nvSpPr>
         <p:spPr>
           <a:xfrm>
-            <a:off x="3049" y="0"/>
+            <a:off x="0" y="0"/>
+            <a:ext cx="12192000" cy="6858000"/>
+          </a:xfrm>
+          <a:prstGeom prst="rect">
+            <a:avLst/>
+          </a:prstGeom>
+          <a:ln>
+            <a:noFill/>
+          </a:ln>
+        </p:spPr>
+        <p:style>
+          <a:lnRef idx="2">
+            <a:schemeClr val="accent1">
+              <a:shade val="50000"/>
+            </a:schemeClr>
+          </a:lnRef>
+          <a:fillRef idx="1">
+            <a:schemeClr val="accent1"/>
+          </a:fillRef>
+          <a:effectRef idx="0">
+            <a:schemeClr val="accent1"/>
+          </a:effectRef>
+          <a:fontRef idx="minor">
+            <a:schemeClr val="lt1"/>
+          </a:fontRef>
+        </p:style>
+        <p:txBody>
+          <a:bodyPr rtlCol="0" anchor="ctr"/>
+          <a:lstStyle/>
+          <a:p>
+            <a:pPr algn="ctr"/>
+            <a:endParaRPr lang="en-US"/>
+          </a:p>
+        </p:txBody>
+      </p:sp>
+      <p:sp useBgFill="1">
+        <p:nvSpPr>
+          <p:cNvPr id="12" name="Freeform: Shape 11">
+            <a:extLst>
+              <a:ext uri="{FF2B5EF4-FFF2-40B4-BE49-F238E27FC236}">
+                <a16:creationId xmlns:a16="http://schemas.microsoft.com/office/drawing/2014/main" id="{682C1161-1736-45EC-99B7-33F3CAE9D517}"/>
+              </a:ext>
+              <a:ext uri="{C183D7F6-B498-43B3-948B-1728B52AA6E4}">
+                <adec:decorative xmlns:adec="http://schemas.microsoft.com/office/drawing/2017/decorative" val="1"/>
+              </a:ext>
+            </a:extLst>
+          </p:cNvPr>
+          <p:cNvSpPr>
+            <a:spLocks noGrp="1" noRot="1" noChangeAspect="1" noMove="1" noResize="1" noEditPoints="1" noAdjustHandles="1" noChangeArrowheads="1" noChangeShapeType="1" noTextEdit="1"/>
+          </p:cNvSpPr>
+          <p:nvPr>
+            <p:extLst>
+              <p:ext uri="{386F3935-93C4-4BCD-93E2-E3B085C9AB24}">
+                <p16:designElem xmlns:p16="http://schemas.microsoft.com/office/powerpoint/2015/main" val="1"/>
+              </p:ext>
+            </p:extLst>
+          </p:nvPr>
+        </p:nvSpPr>
+        <p:spPr>
+          <a:xfrm>
+            <a:off x="0" y="0"/>
+            <a:ext cx="4959047" cy="6858000"/>
+          </a:xfrm>
+          <a:custGeom>
+            <a:avLst/>
+            <a:gdLst>
+              <a:gd name="connsiteX0" fmla="*/ 0 w 4959047"/>
+              <a:gd name="connsiteY0" fmla="*/ 0 h 6858000"/>
+              <a:gd name="connsiteX1" fmla="*/ 4110127 w 4959047"/>
+              <a:gd name="connsiteY1" fmla="*/ 0 h 6858000"/>
+              <a:gd name="connsiteX2" fmla="*/ 4179024 w 4959047"/>
+              <a:gd name="connsiteY2" fmla="*/ 123368 h 6858000"/>
+              <a:gd name="connsiteX3" fmla="*/ 4959047 w 4959047"/>
+              <a:gd name="connsiteY3" fmla="*/ 3429000 h 6858000"/>
+              <a:gd name="connsiteX4" fmla="*/ 4179024 w 4959047"/>
+              <a:gd name="connsiteY4" fmla="*/ 6734633 h 6858000"/>
+              <a:gd name="connsiteX5" fmla="*/ 4110127 w 4959047"/>
+              <a:gd name="connsiteY5" fmla="*/ 6858000 h 6858000"/>
+              <a:gd name="connsiteX6" fmla="*/ 0 w 4959047"/>
+              <a:gd name="connsiteY6" fmla="*/ 6858000 h 6858000"/>
+            </a:gdLst>
+            <a:ahLst/>
+            <a:cxnLst>
+              <a:cxn ang="0">
+                <a:pos x="connsiteX0" y="connsiteY0"/>
+              </a:cxn>
+              <a:cxn ang="0">
+                <a:pos x="connsiteX1" y="connsiteY1"/>
+              </a:cxn>
+              <a:cxn ang="0">
+                <a:pos x="connsiteX2" y="connsiteY2"/>
+              </a:cxn>
+              <a:cxn ang="0">
+                <a:pos x="connsiteX3" y="connsiteY3"/>
+              </a:cxn>
+              <a:cxn ang="0">
+                <a:pos x="connsiteX4" y="connsiteY4"/>
+              </a:cxn>
+              <a:cxn ang="0">
+                <a:pos x="connsiteX5" y="connsiteY5"/>
+              </a:cxn>
+              <a:cxn ang="0">
+                <a:pos x="connsiteX6" y="connsiteY6"/>
+              </a:cxn>
+            </a:cxnLst>
+            <a:rect l="l" t="t" r="r" b="b"/>
+            <a:pathLst>
+              <a:path w="4959047" h="6858000">
+                <a:moveTo>
+                  <a:pt x="0" y="0"/>
+                </a:moveTo>
+                <a:lnTo>
+                  <a:pt x="4110127" y="0"/>
+                </a:lnTo>
+                <a:lnTo>
+                  <a:pt x="4179024" y="123368"/>
+                </a:lnTo>
+                <a:cubicBezTo>
+                  <a:pt x="4668929" y="1045156"/>
+                  <a:pt x="4959047" y="2189404"/>
+                  <a:pt x="4959047" y="3429000"/>
+                </a:cubicBezTo>
+                <a:cubicBezTo>
+                  <a:pt x="4959047" y="4668597"/>
+                  <a:pt x="4668929" y="5812845"/>
+                  <a:pt x="4179024" y="6734633"/>
+                </a:cubicBezTo>
+                <a:lnTo>
+                  <a:pt x="4110127" y="6858000"/>
+                </a:lnTo>
+                <a:lnTo>
+                  <a:pt x="0" y="6858000"/>
+                </a:lnTo>
+                <a:close/>
+              </a:path>
+            </a:pathLst>
+          </a:custGeom>
+          <a:ln w="9525">
+            <a:solidFill>
+              <a:srgbClr val="E6E6E6"/>
+            </a:solidFill>
+          </a:ln>
+          <a:effectLst>
+            <a:outerShdw blurRad="76200" dist="38100" algn="l" rotWithShape="0">
+              <a:schemeClr val="bg1">
+                <a:lumMod val="85000"/>
+                <a:alpha val="50000"/>
+              </a:schemeClr>
+            </a:outerShdw>
+          </a:effectLst>
+        </p:spPr>
+        <p:style>
+          <a:lnRef idx="2">
+            <a:schemeClr val="accent1">
+              <a:shade val="50000"/>
+            </a:schemeClr>
+          </a:lnRef>
+          <a:fillRef idx="1">
+            <a:schemeClr val="accent1"/>
+          </a:fillRef>
+          <a:effectRef idx="0">
+            <a:schemeClr val="accent1"/>
+          </a:effectRef>
+          <a:fontRef idx="minor">
+            <a:schemeClr val="lt1"/>
+          </a:fontRef>
+        </p:style>
+        <p:txBody>
+          <a:bodyPr wrap="square" rtlCol="0" anchor="ctr">
+            <a:noAutofit/>
+          </a:bodyPr>
+          <a:lstStyle/>
+          <a:p>
+            <a:pPr marL="0" marR="0" lvl="0" indent="0" algn="ctr" defTabSz="914400" rtl="0" eaLnBrk="1" fontAlgn="auto" latinLnBrk="0" hangingPunct="1">
+              <a:lnSpc>
+                <a:spcPct val="100000"/>
+              </a:lnSpc>
+              <a:spcBef>
+                <a:spcPts val="0"/>
+              </a:spcBef>
+              <a:spcAft>
+                <a:spcPts val="0"/>
+              </a:spcAft>
+              <a:buClrTx/>
+              <a:buSzTx/>
+              <a:buFontTx/>
+              <a:buNone/>
+              <a:tabLst/>
+              <a:defRPr/>
+            </a:pPr>
+            <a:endParaRPr kumimoji="0" lang="en-US" sz="1800" b="0" i="0" u="none" strike="noStrike" kern="1200" cap="none" spc="0" normalizeH="0" baseline="0" noProof="0">
+              <a:ln>
+                <a:noFill/>
+              </a:ln>
+              <a:solidFill>
+                <a:prstClr val="white"/>
+              </a:solidFill>
+              <a:effectLst/>
+              <a:uLnTx/>
+              <a:uFillTx/>
+              <a:latin typeface="Calibri" panose="020F0502020204030204"/>
+              <a:ea typeface="+mn-ea"/>
+              <a:cs typeface="+mn-cs"/>
+            </a:endParaRPr>
+          </a:p>
+        </p:txBody>
+      </p:sp>
+      <p:sp useBgFill="1">
+        <p:nvSpPr>
+          <p:cNvPr id="14" name="Freeform: Shape 13">
+            <a:extLst>
+              <a:ext uri="{FF2B5EF4-FFF2-40B4-BE49-F238E27FC236}">
+                <a16:creationId xmlns:a16="http://schemas.microsoft.com/office/drawing/2014/main" id="{84D4DDB8-B68F-45B0-9F62-C4279996F672}"/>
+              </a:ext>
+              <a:ext uri="{C183D7F6-B498-43B3-948B-1728B52AA6E4}">
+                <adec:decorative xmlns:adec="http://schemas.microsoft.com/office/drawing/2017/decorative" val="1"/>
+              </a:ext>
+            </a:extLst>
+          </p:cNvPr>
+          <p:cNvSpPr>
+            <a:spLocks noGrp="1" noRot="1" noChangeAspect="1" noMove="1" noResize="1" noEditPoints="1" noAdjustHandles="1" noChangeArrowheads="1" noChangeShapeType="1" noTextEdit="1"/>
+          </p:cNvSpPr>
+          <p:nvPr>
+            <p:extLst>
+              <p:ext uri="{386F3935-93C4-4BCD-93E2-E3B085C9AB24}">
+                <p16:designElem xmlns:p16="http://schemas.microsoft.com/office/powerpoint/2015/main" val="1"/>
+              </p:ext>
+            </p:extLst>
+          </p:nvPr>
+        </p:nvSpPr>
+        <p:spPr>
+          <a:xfrm>
+            <a:off x="0" y="0"/>
+            <a:ext cx="4948887" cy="6858000"/>
+          </a:xfrm>
+          <a:custGeom>
+            <a:avLst/>
+            <a:gdLst>
+              <a:gd name="connsiteX0" fmla="*/ 0 w 4948887"/>
+              <a:gd name="connsiteY0" fmla="*/ 0 h 6858000"/>
+              <a:gd name="connsiteX1" fmla="*/ 4099967 w 4948887"/>
+              <a:gd name="connsiteY1" fmla="*/ 0 h 6858000"/>
+              <a:gd name="connsiteX2" fmla="*/ 4168864 w 4948887"/>
+              <a:gd name="connsiteY2" fmla="*/ 123368 h 6858000"/>
+              <a:gd name="connsiteX3" fmla="*/ 4948887 w 4948887"/>
+              <a:gd name="connsiteY3" fmla="*/ 3429000 h 6858000"/>
+              <a:gd name="connsiteX4" fmla="*/ 4168864 w 4948887"/>
+              <a:gd name="connsiteY4" fmla="*/ 6734633 h 6858000"/>
+              <a:gd name="connsiteX5" fmla="*/ 4099967 w 4948887"/>
+              <a:gd name="connsiteY5" fmla="*/ 6858000 h 6858000"/>
+              <a:gd name="connsiteX6" fmla="*/ 0 w 4948887"/>
+              <a:gd name="connsiteY6" fmla="*/ 6858000 h 6858000"/>
+            </a:gdLst>
+            <a:ahLst/>
+            <a:cxnLst>
+              <a:cxn ang="0">
+                <a:pos x="connsiteX0" y="connsiteY0"/>
+              </a:cxn>
+              <a:cxn ang="0">
+                <a:pos x="connsiteX1" y="connsiteY1"/>
+              </a:cxn>
+              <a:cxn ang="0">
+                <a:pos x="connsiteX2" y="connsiteY2"/>
+              </a:cxn>
+              <a:cxn ang="0">
+                <a:pos x="connsiteX3" y="connsiteY3"/>
+              </a:cxn>
+              <a:cxn ang="0">
+                <a:pos x="connsiteX4" y="connsiteY4"/>
+              </a:cxn>
+              <a:cxn ang="0">
+                <a:pos x="connsiteX5" y="connsiteY5"/>
+              </a:cxn>
+              <a:cxn ang="0">
+                <a:pos x="connsiteX6" y="connsiteY6"/>
+              </a:cxn>
+            </a:cxnLst>
+            <a:rect l="l" t="t" r="r" b="b"/>
+            <a:pathLst>
+              <a:path w="4948887" h="6858000">
+                <a:moveTo>
+                  <a:pt x="0" y="0"/>
+                </a:moveTo>
+                <a:lnTo>
+                  <a:pt x="4099967" y="0"/>
+                </a:lnTo>
+                <a:lnTo>
+                  <a:pt x="4168864" y="123368"/>
+                </a:lnTo>
+                <a:cubicBezTo>
+                  <a:pt x="4658769" y="1045156"/>
+                  <a:pt x="4948887" y="2189404"/>
+                  <a:pt x="4948887" y="3429000"/>
+                </a:cubicBezTo>
+                <a:cubicBezTo>
+                  <a:pt x="4948887" y="4668597"/>
+                  <a:pt x="4658769" y="5812845"/>
+                  <a:pt x="4168864" y="6734633"/>
+                </a:cubicBezTo>
+                <a:lnTo>
+                  <a:pt x="4099967" y="6858000"/>
+                </a:lnTo>
+                <a:lnTo>
+                  <a:pt x="0" y="6858000"/>
+                </a:lnTo>
+                <a:close/>
+              </a:path>
+            </a:pathLst>
+          </a:custGeom>
+          <a:ln w="9525">
+            <a:noFill/>
+          </a:ln>
+          <a:effectLst/>
+        </p:spPr>
+        <p:style>
+          <a:lnRef idx="2">
+            <a:schemeClr val="accent1">
+              <a:shade val="50000"/>
+            </a:schemeClr>
+          </a:lnRef>
+          <a:fillRef idx="1">
+            <a:schemeClr val="accent1"/>
+          </a:fillRef>
+          <a:effectRef idx="0">
+            <a:schemeClr val="accent1"/>
+          </a:effectRef>
+          <a:fontRef idx="minor">
+            <a:schemeClr val="lt1"/>
+          </a:fontRef>
+        </p:style>
+        <p:txBody>
+          <a:bodyPr wrap="square" rtlCol="0" anchor="ctr">
+            <a:noAutofit/>
+          </a:bodyPr>
+          <a:lstStyle/>
+          <a:p>
+            <a:pPr marL="0" marR="0" lvl="0" indent="0" algn="ctr" defTabSz="914400" rtl="0" eaLnBrk="1" fontAlgn="auto" latinLnBrk="0" hangingPunct="1">
+              <a:lnSpc>
+                <a:spcPct val="100000"/>
+              </a:lnSpc>
+              <a:spcBef>
+                <a:spcPts val="0"/>
+              </a:spcBef>
+              <a:spcAft>
+                <a:spcPts val="0"/>
+              </a:spcAft>
+              <a:buClrTx/>
+              <a:buSzTx/>
+              <a:buFontTx/>
+              <a:buNone/>
+              <a:tabLst/>
+              <a:defRPr/>
+            </a:pPr>
+            <a:endParaRPr kumimoji="0" lang="en-US" sz="1800" b="0" i="0" u="none" strike="noStrike" kern="1200" cap="none" spc="0" normalizeH="0" baseline="0" noProof="0">
+              <a:ln>
+                <a:noFill/>
+              </a:ln>
+              <a:solidFill>
+                <a:prstClr val="white"/>
+              </a:solidFill>
+              <a:effectLst/>
+              <a:uLnTx/>
+              <a:uFillTx/>
+              <a:latin typeface="Calibri" panose="020F0502020204030204"/>
+              <a:ea typeface="+mn-ea"/>
+              <a:cs typeface="+mn-cs"/>
+            </a:endParaRPr>
+          </a:p>
+        </p:txBody>
+      </p:sp>
+      <p:sp>
+        <p:nvSpPr>
+          <p:cNvPr id="2" name="Title 1">
+            <a:extLst>
+              <a:ext uri="{FF2B5EF4-FFF2-40B4-BE49-F238E27FC236}">
+                <a16:creationId xmlns:a16="http://schemas.microsoft.com/office/drawing/2014/main" id="{433F3966-12F0-DD61-965B-208AF4F973F0}"/>
+              </a:ext>
+            </a:extLst>
+          </p:cNvPr>
+          <p:cNvSpPr>
+            <a:spLocks noGrp="1"/>
+          </p:cNvSpPr>
+          <p:nvPr>
+            <p:ph type="title"/>
+          </p:nvPr>
+        </p:nvSpPr>
+        <p:spPr>
+          <a:xfrm>
+            <a:off x="477981" y="1122363"/>
+            <a:ext cx="4023360" cy="3204134"/>
+          </a:xfrm>
+        </p:spPr>
+        <p:txBody>
+          <a:bodyPr vert="horz" lIns="91440" tIns="45720" rIns="91440" bIns="45720" rtlCol="0" anchor="b">
+            <a:normAutofit/>
+          </a:bodyPr>
+          <a:lstStyle/>
+          <a:p>
+            <a:r>
+              <a:rPr lang="en-US" sz="4800" kern="1200">
+                <a:solidFill>
+                  <a:schemeClr val="tx1"/>
+                </a:solidFill>
+                <a:latin typeface="+mj-lt"/>
+                <a:ea typeface="+mj-ea"/>
+                <a:cs typeface="+mj-cs"/>
+              </a:rPr>
+              <a:t>Methodology </a:t>
+            </a:r>
+          </a:p>
+        </p:txBody>
+      </p:sp>
+      <p:sp>
+        <p:nvSpPr>
+          <p:cNvPr id="16" name="Rectangle 15">
+            <a:extLst>
+              <a:ext uri="{FF2B5EF4-FFF2-40B4-BE49-F238E27FC236}">
+                <a16:creationId xmlns:a16="http://schemas.microsoft.com/office/drawing/2014/main" id="{AF2F604E-43BE-4DC3-B983-E071523364F8}"/>
+              </a:ext>
+              <a:ext uri="{C183D7F6-B498-43B3-948B-1728B52AA6E4}">
+                <adec:decorative xmlns:adec="http://schemas.microsoft.com/office/drawing/2017/decorative" val="1"/>
+              </a:ext>
+            </a:extLst>
+          </p:cNvPr>
+          <p:cNvSpPr>
+            <a:spLocks noGrp="1" noRot="1" noChangeAspect="1" noMove="1" noResize="1" noEditPoints="1" noAdjustHandles="1" noChangeArrowheads="1" noChangeShapeType="1" noTextEdit="1"/>
+          </p:cNvSpPr>
+          <p:nvPr>
+            <p:extLst>
+              <p:ext uri="{386F3935-93C4-4BCD-93E2-E3B085C9AB24}">
+                <p16:designElem xmlns:p16="http://schemas.microsoft.com/office/powerpoint/2015/main" val="1"/>
+              </p:ext>
+            </p:extLst>
+          </p:nvPr>
+        </p:nvSpPr>
+        <p:spPr>
+          <a:xfrm rot="5400000">
+            <a:off x="759921" y="346791"/>
+            <a:ext cx="146304" cy="704088"/>
+          </a:xfrm>
+          <a:prstGeom prst="rect">
+            <a:avLst/>
+          </a:prstGeom>
+          <a:solidFill>
+            <a:schemeClr val="accent2"/>
+          </a:solidFill>
+          <a:ln>
+            <a:noFill/>
+          </a:ln>
+        </p:spPr>
+        <p:style>
+          <a:lnRef idx="2">
+            <a:schemeClr val="accent1">
+              <a:shade val="50000"/>
+            </a:schemeClr>
+          </a:lnRef>
+          <a:fillRef idx="1">
+            <a:schemeClr val="accent1"/>
+          </a:fillRef>
+          <a:effectRef idx="0">
+            <a:schemeClr val="accent1"/>
+          </a:effectRef>
+          <a:fontRef idx="minor">
+            <a:schemeClr val="lt1"/>
+          </a:fontRef>
+        </p:style>
+        <p:txBody>
+          <a:bodyPr rtlCol="0" anchor="ctr"/>
+          <a:lstStyle/>
+          <a:p>
+            <a:pPr algn="ctr"/>
+            <a:endParaRPr lang="en-US">
+              <a:solidFill>
+                <a:prstClr val="white"/>
+              </a:solidFill>
+              <a:latin typeface="Calibri" panose="020F0502020204030204"/>
+            </a:endParaRPr>
+          </a:p>
+        </p:txBody>
+      </p:sp>
+      <p:sp>
+        <p:nvSpPr>
+          <p:cNvPr id="18" name="Rectangle 17">
+            <a:extLst>
+              <a:ext uri="{FF2B5EF4-FFF2-40B4-BE49-F238E27FC236}">
+                <a16:creationId xmlns:a16="http://schemas.microsoft.com/office/drawing/2014/main" id="{08C9B587-E65E-4B52-B37C-ABEBB6E87928}"/>
+              </a:ext>
+              <a:ext uri="{C183D7F6-B498-43B3-948B-1728B52AA6E4}">
+                <adec:decorative xmlns:adec="http://schemas.microsoft.com/office/drawing/2017/decorative" val="1"/>
+              </a:ext>
+            </a:extLst>
+          </p:cNvPr>
+          <p:cNvSpPr>
+            <a:spLocks noGrp="1" noRot="1" noChangeAspect="1" noMove="1" noResize="1" noEditPoints="1" noAdjustHandles="1" noChangeArrowheads="1" noChangeShapeType="1" noTextEdit="1"/>
+          </p:cNvSpPr>
+          <p:nvPr>
+            <p:extLst>
+              <p:ext uri="{386F3935-93C4-4BCD-93E2-E3B085C9AB24}">
+                <p16:designElem xmlns:p16="http://schemas.microsoft.com/office/powerpoint/2015/main" val="1"/>
+              </p:ext>
+            </p:extLst>
+          </p:nvPr>
+        </p:nvSpPr>
+        <p:spPr>
+          <a:xfrm>
+            <a:off x="481029" y="4546920"/>
+            <a:ext cx="4023360" cy="18288"/>
+          </a:xfrm>
+          <a:prstGeom prst="rect">
+            <a:avLst/>
+          </a:prstGeom>
+          <a:solidFill>
+            <a:srgbClr val="D5D5D5"/>
+          </a:solidFill>
+          <a:ln w="3175">
+            <a:noFill/>
+          </a:ln>
+          <a:effectLst/>
+        </p:spPr>
+        <p:style>
+          <a:lnRef idx="2">
+            <a:schemeClr val="accent1">
+              <a:shade val="50000"/>
+            </a:schemeClr>
+          </a:lnRef>
+          <a:fillRef idx="1">
+            <a:schemeClr val="accent1"/>
+          </a:fillRef>
+          <a:effectRef idx="0">
+            <a:schemeClr val="accent1"/>
+          </a:effectRef>
+          <a:fontRef idx="minor">
+            <a:schemeClr val="lt1"/>
+          </a:fontRef>
+        </p:style>
+        <p:txBody>
+          <a:bodyPr rtlCol="0" anchor="ctr"/>
+          <a:lstStyle/>
+          <a:p>
+            <a:pPr marL="0" marR="0" lvl="0" indent="0" algn="ctr" defTabSz="914400" rtl="0" eaLnBrk="1" fontAlgn="auto" latinLnBrk="0" hangingPunct="1">
+              <a:lnSpc>
+                <a:spcPct val="100000"/>
+              </a:lnSpc>
+              <a:spcBef>
+                <a:spcPts val="0"/>
+              </a:spcBef>
+              <a:spcAft>
+                <a:spcPts val="0"/>
+              </a:spcAft>
+              <a:buClrTx/>
+              <a:buSzTx/>
+              <a:buFontTx/>
+              <a:buNone/>
+              <a:tabLst/>
+              <a:defRPr/>
+            </a:pPr>
+            <a:endParaRPr kumimoji="0" lang="en-US" sz="1800" b="0" i="0" u="none" strike="noStrike" kern="1200" cap="none" spc="0" normalizeH="0" baseline="0" noProof="0">
+              <a:ln>
+                <a:noFill/>
+              </a:ln>
+              <a:solidFill>
+                <a:prstClr val="white"/>
+              </a:solidFill>
+              <a:effectLst/>
+              <a:uLnTx/>
+              <a:uFillTx/>
+              <a:latin typeface="Calibri" panose="020F0502020204030204"/>
+              <a:ea typeface="+mn-ea"/>
+              <a:cs typeface="+mn-cs"/>
+            </a:endParaRPr>
+          </a:p>
+        </p:txBody>
+      </p:sp>
+      <p:pic>
+        <p:nvPicPr>
+          <p:cNvPr id="5" name="Picture 4" descr="Diagram&#10;&#10;Description automatically generated">
+            <a:extLst>
+              <a:ext uri="{FF2B5EF4-FFF2-40B4-BE49-F238E27FC236}">
+                <a16:creationId xmlns:a16="http://schemas.microsoft.com/office/drawing/2014/main" id="{A4C73C9A-A89B-1517-8D0A-4B9C36BCC269}"/>
+              </a:ext>
+            </a:extLst>
+          </p:cNvPr>
+          <p:cNvPicPr>
+            <a:picLocks noChangeAspect="1"/>
+          </p:cNvPicPr>
+          <p:nvPr/>
+        </p:nvPicPr>
+        <p:blipFill>
+          <a:blip r:embed="rId2"/>
+          <a:stretch>
+            <a:fillRect/>
+          </a:stretch>
+        </p:blipFill>
+        <p:spPr>
+          <a:xfrm>
+            <a:off x="5669920" y="625684"/>
+            <a:ext cx="5897708" cy="5455380"/>
+          </a:xfrm>
+          <a:prstGeom prst="rect">
+            <a:avLst/>
+          </a:prstGeom>
+        </p:spPr>
+      </p:pic>
+    </p:spTree>
+    <p:extLst>
+      <p:ext uri="{BB962C8B-B14F-4D97-AF65-F5344CB8AC3E}">
+        <p14:creationId xmlns:p14="http://schemas.microsoft.com/office/powerpoint/2010/main" val="3002657218"/>
+      </p:ext>
+    </p:extLst>
+  </p:cSld>
+  <p:clrMapOvr>
+    <a:masterClrMapping/>
+  </p:clrMapOvr>
+</p:sld>
+</file>
+
+<file path=ppt/slides/slide7.xml><?xml version="1.0" encoding="utf-8"?>
+<p:sld xmlns:a="http://schemas.openxmlformats.org/drawingml/2006/main" xmlns:r="http://schemas.openxmlformats.org/officeDocument/2006/relationships" xmlns:p="http://schemas.openxmlformats.org/presentationml/2006/main">
+  <p:cSld>
+    <p:bg>
+      <p:bgPr>
+        <a:solidFill>
+          <a:schemeClr val="bg1"/>
+        </a:solidFill>
+        <a:effectLst/>
+      </p:bgPr>
+    </p:bg>
+    <p:spTree>
+      <p:nvGrpSpPr>
+        <p:cNvPr id="1" name=""/>
+        <p:cNvGrpSpPr/>
+        <p:nvPr/>
+      </p:nvGrpSpPr>
+      <p:grpSpPr>
+        <a:xfrm>
+          <a:off x="0" y="0"/>
+          <a:ext cx="0" cy="0"/>
+          <a:chOff x="0" y="0"/>
+          <a:chExt cx="0" cy="0"/>
+        </a:xfrm>
+      </p:grpSpPr>
+      <p:sp useBgFill="1">
+        <p:nvSpPr>
+          <p:cNvPr id="10" name="Rectangle 9">
+            <a:extLst>
+              <a:ext uri="{FF2B5EF4-FFF2-40B4-BE49-F238E27FC236}">
+                <a16:creationId xmlns:a16="http://schemas.microsoft.com/office/drawing/2014/main" id="{5DCB5928-DC7D-4612-9922-441966E15627}"/>
+              </a:ext>
+              <a:ext uri="{C183D7F6-B498-43B3-948B-1728B52AA6E4}">
+                <adec:decorative xmlns:adec="http://schemas.microsoft.com/office/drawing/2017/decorative" val="1"/>
+              </a:ext>
+            </a:extLst>
+          </p:cNvPr>
+          <p:cNvSpPr>
+            <a:spLocks noGrp="1" noRot="1" noChangeAspect="1" noMove="1" noResize="1" noEditPoints="1" noAdjustHandles="1" noChangeArrowheads="1" noChangeShapeType="1" noTextEdit="1"/>
+          </p:cNvSpPr>
+          <p:nvPr>
+            <p:extLst>
+              <p:ext uri="{386F3935-93C4-4BCD-93E2-E3B085C9AB24}">
+                <p16:designElem xmlns:p16="http://schemas.microsoft.com/office/powerpoint/2015/main" val="1"/>
+              </p:ext>
+            </p:extLst>
+          </p:nvPr>
+        </p:nvSpPr>
+        <p:spPr>
+          <a:xfrm>
+            <a:off x="0" y="0"/>
+            <a:ext cx="12192000" cy="6858000"/>
+          </a:xfrm>
+          <a:prstGeom prst="rect">
+            <a:avLst/>
+          </a:prstGeom>
+          <a:ln>
+            <a:noFill/>
+          </a:ln>
+        </p:spPr>
+        <p:style>
+          <a:lnRef idx="2">
+            <a:schemeClr val="accent1">
+              <a:shade val="50000"/>
+            </a:schemeClr>
+          </a:lnRef>
+          <a:fillRef idx="1">
+            <a:schemeClr val="accent1"/>
+          </a:fillRef>
+          <a:effectRef idx="0">
+            <a:schemeClr val="accent1"/>
+          </a:effectRef>
+          <a:fontRef idx="minor">
+            <a:schemeClr val="lt1"/>
+          </a:fontRef>
+        </p:style>
+        <p:txBody>
+          <a:bodyPr rtlCol="0" anchor="ctr"/>
+          <a:lstStyle/>
+          <a:p>
+            <a:pPr algn="ctr"/>
+            <a:endParaRPr lang="en-US"/>
+          </a:p>
+        </p:txBody>
+      </p:sp>
+      <p:sp useBgFill="1">
+        <p:nvSpPr>
+          <p:cNvPr id="12" name="Freeform: Shape 11">
+            <a:extLst>
+              <a:ext uri="{FF2B5EF4-FFF2-40B4-BE49-F238E27FC236}">
+                <a16:creationId xmlns:a16="http://schemas.microsoft.com/office/drawing/2014/main" id="{682C1161-1736-45EC-99B7-33F3CAE9D517}"/>
+              </a:ext>
+              <a:ext uri="{C183D7F6-B498-43B3-948B-1728B52AA6E4}">
+                <adec:decorative xmlns:adec="http://schemas.microsoft.com/office/drawing/2017/decorative" val="1"/>
+              </a:ext>
+            </a:extLst>
+          </p:cNvPr>
+          <p:cNvSpPr>
+            <a:spLocks noGrp="1" noRot="1" noChangeAspect="1" noMove="1" noResize="1" noEditPoints="1" noAdjustHandles="1" noChangeArrowheads="1" noChangeShapeType="1" noTextEdit="1"/>
+          </p:cNvSpPr>
+          <p:nvPr>
+            <p:extLst>
+              <p:ext uri="{386F3935-93C4-4BCD-93E2-E3B085C9AB24}">
+                <p16:designElem xmlns:p16="http://schemas.microsoft.com/office/powerpoint/2015/main" val="1"/>
+              </p:ext>
+            </p:extLst>
+          </p:nvPr>
+        </p:nvSpPr>
+        <p:spPr>
+          <a:xfrm>
+            <a:off x="0" y="0"/>
+            <a:ext cx="4959047" cy="6858000"/>
+          </a:xfrm>
+          <a:custGeom>
+            <a:avLst/>
+            <a:gdLst>
+              <a:gd name="connsiteX0" fmla="*/ 0 w 4959047"/>
+              <a:gd name="connsiteY0" fmla="*/ 0 h 6858000"/>
+              <a:gd name="connsiteX1" fmla="*/ 4110127 w 4959047"/>
+              <a:gd name="connsiteY1" fmla="*/ 0 h 6858000"/>
+              <a:gd name="connsiteX2" fmla="*/ 4179024 w 4959047"/>
+              <a:gd name="connsiteY2" fmla="*/ 123368 h 6858000"/>
+              <a:gd name="connsiteX3" fmla="*/ 4959047 w 4959047"/>
+              <a:gd name="connsiteY3" fmla="*/ 3429000 h 6858000"/>
+              <a:gd name="connsiteX4" fmla="*/ 4179024 w 4959047"/>
+              <a:gd name="connsiteY4" fmla="*/ 6734633 h 6858000"/>
+              <a:gd name="connsiteX5" fmla="*/ 4110127 w 4959047"/>
+              <a:gd name="connsiteY5" fmla="*/ 6858000 h 6858000"/>
+              <a:gd name="connsiteX6" fmla="*/ 0 w 4959047"/>
+              <a:gd name="connsiteY6" fmla="*/ 6858000 h 6858000"/>
+            </a:gdLst>
+            <a:ahLst/>
+            <a:cxnLst>
+              <a:cxn ang="0">
+                <a:pos x="connsiteX0" y="connsiteY0"/>
+              </a:cxn>
+              <a:cxn ang="0">
+                <a:pos x="connsiteX1" y="connsiteY1"/>
+              </a:cxn>
+              <a:cxn ang="0">
+                <a:pos x="connsiteX2" y="connsiteY2"/>
+              </a:cxn>
+              <a:cxn ang="0">
+                <a:pos x="connsiteX3" y="connsiteY3"/>
+              </a:cxn>
+              <a:cxn ang="0">
+                <a:pos x="connsiteX4" y="connsiteY4"/>
+              </a:cxn>
+              <a:cxn ang="0">
+                <a:pos x="connsiteX5" y="connsiteY5"/>
+              </a:cxn>
+              <a:cxn ang="0">
+                <a:pos x="connsiteX6" y="connsiteY6"/>
+              </a:cxn>
+            </a:cxnLst>
+            <a:rect l="l" t="t" r="r" b="b"/>
+            <a:pathLst>
+              <a:path w="4959047" h="6858000">
+                <a:moveTo>
+                  <a:pt x="0" y="0"/>
+                </a:moveTo>
+                <a:lnTo>
+                  <a:pt x="4110127" y="0"/>
+                </a:lnTo>
+                <a:lnTo>
+                  <a:pt x="4179024" y="123368"/>
+                </a:lnTo>
+                <a:cubicBezTo>
+                  <a:pt x="4668929" y="1045156"/>
+                  <a:pt x="4959047" y="2189404"/>
+                  <a:pt x="4959047" y="3429000"/>
+                </a:cubicBezTo>
+                <a:cubicBezTo>
+                  <a:pt x="4959047" y="4668597"/>
+                  <a:pt x="4668929" y="5812845"/>
+                  <a:pt x="4179024" y="6734633"/>
+                </a:cubicBezTo>
+                <a:lnTo>
+                  <a:pt x="4110127" y="6858000"/>
+                </a:lnTo>
+                <a:lnTo>
+                  <a:pt x="0" y="6858000"/>
+                </a:lnTo>
+                <a:close/>
+              </a:path>
+            </a:pathLst>
+          </a:custGeom>
+          <a:ln w="9525">
+            <a:solidFill>
+              <a:srgbClr val="E6E6E6"/>
+            </a:solidFill>
+          </a:ln>
+          <a:effectLst>
+            <a:outerShdw blurRad="76200" dist="38100" algn="l" rotWithShape="0">
+              <a:schemeClr val="bg1">
+                <a:lumMod val="85000"/>
+                <a:alpha val="50000"/>
+              </a:schemeClr>
+            </a:outerShdw>
+          </a:effectLst>
+        </p:spPr>
+        <p:style>
+          <a:lnRef idx="2">
+            <a:schemeClr val="accent1">
+              <a:shade val="50000"/>
+            </a:schemeClr>
+          </a:lnRef>
+          <a:fillRef idx="1">
+            <a:schemeClr val="accent1"/>
+          </a:fillRef>
+          <a:effectRef idx="0">
+            <a:schemeClr val="accent1"/>
+          </a:effectRef>
+          <a:fontRef idx="minor">
+            <a:schemeClr val="lt1"/>
+          </a:fontRef>
+        </p:style>
+        <p:txBody>
+          <a:bodyPr wrap="square" rtlCol="0" anchor="ctr">
+            <a:noAutofit/>
+          </a:bodyPr>
+          <a:lstStyle/>
+          <a:p>
+            <a:pPr marL="0" marR="0" lvl="0" indent="0" algn="ctr" defTabSz="914400" rtl="0" eaLnBrk="1" fontAlgn="auto" latinLnBrk="0" hangingPunct="1">
+              <a:lnSpc>
+                <a:spcPct val="100000"/>
+              </a:lnSpc>
+              <a:spcBef>
+                <a:spcPts val="0"/>
+              </a:spcBef>
+              <a:spcAft>
+                <a:spcPts val="0"/>
+              </a:spcAft>
+              <a:buClrTx/>
+              <a:buSzTx/>
+              <a:buFontTx/>
+              <a:buNone/>
+              <a:tabLst/>
+              <a:defRPr/>
+            </a:pPr>
+            <a:endParaRPr kumimoji="0" lang="en-US" sz="1800" b="0" i="0" u="none" strike="noStrike" kern="1200" cap="none" spc="0" normalizeH="0" baseline="0" noProof="0">
+              <a:ln>
+                <a:noFill/>
+              </a:ln>
+              <a:solidFill>
+                <a:prstClr val="white"/>
+              </a:solidFill>
+              <a:effectLst/>
+              <a:uLnTx/>
+              <a:uFillTx/>
+              <a:latin typeface="Calibri" panose="020F0502020204030204"/>
+              <a:ea typeface="+mn-ea"/>
+              <a:cs typeface="+mn-cs"/>
+            </a:endParaRPr>
+          </a:p>
+        </p:txBody>
+      </p:sp>
+      <p:sp useBgFill="1">
+        <p:nvSpPr>
+          <p:cNvPr id="14" name="Freeform: Shape 13">
+            <a:extLst>
+              <a:ext uri="{FF2B5EF4-FFF2-40B4-BE49-F238E27FC236}">
+                <a16:creationId xmlns:a16="http://schemas.microsoft.com/office/drawing/2014/main" id="{84D4DDB8-B68F-45B0-9F62-C4279996F672}"/>
+              </a:ext>
+              <a:ext uri="{C183D7F6-B498-43B3-948B-1728B52AA6E4}">
+                <adec:decorative xmlns:adec="http://schemas.microsoft.com/office/drawing/2017/decorative" val="1"/>
+              </a:ext>
+            </a:extLst>
+          </p:cNvPr>
+          <p:cNvSpPr>
+            <a:spLocks noGrp="1" noRot="1" noChangeAspect="1" noMove="1" noResize="1" noEditPoints="1" noAdjustHandles="1" noChangeArrowheads="1" noChangeShapeType="1" noTextEdit="1"/>
+          </p:cNvSpPr>
+          <p:nvPr>
+            <p:extLst>
+              <p:ext uri="{386F3935-93C4-4BCD-93E2-E3B085C9AB24}">
+                <p16:designElem xmlns:p16="http://schemas.microsoft.com/office/powerpoint/2015/main" val="1"/>
+              </p:ext>
+            </p:extLst>
+          </p:nvPr>
+        </p:nvSpPr>
+        <p:spPr>
+          <a:xfrm>
+            <a:off x="0" y="0"/>
+            <a:ext cx="4948887" cy="6858000"/>
+          </a:xfrm>
+          <a:custGeom>
+            <a:avLst/>
+            <a:gdLst>
+              <a:gd name="connsiteX0" fmla="*/ 0 w 4948887"/>
+              <a:gd name="connsiteY0" fmla="*/ 0 h 6858000"/>
+              <a:gd name="connsiteX1" fmla="*/ 4099967 w 4948887"/>
+              <a:gd name="connsiteY1" fmla="*/ 0 h 6858000"/>
+              <a:gd name="connsiteX2" fmla="*/ 4168864 w 4948887"/>
+              <a:gd name="connsiteY2" fmla="*/ 123368 h 6858000"/>
+              <a:gd name="connsiteX3" fmla="*/ 4948887 w 4948887"/>
+              <a:gd name="connsiteY3" fmla="*/ 3429000 h 6858000"/>
+              <a:gd name="connsiteX4" fmla="*/ 4168864 w 4948887"/>
+              <a:gd name="connsiteY4" fmla="*/ 6734633 h 6858000"/>
+              <a:gd name="connsiteX5" fmla="*/ 4099967 w 4948887"/>
+              <a:gd name="connsiteY5" fmla="*/ 6858000 h 6858000"/>
+              <a:gd name="connsiteX6" fmla="*/ 0 w 4948887"/>
+              <a:gd name="connsiteY6" fmla="*/ 6858000 h 6858000"/>
+            </a:gdLst>
+            <a:ahLst/>
+            <a:cxnLst>
+              <a:cxn ang="0">
+                <a:pos x="connsiteX0" y="connsiteY0"/>
+              </a:cxn>
+              <a:cxn ang="0">
+                <a:pos x="connsiteX1" y="connsiteY1"/>
+              </a:cxn>
+              <a:cxn ang="0">
+                <a:pos x="connsiteX2" y="connsiteY2"/>
+              </a:cxn>
+              <a:cxn ang="0">
+                <a:pos x="connsiteX3" y="connsiteY3"/>
+              </a:cxn>
+              <a:cxn ang="0">
+                <a:pos x="connsiteX4" y="connsiteY4"/>
+              </a:cxn>
+              <a:cxn ang="0">
+                <a:pos x="connsiteX5" y="connsiteY5"/>
+              </a:cxn>
+              <a:cxn ang="0">
+                <a:pos x="connsiteX6" y="connsiteY6"/>
+              </a:cxn>
+            </a:cxnLst>
+            <a:rect l="l" t="t" r="r" b="b"/>
+            <a:pathLst>
+              <a:path w="4948887" h="6858000">
+                <a:moveTo>
+                  <a:pt x="0" y="0"/>
+                </a:moveTo>
+                <a:lnTo>
+                  <a:pt x="4099967" y="0"/>
+                </a:lnTo>
+                <a:lnTo>
+                  <a:pt x="4168864" y="123368"/>
+                </a:lnTo>
+                <a:cubicBezTo>
+                  <a:pt x="4658769" y="1045156"/>
+                  <a:pt x="4948887" y="2189404"/>
+                  <a:pt x="4948887" y="3429000"/>
+                </a:cubicBezTo>
+                <a:cubicBezTo>
+                  <a:pt x="4948887" y="4668597"/>
+                  <a:pt x="4658769" y="5812845"/>
+                  <a:pt x="4168864" y="6734633"/>
+                </a:cubicBezTo>
+                <a:lnTo>
+                  <a:pt x="4099967" y="6858000"/>
+                </a:lnTo>
+                <a:lnTo>
+                  <a:pt x="0" y="6858000"/>
+                </a:lnTo>
+                <a:close/>
+              </a:path>
+            </a:pathLst>
+          </a:custGeom>
+          <a:ln w="9525">
+            <a:noFill/>
+          </a:ln>
+          <a:effectLst/>
+        </p:spPr>
+        <p:style>
+          <a:lnRef idx="2">
+            <a:schemeClr val="accent1">
+              <a:shade val="50000"/>
+            </a:schemeClr>
+          </a:lnRef>
+          <a:fillRef idx="1">
+            <a:schemeClr val="accent1"/>
+          </a:fillRef>
+          <a:effectRef idx="0">
+            <a:schemeClr val="accent1"/>
+          </a:effectRef>
+          <a:fontRef idx="minor">
+            <a:schemeClr val="lt1"/>
+          </a:fontRef>
+        </p:style>
+        <p:txBody>
+          <a:bodyPr wrap="square" rtlCol="0" anchor="ctr">
+            <a:noAutofit/>
+          </a:bodyPr>
+          <a:lstStyle/>
+          <a:p>
+            <a:pPr marL="0" marR="0" lvl="0" indent="0" algn="ctr" defTabSz="914400" rtl="0" eaLnBrk="1" fontAlgn="auto" latinLnBrk="0" hangingPunct="1">
+              <a:lnSpc>
+                <a:spcPct val="100000"/>
+              </a:lnSpc>
+              <a:spcBef>
+                <a:spcPts val="0"/>
+              </a:spcBef>
+              <a:spcAft>
+                <a:spcPts val="0"/>
+              </a:spcAft>
+              <a:buClrTx/>
+              <a:buSzTx/>
+              <a:buFontTx/>
+              <a:buNone/>
+              <a:tabLst/>
+              <a:defRPr/>
+            </a:pPr>
+            <a:endParaRPr kumimoji="0" lang="en-US" sz="1800" b="0" i="0" u="none" strike="noStrike" kern="1200" cap="none" spc="0" normalizeH="0" baseline="0" noProof="0">
+              <a:ln>
+                <a:noFill/>
+              </a:ln>
+              <a:solidFill>
+                <a:prstClr val="white"/>
+              </a:solidFill>
+              <a:effectLst/>
+              <a:uLnTx/>
+              <a:uFillTx/>
+              <a:latin typeface="Calibri" panose="020F0502020204030204"/>
+              <a:ea typeface="+mn-ea"/>
+              <a:cs typeface="+mn-cs"/>
+            </a:endParaRPr>
+          </a:p>
+        </p:txBody>
+      </p:sp>
+      <p:sp>
+        <p:nvSpPr>
+          <p:cNvPr id="2" name="Title 1">
+            <a:extLst>
+              <a:ext uri="{FF2B5EF4-FFF2-40B4-BE49-F238E27FC236}">
+                <a16:creationId xmlns:a16="http://schemas.microsoft.com/office/drawing/2014/main" id="{433F3966-12F0-DD61-965B-208AF4F973F0}"/>
+              </a:ext>
+            </a:extLst>
+          </p:cNvPr>
+          <p:cNvSpPr>
+            <a:spLocks noGrp="1"/>
+          </p:cNvSpPr>
+          <p:nvPr>
+            <p:ph type="title"/>
+          </p:nvPr>
+        </p:nvSpPr>
+        <p:spPr>
+          <a:xfrm>
+            <a:off x="477981" y="1122363"/>
+            <a:ext cx="4023360" cy="3204134"/>
+          </a:xfrm>
+        </p:spPr>
+        <p:txBody>
+          <a:bodyPr vert="horz" lIns="91440" tIns="45720" rIns="91440" bIns="45720" rtlCol="0" anchor="b">
+            <a:normAutofit/>
+          </a:bodyPr>
+          <a:lstStyle/>
+          <a:p>
+            <a:r>
+              <a:rPr lang="en-US" sz="4800" kern="1200">
+                <a:solidFill>
+                  <a:schemeClr val="tx1"/>
+                </a:solidFill>
+                <a:latin typeface="+mj-lt"/>
+                <a:ea typeface="+mj-ea"/>
+                <a:cs typeface="+mj-cs"/>
+              </a:rPr>
+              <a:t>Methodology </a:t>
+            </a:r>
+          </a:p>
+        </p:txBody>
+      </p:sp>
+      <p:sp>
+        <p:nvSpPr>
+          <p:cNvPr id="16" name="Rectangle 15">
+            <a:extLst>
+              <a:ext uri="{FF2B5EF4-FFF2-40B4-BE49-F238E27FC236}">
+                <a16:creationId xmlns:a16="http://schemas.microsoft.com/office/drawing/2014/main" id="{AF2F604E-43BE-4DC3-B983-E071523364F8}"/>
+              </a:ext>
+              <a:ext uri="{C183D7F6-B498-43B3-948B-1728B52AA6E4}">
+                <adec:decorative xmlns:adec="http://schemas.microsoft.com/office/drawing/2017/decorative" val="1"/>
+              </a:ext>
+            </a:extLst>
+          </p:cNvPr>
+          <p:cNvSpPr>
+            <a:spLocks noGrp="1" noRot="1" noChangeAspect="1" noMove="1" noResize="1" noEditPoints="1" noAdjustHandles="1" noChangeArrowheads="1" noChangeShapeType="1" noTextEdit="1"/>
+          </p:cNvSpPr>
+          <p:nvPr>
+            <p:extLst>
+              <p:ext uri="{386F3935-93C4-4BCD-93E2-E3B085C9AB24}">
+                <p16:designElem xmlns:p16="http://schemas.microsoft.com/office/powerpoint/2015/main" val="1"/>
+              </p:ext>
+            </p:extLst>
+          </p:nvPr>
+        </p:nvSpPr>
+        <p:spPr>
+          <a:xfrm rot="5400000">
+            <a:off x="759921" y="346791"/>
+            <a:ext cx="146304" cy="704088"/>
+          </a:xfrm>
+          <a:prstGeom prst="rect">
+            <a:avLst/>
+          </a:prstGeom>
+          <a:solidFill>
+            <a:schemeClr val="accent2"/>
+          </a:solidFill>
+          <a:ln>
+            <a:noFill/>
+          </a:ln>
+        </p:spPr>
+        <p:style>
+          <a:lnRef idx="2">
+            <a:schemeClr val="accent1">
+              <a:shade val="50000"/>
+            </a:schemeClr>
+          </a:lnRef>
+          <a:fillRef idx="1">
+            <a:schemeClr val="accent1"/>
+          </a:fillRef>
+          <a:effectRef idx="0">
+            <a:schemeClr val="accent1"/>
+          </a:effectRef>
+          <a:fontRef idx="minor">
+            <a:schemeClr val="lt1"/>
+          </a:fontRef>
+        </p:style>
+        <p:txBody>
+          <a:bodyPr rtlCol="0" anchor="ctr"/>
+          <a:lstStyle/>
+          <a:p>
+            <a:pPr algn="ctr"/>
+            <a:endParaRPr lang="en-US">
+              <a:solidFill>
+                <a:prstClr val="white"/>
+              </a:solidFill>
+              <a:latin typeface="Calibri" panose="020F0502020204030204"/>
+            </a:endParaRPr>
+          </a:p>
+        </p:txBody>
+      </p:sp>
+      <p:sp>
+        <p:nvSpPr>
+          <p:cNvPr id="18" name="Rectangle 17">
+            <a:extLst>
+              <a:ext uri="{FF2B5EF4-FFF2-40B4-BE49-F238E27FC236}">
+                <a16:creationId xmlns:a16="http://schemas.microsoft.com/office/drawing/2014/main" id="{08C9B587-E65E-4B52-B37C-ABEBB6E87928}"/>
+              </a:ext>
+              <a:ext uri="{C183D7F6-B498-43B3-948B-1728B52AA6E4}">
+                <adec:decorative xmlns:adec="http://schemas.microsoft.com/office/drawing/2017/decorative" val="1"/>
+              </a:ext>
+            </a:extLst>
+          </p:cNvPr>
+          <p:cNvSpPr>
+            <a:spLocks noGrp="1" noRot="1" noChangeAspect="1" noMove="1" noResize="1" noEditPoints="1" noAdjustHandles="1" noChangeArrowheads="1" noChangeShapeType="1" noTextEdit="1"/>
+          </p:cNvSpPr>
+          <p:nvPr>
+            <p:extLst>
+              <p:ext uri="{386F3935-93C4-4BCD-93E2-E3B085C9AB24}">
+                <p16:designElem xmlns:p16="http://schemas.microsoft.com/office/powerpoint/2015/main" val="1"/>
+              </p:ext>
+            </p:extLst>
+          </p:nvPr>
+        </p:nvSpPr>
+        <p:spPr>
+          <a:xfrm>
+            <a:off x="481029" y="4546920"/>
+            <a:ext cx="4023360" cy="18288"/>
+          </a:xfrm>
+          <a:prstGeom prst="rect">
+            <a:avLst/>
+          </a:prstGeom>
+          <a:solidFill>
+            <a:srgbClr val="D5D5D5"/>
+          </a:solidFill>
+          <a:ln w="3175">
+            <a:noFill/>
+          </a:ln>
+          <a:effectLst/>
+        </p:spPr>
+        <p:style>
+          <a:lnRef idx="2">
+            <a:schemeClr val="accent1">
+              <a:shade val="50000"/>
+            </a:schemeClr>
+          </a:lnRef>
+          <a:fillRef idx="1">
+            <a:schemeClr val="accent1"/>
+          </a:fillRef>
+          <a:effectRef idx="0">
+            <a:schemeClr val="accent1"/>
+          </a:effectRef>
+          <a:fontRef idx="minor">
+            <a:schemeClr val="lt1"/>
+          </a:fontRef>
+        </p:style>
+        <p:txBody>
+          <a:bodyPr rtlCol="0" anchor="ctr"/>
+          <a:lstStyle/>
+          <a:p>
+            <a:pPr marL="0" marR="0" lvl="0" indent="0" algn="ctr" defTabSz="914400" rtl="0" eaLnBrk="1" fontAlgn="auto" latinLnBrk="0" hangingPunct="1">
+              <a:lnSpc>
+                <a:spcPct val="100000"/>
+              </a:lnSpc>
+              <a:spcBef>
+                <a:spcPts val="0"/>
+              </a:spcBef>
+              <a:spcAft>
+                <a:spcPts val="0"/>
+              </a:spcAft>
+              <a:buClrTx/>
+              <a:buSzTx/>
+              <a:buFontTx/>
+              <a:buNone/>
+              <a:tabLst/>
+              <a:defRPr/>
+            </a:pPr>
+            <a:endParaRPr kumimoji="0" lang="en-US" sz="1800" b="0" i="0" u="none" strike="noStrike" kern="1200" cap="none" spc="0" normalizeH="0" baseline="0" noProof="0">
+              <a:ln>
+                <a:noFill/>
+              </a:ln>
+              <a:solidFill>
+                <a:prstClr val="white"/>
+              </a:solidFill>
+              <a:effectLst/>
+              <a:uLnTx/>
+              <a:uFillTx/>
+              <a:latin typeface="Calibri" panose="020F0502020204030204"/>
+              <a:ea typeface="+mn-ea"/>
+              <a:cs typeface="+mn-cs"/>
+            </a:endParaRPr>
+          </a:p>
+        </p:txBody>
+      </p:sp>
+      <p:pic>
+        <p:nvPicPr>
+          <p:cNvPr id="4" name="Picture 3">
+            <a:extLst>
+              <a:ext uri="{FF2B5EF4-FFF2-40B4-BE49-F238E27FC236}">
+                <a16:creationId xmlns:a16="http://schemas.microsoft.com/office/drawing/2014/main" id="{0968A508-923E-2020-79E7-DE71E6B39CCF}"/>
+              </a:ext>
+            </a:extLst>
+          </p:cNvPr>
+          <p:cNvPicPr>
+            <a:picLocks noChangeAspect="1"/>
+          </p:cNvPicPr>
+          <p:nvPr/>
+        </p:nvPicPr>
+        <p:blipFill>
+          <a:blip r:embed="rId2"/>
+          <a:stretch>
+            <a:fillRect/>
+          </a:stretch>
+        </p:blipFill>
+        <p:spPr>
+          <a:xfrm>
+            <a:off x="5403255" y="942166"/>
+            <a:ext cx="3172268" cy="3982006"/>
+          </a:xfrm>
+          <a:prstGeom prst="rect">
+            <a:avLst/>
+          </a:prstGeom>
+        </p:spPr>
+      </p:pic>
+      <p:pic>
+        <p:nvPicPr>
+          <p:cNvPr id="7" name="Picture 6">
+            <a:extLst>
+              <a:ext uri="{FF2B5EF4-FFF2-40B4-BE49-F238E27FC236}">
+                <a16:creationId xmlns:a16="http://schemas.microsoft.com/office/drawing/2014/main" id="{09BF6C36-7479-939B-FC64-1CB42D5BA39E}"/>
+              </a:ext>
+            </a:extLst>
+          </p:cNvPr>
+          <p:cNvPicPr>
+            <a:picLocks noChangeAspect="1"/>
+          </p:cNvPicPr>
+          <p:nvPr/>
+        </p:nvPicPr>
+        <p:blipFill>
+          <a:blip r:embed="rId3"/>
+          <a:stretch>
+            <a:fillRect/>
+          </a:stretch>
+        </p:blipFill>
+        <p:spPr>
+          <a:xfrm>
+            <a:off x="8575523" y="235884"/>
+            <a:ext cx="3181794" cy="2124371"/>
+          </a:xfrm>
+          <a:prstGeom prst="rect">
+            <a:avLst/>
+          </a:prstGeom>
+        </p:spPr>
+      </p:pic>
+      <p:pic>
+        <p:nvPicPr>
+          <p:cNvPr id="9" name="Picture 8">
+            <a:extLst>
+              <a:ext uri="{FF2B5EF4-FFF2-40B4-BE49-F238E27FC236}">
+                <a16:creationId xmlns:a16="http://schemas.microsoft.com/office/drawing/2014/main" id="{8B6326A5-E19E-E5BB-EC04-0AA122D958EB}"/>
+              </a:ext>
+            </a:extLst>
+          </p:cNvPr>
+          <p:cNvPicPr>
+            <a:picLocks noChangeAspect="1"/>
+          </p:cNvPicPr>
+          <p:nvPr/>
+        </p:nvPicPr>
+        <p:blipFill>
+          <a:blip r:embed="rId4"/>
+          <a:stretch>
+            <a:fillRect/>
+          </a:stretch>
+        </p:blipFill>
+        <p:spPr>
+          <a:xfrm>
+            <a:off x="8604102" y="3871512"/>
+            <a:ext cx="3124636" cy="2105319"/>
+          </a:xfrm>
+          <a:prstGeom prst="rect">
+            <a:avLst/>
+          </a:prstGeom>
+        </p:spPr>
+      </p:pic>
+    </p:spTree>
+    <p:extLst>
+      <p:ext uri="{BB962C8B-B14F-4D97-AF65-F5344CB8AC3E}">
+        <p14:creationId xmlns:p14="http://schemas.microsoft.com/office/powerpoint/2010/main" val="2211308721"/>
+      </p:ext>
+    </p:extLst>
+  </p:cSld>
+  <p:clrMapOvr>
+    <a:masterClrMapping/>
+  </p:clrMapOvr>
+</p:sld>
+</file>
+
+<file path=ppt/slides/slide8.xml><?xml version="1.0" encoding="utf-8"?>
+<p:sld xmlns:a="http://schemas.openxmlformats.org/drawingml/2006/main" xmlns:r="http://schemas.openxmlformats.org/officeDocument/2006/relationships" xmlns:p="http://schemas.openxmlformats.org/presentationml/2006/main">
+  <p:cSld>
+    <p:bg>
+      <p:bgPr>
+        <a:solidFill>
+          <a:schemeClr val="bg1"/>
+        </a:solidFill>
+        <a:effectLst/>
+      </p:bgPr>
+    </p:bg>
+    <p:spTree>
+      <p:nvGrpSpPr>
+        <p:cNvPr id="1" name=""/>
+        <p:cNvGrpSpPr/>
+        <p:nvPr/>
+      </p:nvGrpSpPr>
+      <p:grpSpPr>
+        <a:xfrm>
+          <a:off x="0" y="0"/>
+          <a:ext cx="0" cy="0"/>
+          <a:chOff x="0" y="0"/>
+          <a:chExt cx="0" cy="0"/>
+        </a:xfrm>
+      </p:grpSpPr>
+      <p:sp useBgFill="1">
+        <p:nvSpPr>
+          <p:cNvPr id="3079" name="Rectangle 3078">
+            <a:extLst>
+              <a:ext uri="{FF2B5EF4-FFF2-40B4-BE49-F238E27FC236}">
+                <a16:creationId xmlns:a16="http://schemas.microsoft.com/office/drawing/2014/main" id="{E51BA4DF-2BD4-4EC2-B1DB-B27C8AC71864}"/>
+              </a:ext>
+              <a:ext uri="{C183D7F6-B498-43B3-948B-1728B52AA6E4}">
+                <adec:decorative xmlns:adec="http://schemas.microsoft.com/office/drawing/2017/decorative" val="1"/>
+              </a:ext>
+            </a:extLst>
+          </p:cNvPr>
+          <p:cNvSpPr>
+            <a:spLocks noGrp="1" noRot="1" noChangeAspect="1" noMove="1" noResize="1" noEditPoints="1" noAdjustHandles="1" noChangeArrowheads="1" noChangeShapeType="1" noTextEdit="1"/>
+          </p:cNvSpPr>
+          <p:nvPr>
+            <p:extLst>
+              <p:ext uri="{386F3935-93C4-4BCD-93E2-E3B085C9AB24}">
+                <p16:designElem xmlns:p16="http://schemas.microsoft.com/office/powerpoint/2015/main" val="1"/>
+              </p:ext>
+            </p:extLst>
+          </p:nvPr>
+        </p:nvSpPr>
+        <p:spPr>
+          <a:xfrm>
+            <a:off x="-1" y="0"/>
             <a:ext cx="12188952" cy="6858000"/>
           </a:xfrm>
           <a:prstGeom prst="rect">
@@ -10467,12 +13412,47 @@
           </a:p>
         </p:txBody>
       </p:sp>
+      <p:sp>
+        <p:nvSpPr>
+          <p:cNvPr id="2" name="Title 1">
+            <a:extLst>
+              <a:ext uri="{FF2B5EF4-FFF2-40B4-BE49-F238E27FC236}">
+                <a16:creationId xmlns:a16="http://schemas.microsoft.com/office/drawing/2014/main" id="{4C812F6C-7AC4-9905-0E26-302DB45DCF3B}"/>
+              </a:ext>
+            </a:extLst>
+          </p:cNvPr>
+          <p:cNvSpPr>
+            <a:spLocks noGrp="1"/>
+          </p:cNvSpPr>
+          <p:nvPr>
+            <p:ph type="title"/>
+          </p:nvPr>
+        </p:nvSpPr>
+        <p:spPr>
+          <a:xfrm>
+            <a:off x="4553733" y="548464"/>
+            <a:ext cx="6798541" cy="1675623"/>
+          </a:xfrm>
+        </p:spPr>
+        <p:txBody>
+          <a:bodyPr anchor="b">
+            <a:normAutofit/>
+          </a:bodyPr>
+          <a:lstStyle/>
+          <a:p>
+            <a:r>
+              <a:rPr lang="en-US" sz="4000" dirty="0"/>
+              <a:t>Results</a:t>
+            </a:r>
+          </a:p>
+        </p:txBody>
+      </p:sp>
       <p:pic>
         <p:nvPicPr>
-          <p:cNvPr id="4098" name="Picture 2" descr="Blockchain Without Cryptocurrencies | Application Of Blockchain ...">
+          <p:cNvPr id="3074" name="Picture 2" descr="How blockchain can make trade safer - Beyond Borders">
             <a:extLst>
               <a:ext uri="{FF2B5EF4-FFF2-40B4-BE49-F238E27FC236}">
-                <a16:creationId xmlns:a16="http://schemas.microsoft.com/office/drawing/2014/main" id="{CCD245A9-AB93-38B5-078A-65C3F1C3B743}"/>
+                <a16:creationId xmlns:a16="http://schemas.microsoft.com/office/drawing/2014/main" id="{26AC6485-73B0-9E1C-1A2F-AA1E4CB87F96}"/>
               </a:ext>
             </a:extLst>
           </p:cNvPr>
@@ -10482,25 +13462,26 @@
           <p:nvPr/>
         </p:nvPicPr>
         <p:blipFill rotWithShape="1">
-          <a:blip r:embed="rId3">
+          <a:blip r:embed="rId2">
             <a:extLst>
               <a:ext uri="{28A0092B-C50C-407E-A947-70E740481C1C}">
                 <a14:useLocalDpi xmlns:a14="http://schemas.microsoft.com/office/drawing/2010/main" val="0"/>
               </a:ext>
             </a:extLst>
           </a:blip>
-          <a:srcRect l="9727" r="10962"/>
+          <a:srcRect l="13937" r="14158" b="1"/>
           <a:stretch/>
         </p:blipFill>
         <p:spPr bwMode="auto">
-          <a:xfrm>
-            <a:off x="2522356" y="10"/>
-            <a:ext cx="9669642" cy="6857990"/>
+          <a:xfrm rot="5400000">
+            <a:off x="-1330751" y="1330752"/>
+            <a:ext cx="6858000" cy="4196496"/>
           </a:xfrm>
           <a:prstGeom prst="rect">
             <a:avLst/>
           </a:prstGeom>
           <a:noFill/>
+          <a:effectLst/>
           <a:extLst>
             <a:ext uri="{909E8E84-426E-40DD-AFC4-6F175D3DCCD1}">
               <a14:hiddenFill xmlns:a14="http://schemas.microsoft.com/office/drawing/2010/main">
@@ -10514,10 +13495,120 @@
       </p:pic>
       <p:sp>
         <p:nvSpPr>
-          <p:cNvPr id="4105" name="Rectangle 4104">
+          <p:cNvPr id="3" name="Content Placeholder 2">
             <a:extLst>
               <a:ext uri="{FF2B5EF4-FFF2-40B4-BE49-F238E27FC236}">
-                <a16:creationId xmlns:a16="http://schemas.microsoft.com/office/drawing/2014/main" id="{D1EA859B-E555-4109-94F3-6700E046E008}"/>
+                <a16:creationId xmlns:a16="http://schemas.microsoft.com/office/drawing/2014/main" id="{A3397183-8953-BA1E-3E34-8860C9D92078}"/>
+              </a:ext>
+            </a:extLst>
+          </p:cNvPr>
+          <p:cNvSpPr>
+            <a:spLocks noGrp="1"/>
+          </p:cNvSpPr>
+          <p:nvPr>
+            <p:ph idx="1"/>
+          </p:nvPr>
+        </p:nvSpPr>
+        <p:spPr>
+          <a:xfrm>
+            <a:off x="4553734" y="2409830"/>
+            <a:ext cx="6798539" cy="3705217"/>
+          </a:xfrm>
+        </p:spPr>
+        <p:txBody>
+          <a:bodyPr>
+            <a:normAutofit/>
+          </a:bodyPr>
+          <a:lstStyle/>
+          <a:p>
+            <a:pPr marL="0" indent="0">
+              <a:buNone/>
+            </a:pPr>
+            <a:r>
+              <a:rPr lang="en-US" sz="1800" b="0" i="0" u="none" strike="noStrike" baseline="0" dirty="0">
+                <a:latin typeface="NimbusRomNo9L-ReguItal"/>
+              </a:rPr>
+              <a:t>Python code generated plots available on </a:t>
+            </a:r>
+            <a:r>
+              <a:rPr lang="en-US" sz="1800" b="0" i="0" u="none" strike="noStrike" baseline="0" dirty="0" err="1">
+                <a:latin typeface="NimbusRomNo9L-ReguItal"/>
+              </a:rPr>
+              <a:t>github</a:t>
+            </a:r>
+            <a:r>
+              <a:rPr lang="en-US" sz="1800" b="0" i="0" u="none" strike="noStrike" baseline="0" dirty="0">
+                <a:latin typeface="NimbusRomNo9L-ReguItal"/>
+              </a:rPr>
+              <a:t>:</a:t>
+            </a:r>
+          </a:p>
+          <a:p>
+            <a:pPr marL="0" indent="0">
+              <a:buNone/>
+            </a:pPr>
+            <a:r>
+              <a:rPr lang="en-US" sz="2000" dirty="0">
+                <a:hlinkClick r:id="rId3"/>
+              </a:rPr>
+              <a:t>https://github.com/andrewqsmith/Block-Size-Optimization-for-VBASBS-Queueing-Model-for-Blockchain/tree/main/GraphCode</a:t>
+            </a:r>
+            <a:endParaRPr lang="en-US" sz="1800" dirty="0">
+              <a:latin typeface="NimbusRomNo9L-ReguItal"/>
+            </a:endParaRPr>
+          </a:p>
+          <a:p>
+            <a:pPr marL="0" indent="0">
+              <a:buNone/>
+            </a:pPr>
+            <a:endParaRPr lang="en-US" sz="2000" dirty="0"/>
+          </a:p>
+        </p:txBody>
+      </p:sp>
+    </p:spTree>
+    <p:extLst>
+      <p:ext uri="{BB962C8B-B14F-4D97-AF65-F5344CB8AC3E}">
+        <p14:creationId xmlns:p14="http://schemas.microsoft.com/office/powerpoint/2010/main" val="2145009233"/>
+      </p:ext>
+    </p:extLst>
+  </p:cSld>
+  <p:clrMapOvr>
+    <a:masterClrMapping/>
+  </p:clrMapOvr>
+</p:sld>
+</file>
+
+<file path=ppt/slides/slide9.xml><?xml version="1.0" encoding="utf-8"?>
+<p:sld xmlns:a="http://schemas.openxmlformats.org/drawingml/2006/main" xmlns:r="http://schemas.openxmlformats.org/officeDocument/2006/relationships" xmlns:p="http://schemas.openxmlformats.org/presentationml/2006/main">
+  <p:cSld>
+    <p:bg>
+      <p:bgPr>
+        <a:solidFill>
+          <a:schemeClr val="bg1"/>
+        </a:solidFill>
+        <a:effectLst/>
+      </p:bgPr>
+    </p:bg>
+    <p:spTree>
+      <p:nvGrpSpPr>
+        <p:cNvPr id="1" name=""/>
+        <p:cNvGrpSpPr/>
+        <p:nvPr/>
+      </p:nvGrpSpPr>
+      <p:grpSpPr>
+        <a:xfrm>
+          <a:off x="0" y="0"/>
+          <a:ext cx="0" cy="0"/>
+          <a:chOff x="0" y="0"/>
+          <a:chExt cx="0" cy="0"/>
+        </a:xfrm>
+      </p:grpSpPr>
+      <p:sp useBgFill="1">
+        <p:nvSpPr>
+          <p:cNvPr id="10" name="Rectangle 9">
+            <a:extLst>
+              <a:ext uri="{FF2B5EF4-FFF2-40B4-BE49-F238E27FC236}">
+                <a16:creationId xmlns:a16="http://schemas.microsoft.com/office/drawing/2014/main" id="{5DCB5928-DC7D-4612-9922-441966E15627}"/>
               </a:ext>
               <a:ext uri="{C183D7F6-B498-43B3-948B-1728B52AA6E4}">
                 <adec:decorative xmlns:adec="http://schemas.microsoft.com/office/drawing/2017/decorative" val="1"/>
@@ -10537,38 +13628,12 @@
         </p:nvSpPr>
         <p:spPr>
           <a:xfrm>
-            <a:off x="-1" y="0"/>
-            <a:ext cx="7390263" cy="6858000"/>
+            <a:off x="0" y="0"/>
+            <a:ext cx="12192000" cy="6858000"/>
           </a:xfrm>
           <a:prstGeom prst="rect">
             <a:avLst/>
           </a:prstGeom>
-          <a:gradFill>
-            <a:gsLst>
-              <a:gs pos="48000">
-                <a:schemeClr val="bg1"/>
-              </a:gs>
-              <a:gs pos="35000">
-                <a:schemeClr val="bg1">
-                  <a:alpha val="77000"/>
-                </a:schemeClr>
-              </a:gs>
-              <a:gs pos="19000">
-                <a:schemeClr val="bg1">
-                  <a:alpha val="38000"/>
-                </a:schemeClr>
-              </a:gs>
-              <a:gs pos="0">
-                <a:schemeClr val="bg1">
-                  <a:alpha val="0"/>
-                </a:schemeClr>
-              </a:gs>
-              <a:gs pos="100000">
-                <a:schemeClr val="bg1"/>
-              </a:gs>
-            </a:gsLst>
-            <a:lin ang="10800000" scaled="0"/>
-          </a:gradFill>
           <a:ln>
             <a:noFill/>
           </a:ln>
@@ -10594,7 +13659,342 @@
           <a:lstStyle/>
           <a:p>
             <a:pPr algn="ctr"/>
-            <a:endParaRPr lang="en-US" dirty="0"/>
+            <a:endParaRPr lang="en-US"/>
+          </a:p>
+        </p:txBody>
+      </p:sp>
+      <p:sp useBgFill="1">
+        <p:nvSpPr>
+          <p:cNvPr id="12" name="Freeform: Shape 11">
+            <a:extLst>
+              <a:ext uri="{FF2B5EF4-FFF2-40B4-BE49-F238E27FC236}">
+                <a16:creationId xmlns:a16="http://schemas.microsoft.com/office/drawing/2014/main" id="{682C1161-1736-45EC-99B7-33F3CAE9D517}"/>
+              </a:ext>
+              <a:ext uri="{C183D7F6-B498-43B3-948B-1728B52AA6E4}">
+                <adec:decorative xmlns:adec="http://schemas.microsoft.com/office/drawing/2017/decorative" val="1"/>
+              </a:ext>
+            </a:extLst>
+          </p:cNvPr>
+          <p:cNvSpPr>
+            <a:spLocks noGrp="1" noRot="1" noChangeAspect="1" noMove="1" noResize="1" noEditPoints="1" noAdjustHandles="1" noChangeArrowheads="1" noChangeShapeType="1" noTextEdit="1"/>
+          </p:cNvSpPr>
+          <p:nvPr>
+            <p:extLst>
+              <p:ext uri="{386F3935-93C4-4BCD-93E2-E3B085C9AB24}">
+                <p16:designElem xmlns:p16="http://schemas.microsoft.com/office/powerpoint/2015/main" val="1"/>
+              </p:ext>
+            </p:extLst>
+          </p:nvPr>
+        </p:nvSpPr>
+        <p:spPr>
+          <a:xfrm>
+            <a:off x="0" y="0"/>
+            <a:ext cx="4959047" cy="6858000"/>
+          </a:xfrm>
+          <a:custGeom>
+            <a:avLst/>
+            <a:gdLst>
+              <a:gd name="connsiteX0" fmla="*/ 0 w 4959047"/>
+              <a:gd name="connsiteY0" fmla="*/ 0 h 6858000"/>
+              <a:gd name="connsiteX1" fmla="*/ 4110127 w 4959047"/>
+              <a:gd name="connsiteY1" fmla="*/ 0 h 6858000"/>
+              <a:gd name="connsiteX2" fmla="*/ 4179024 w 4959047"/>
+              <a:gd name="connsiteY2" fmla="*/ 123368 h 6858000"/>
+              <a:gd name="connsiteX3" fmla="*/ 4959047 w 4959047"/>
+              <a:gd name="connsiteY3" fmla="*/ 3429000 h 6858000"/>
+              <a:gd name="connsiteX4" fmla="*/ 4179024 w 4959047"/>
+              <a:gd name="connsiteY4" fmla="*/ 6734633 h 6858000"/>
+              <a:gd name="connsiteX5" fmla="*/ 4110127 w 4959047"/>
+              <a:gd name="connsiteY5" fmla="*/ 6858000 h 6858000"/>
+              <a:gd name="connsiteX6" fmla="*/ 0 w 4959047"/>
+              <a:gd name="connsiteY6" fmla="*/ 6858000 h 6858000"/>
+            </a:gdLst>
+            <a:ahLst/>
+            <a:cxnLst>
+              <a:cxn ang="0">
+                <a:pos x="connsiteX0" y="connsiteY0"/>
+              </a:cxn>
+              <a:cxn ang="0">
+                <a:pos x="connsiteX1" y="connsiteY1"/>
+              </a:cxn>
+              <a:cxn ang="0">
+                <a:pos x="connsiteX2" y="connsiteY2"/>
+              </a:cxn>
+              <a:cxn ang="0">
+                <a:pos x="connsiteX3" y="connsiteY3"/>
+              </a:cxn>
+              <a:cxn ang="0">
+                <a:pos x="connsiteX4" y="connsiteY4"/>
+              </a:cxn>
+              <a:cxn ang="0">
+                <a:pos x="connsiteX5" y="connsiteY5"/>
+              </a:cxn>
+              <a:cxn ang="0">
+                <a:pos x="connsiteX6" y="connsiteY6"/>
+              </a:cxn>
+            </a:cxnLst>
+            <a:rect l="l" t="t" r="r" b="b"/>
+            <a:pathLst>
+              <a:path w="4959047" h="6858000">
+                <a:moveTo>
+                  <a:pt x="0" y="0"/>
+                </a:moveTo>
+                <a:lnTo>
+                  <a:pt x="4110127" y="0"/>
+                </a:lnTo>
+                <a:lnTo>
+                  <a:pt x="4179024" y="123368"/>
+                </a:lnTo>
+                <a:cubicBezTo>
+                  <a:pt x="4668929" y="1045156"/>
+                  <a:pt x="4959047" y="2189404"/>
+                  <a:pt x="4959047" y="3429000"/>
+                </a:cubicBezTo>
+                <a:cubicBezTo>
+                  <a:pt x="4959047" y="4668597"/>
+                  <a:pt x="4668929" y="5812845"/>
+                  <a:pt x="4179024" y="6734633"/>
+                </a:cubicBezTo>
+                <a:lnTo>
+                  <a:pt x="4110127" y="6858000"/>
+                </a:lnTo>
+                <a:lnTo>
+                  <a:pt x="0" y="6858000"/>
+                </a:lnTo>
+                <a:close/>
+              </a:path>
+            </a:pathLst>
+          </a:custGeom>
+          <a:ln w="9525">
+            <a:solidFill>
+              <a:srgbClr val="E6E6E6"/>
+            </a:solidFill>
+          </a:ln>
+          <a:effectLst>
+            <a:outerShdw blurRad="76200" dist="38100" algn="l" rotWithShape="0">
+              <a:schemeClr val="bg1">
+                <a:lumMod val="85000"/>
+                <a:alpha val="50000"/>
+              </a:schemeClr>
+            </a:outerShdw>
+          </a:effectLst>
+        </p:spPr>
+        <p:style>
+          <a:lnRef idx="2">
+            <a:schemeClr val="accent1">
+              <a:shade val="50000"/>
+            </a:schemeClr>
+          </a:lnRef>
+          <a:fillRef idx="1">
+            <a:schemeClr val="accent1"/>
+          </a:fillRef>
+          <a:effectRef idx="0">
+            <a:schemeClr val="accent1"/>
+          </a:effectRef>
+          <a:fontRef idx="minor">
+            <a:schemeClr val="lt1"/>
+          </a:fontRef>
+        </p:style>
+        <p:txBody>
+          <a:bodyPr wrap="square" rtlCol="0" anchor="ctr">
+            <a:noAutofit/>
+          </a:bodyPr>
+          <a:lstStyle/>
+          <a:p>
+            <a:pPr marL="0" marR="0" lvl="0" indent="0" algn="ctr" defTabSz="914400" rtl="0" eaLnBrk="1" fontAlgn="auto" latinLnBrk="0" hangingPunct="1">
+              <a:lnSpc>
+                <a:spcPct val="100000"/>
+              </a:lnSpc>
+              <a:spcBef>
+                <a:spcPts val="0"/>
+              </a:spcBef>
+              <a:spcAft>
+                <a:spcPts val="0"/>
+              </a:spcAft>
+              <a:buClrTx/>
+              <a:buSzTx/>
+              <a:buFontTx/>
+              <a:buNone/>
+              <a:tabLst/>
+              <a:defRPr/>
+            </a:pPr>
+            <a:endParaRPr kumimoji="0" lang="en-US" sz="1800" b="0" i="0" u="none" strike="noStrike" kern="1200" cap="none" spc="0" normalizeH="0" baseline="0" noProof="0">
+              <a:ln>
+                <a:noFill/>
+              </a:ln>
+              <a:solidFill>
+                <a:prstClr val="white"/>
+              </a:solidFill>
+              <a:effectLst/>
+              <a:uLnTx/>
+              <a:uFillTx/>
+              <a:latin typeface="Calibri" panose="020F0502020204030204"/>
+              <a:ea typeface="+mn-ea"/>
+              <a:cs typeface="+mn-cs"/>
+            </a:endParaRPr>
+          </a:p>
+        </p:txBody>
+      </p:sp>
+      <p:sp useBgFill="1">
+        <p:nvSpPr>
+          <p:cNvPr id="14" name="Freeform: Shape 13">
+            <a:extLst>
+              <a:ext uri="{FF2B5EF4-FFF2-40B4-BE49-F238E27FC236}">
+                <a16:creationId xmlns:a16="http://schemas.microsoft.com/office/drawing/2014/main" id="{84D4DDB8-B68F-45B0-9F62-C4279996F672}"/>
+              </a:ext>
+              <a:ext uri="{C183D7F6-B498-43B3-948B-1728B52AA6E4}">
+                <adec:decorative xmlns:adec="http://schemas.microsoft.com/office/drawing/2017/decorative" val="1"/>
+              </a:ext>
+            </a:extLst>
+          </p:cNvPr>
+          <p:cNvSpPr>
+            <a:spLocks noGrp="1" noRot="1" noChangeAspect="1" noMove="1" noResize="1" noEditPoints="1" noAdjustHandles="1" noChangeArrowheads="1" noChangeShapeType="1" noTextEdit="1"/>
+          </p:cNvSpPr>
+          <p:nvPr>
+            <p:extLst>
+              <p:ext uri="{386F3935-93C4-4BCD-93E2-E3B085C9AB24}">
+                <p16:designElem xmlns:p16="http://schemas.microsoft.com/office/powerpoint/2015/main" val="1"/>
+              </p:ext>
+            </p:extLst>
+          </p:nvPr>
+        </p:nvSpPr>
+        <p:spPr>
+          <a:xfrm>
+            <a:off x="0" y="0"/>
+            <a:ext cx="4948887" cy="6858000"/>
+          </a:xfrm>
+          <a:custGeom>
+            <a:avLst/>
+            <a:gdLst>
+              <a:gd name="connsiteX0" fmla="*/ 0 w 4948887"/>
+              <a:gd name="connsiteY0" fmla="*/ 0 h 6858000"/>
+              <a:gd name="connsiteX1" fmla="*/ 4099967 w 4948887"/>
+              <a:gd name="connsiteY1" fmla="*/ 0 h 6858000"/>
+              <a:gd name="connsiteX2" fmla="*/ 4168864 w 4948887"/>
+              <a:gd name="connsiteY2" fmla="*/ 123368 h 6858000"/>
+              <a:gd name="connsiteX3" fmla="*/ 4948887 w 4948887"/>
+              <a:gd name="connsiteY3" fmla="*/ 3429000 h 6858000"/>
+              <a:gd name="connsiteX4" fmla="*/ 4168864 w 4948887"/>
+              <a:gd name="connsiteY4" fmla="*/ 6734633 h 6858000"/>
+              <a:gd name="connsiteX5" fmla="*/ 4099967 w 4948887"/>
+              <a:gd name="connsiteY5" fmla="*/ 6858000 h 6858000"/>
+              <a:gd name="connsiteX6" fmla="*/ 0 w 4948887"/>
+              <a:gd name="connsiteY6" fmla="*/ 6858000 h 6858000"/>
+            </a:gdLst>
+            <a:ahLst/>
+            <a:cxnLst>
+              <a:cxn ang="0">
+                <a:pos x="connsiteX0" y="connsiteY0"/>
+              </a:cxn>
+              <a:cxn ang="0">
+                <a:pos x="connsiteX1" y="connsiteY1"/>
+              </a:cxn>
+              <a:cxn ang="0">
+                <a:pos x="connsiteX2" y="connsiteY2"/>
+              </a:cxn>
+              <a:cxn ang="0">
+                <a:pos x="connsiteX3" y="connsiteY3"/>
+              </a:cxn>
+              <a:cxn ang="0">
+                <a:pos x="connsiteX4" y="connsiteY4"/>
+              </a:cxn>
+              <a:cxn ang="0">
+                <a:pos x="connsiteX5" y="connsiteY5"/>
+              </a:cxn>
+              <a:cxn ang="0">
+                <a:pos x="connsiteX6" y="connsiteY6"/>
+              </a:cxn>
+            </a:cxnLst>
+            <a:rect l="l" t="t" r="r" b="b"/>
+            <a:pathLst>
+              <a:path w="4948887" h="6858000">
+                <a:moveTo>
+                  <a:pt x="0" y="0"/>
+                </a:moveTo>
+                <a:lnTo>
+                  <a:pt x="4099967" y="0"/>
+                </a:lnTo>
+                <a:lnTo>
+                  <a:pt x="4168864" y="123368"/>
+                </a:lnTo>
+                <a:cubicBezTo>
+                  <a:pt x="4658769" y="1045156"/>
+                  <a:pt x="4948887" y="2189404"/>
+                  <a:pt x="4948887" y="3429000"/>
+                </a:cubicBezTo>
+                <a:cubicBezTo>
+                  <a:pt x="4948887" y="4668597"/>
+                  <a:pt x="4658769" y="5812845"/>
+                  <a:pt x="4168864" y="6734633"/>
+                </a:cubicBezTo>
+                <a:lnTo>
+                  <a:pt x="4099967" y="6858000"/>
+                </a:lnTo>
+                <a:lnTo>
+                  <a:pt x="0" y="6858000"/>
+                </a:lnTo>
+                <a:close/>
+              </a:path>
+            </a:pathLst>
+          </a:custGeom>
+          <a:ln w="9525">
+            <a:noFill/>
+          </a:ln>
+          <a:effectLst/>
+        </p:spPr>
+        <p:style>
+          <a:lnRef idx="2">
+            <a:schemeClr val="accent1">
+              <a:shade val="50000"/>
+            </a:schemeClr>
+          </a:lnRef>
+          <a:fillRef idx="1">
+            <a:schemeClr val="accent1"/>
+          </a:fillRef>
+          <a:effectRef idx="0">
+            <a:schemeClr val="accent1"/>
+          </a:effectRef>
+          <a:fontRef idx="minor">
+            <a:schemeClr val="lt1"/>
+          </a:fontRef>
+        </p:style>
+        <p:txBody>
+          <a:bodyPr wrap="square" rtlCol="0" anchor="ctr">
+            <a:noAutofit/>
+          </a:bodyPr>
+          <a:lstStyle/>
+          <a:p>
+            <a:pPr marL="0" marR="0" lvl="0" indent="0" algn="ctr" defTabSz="914400" rtl="0" eaLnBrk="1" fontAlgn="auto" latinLnBrk="0" hangingPunct="1">
+              <a:lnSpc>
+                <a:spcPct val="100000"/>
+              </a:lnSpc>
+              <a:spcBef>
+                <a:spcPts val="0"/>
+              </a:spcBef>
+              <a:spcAft>
+                <a:spcPts val="0"/>
+              </a:spcAft>
+              <a:buClrTx/>
+              <a:buSzTx/>
+              <a:buFontTx/>
+              <a:buNone/>
+              <a:tabLst/>
+              <a:defRPr/>
+            </a:pPr>
+            <a:endParaRPr kumimoji="0" lang="en-US" sz="1800" b="0" i="0" u="none" strike="noStrike" kern="1200" cap="none" spc="0" normalizeH="0" baseline="0" noProof="0">
+              <a:ln>
+                <a:noFill/>
+              </a:ln>
+              <a:solidFill>
+                <a:prstClr val="white"/>
+              </a:solidFill>
+              <a:effectLst/>
+              <a:uLnTx/>
+              <a:uFillTx/>
+              <a:latin typeface="Calibri" panose="020F0502020204030204"/>
+              <a:ea typeface="+mn-ea"/>
+              <a:cs typeface="+mn-cs"/>
+            </a:endParaRPr>
           </a:p>
         </p:txBody>
       </p:sp>
@@ -10603,7 +14003,7 @@
           <p:cNvPr id="2" name="Title 1">
             <a:extLst>
               <a:ext uri="{FF2B5EF4-FFF2-40B4-BE49-F238E27FC236}">
-                <a16:creationId xmlns:a16="http://schemas.microsoft.com/office/drawing/2014/main" id="{FDE60BE8-E5C4-D834-18F0-85A649B2A206}"/>
+                <a16:creationId xmlns:a16="http://schemas.microsoft.com/office/drawing/2014/main" id="{433F3966-12F0-DD61-965B-208AF4F973F0}"/>
               </a:ext>
             </a:extLst>
           </p:cNvPr>
@@ -10616,59 +14016,255 @@
         </p:nvSpPr>
         <p:spPr>
           <a:xfrm>
-            <a:off x="838200" y="365125"/>
-            <a:ext cx="3822189" cy="1899912"/>
+            <a:off x="477981" y="1122363"/>
+            <a:ext cx="4023360" cy="3204134"/>
           </a:xfrm>
         </p:spPr>
         <p:txBody>
-          <a:bodyPr>
+          <a:bodyPr vert="horz" lIns="91440" tIns="45720" rIns="91440" bIns="45720" rtlCol="0" anchor="b">
             <a:normAutofit/>
           </a:bodyPr>
           <a:lstStyle/>
           <a:p>
             <a:r>
-              <a:rPr lang="en-US" sz="4000"/>
-              <a:t>Conclusion</a:t>
+              <a:rPr lang="en-US" sz="4800" kern="1200" dirty="0">
+                <a:solidFill>
+                  <a:schemeClr val="tx1"/>
+                </a:solidFill>
+                <a:latin typeface="+mj-lt"/>
+                <a:ea typeface="+mj-ea"/>
+                <a:cs typeface="+mj-cs"/>
+              </a:rPr>
+              <a:t>Results </a:t>
             </a:r>
           </a:p>
         </p:txBody>
       </p:sp>
       <p:sp>
         <p:nvSpPr>
-          <p:cNvPr id="3" name="Content Placeholder 2">
+          <p:cNvPr id="16" name="Rectangle 15">
             <a:extLst>
               <a:ext uri="{FF2B5EF4-FFF2-40B4-BE49-F238E27FC236}">
-                <a16:creationId xmlns:a16="http://schemas.microsoft.com/office/drawing/2014/main" id="{D32B1F32-1F5E-7D73-9CAD-4ECA0C99BE69}"/>
+                <a16:creationId xmlns:a16="http://schemas.microsoft.com/office/drawing/2014/main" id="{AF2F604E-43BE-4DC3-B983-E071523364F8}"/>
+              </a:ext>
+              <a:ext uri="{C183D7F6-B498-43B3-948B-1728B52AA6E4}">
+                <adec:decorative xmlns:adec="http://schemas.microsoft.com/office/drawing/2017/decorative" val="1"/>
               </a:ext>
             </a:extLst>
           </p:cNvPr>
           <p:cNvSpPr>
-            <a:spLocks noGrp="1"/>
+            <a:spLocks noGrp="1" noRot="1" noChangeAspect="1" noMove="1" noResize="1" noEditPoints="1" noAdjustHandles="1" noChangeArrowheads="1" noChangeShapeType="1" noTextEdit="1"/>
           </p:cNvSpPr>
           <p:nvPr>
-            <p:ph idx="1"/>
+            <p:extLst>
+              <p:ext uri="{386F3935-93C4-4BCD-93E2-E3B085C9AB24}">
+                <p16:designElem xmlns:p16="http://schemas.microsoft.com/office/powerpoint/2015/main" val="1"/>
+              </p:ext>
+            </p:extLst>
+          </p:nvPr>
+        </p:nvSpPr>
+        <p:spPr>
+          <a:xfrm rot="5400000">
+            <a:off x="759921" y="346791"/>
+            <a:ext cx="146304" cy="704088"/>
+          </a:xfrm>
+          <a:prstGeom prst="rect">
+            <a:avLst/>
+          </a:prstGeom>
+          <a:solidFill>
+            <a:schemeClr val="accent2"/>
+          </a:solidFill>
+          <a:ln>
+            <a:noFill/>
+          </a:ln>
+        </p:spPr>
+        <p:style>
+          <a:lnRef idx="2">
+            <a:schemeClr val="accent1">
+              <a:shade val="50000"/>
+            </a:schemeClr>
+          </a:lnRef>
+          <a:fillRef idx="1">
+            <a:schemeClr val="accent1"/>
+          </a:fillRef>
+          <a:effectRef idx="0">
+            <a:schemeClr val="accent1"/>
+          </a:effectRef>
+          <a:fontRef idx="minor">
+            <a:schemeClr val="lt1"/>
+          </a:fontRef>
+        </p:style>
+        <p:txBody>
+          <a:bodyPr rtlCol="0" anchor="ctr"/>
+          <a:lstStyle/>
+          <a:p>
+            <a:pPr algn="ctr"/>
+            <a:endParaRPr lang="en-US">
+              <a:solidFill>
+                <a:prstClr val="white"/>
+              </a:solidFill>
+              <a:latin typeface="Calibri" panose="020F0502020204030204"/>
+            </a:endParaRPr>
+          </a:p>
+        </p:txBody>
+      </p:sp>
+      <p:sp>
+        <p:nvSpPr>
+          <p:cNvPr id="18" name="Rectangle 17">
+            <a:extLst>
+              <a:ext uri="{FF2B5EF4-FFF2-40B4-BE49-F238E27FC236}">
+                <a16:creationId xmlns:a16="http://schemas.microsoft.com/office/drawing/2014/main" id="{08C9B587-E65E-4B52-B37C-ABEBB6E87928}"/>
+              </a:ext>
+              <a:ext uri="{C183D7F6-B498-43B3-948B-1728B52AA6E4}">
+                <adec:decorative xmlns:adec="http://schemas.microsoft.com/office/drawing/2017/decorative" val="1"/>
+              </a:ext>
+            </a:extLst>
+          </p:cNvPr>
+          <p:cNvSpPr>
+            <a:spLocks noGrp="1" noRot="1" noChangeAspect="1" noMove="1" noResize="1" noEditPoints="1" noAdjustHandles="1" noChangeArrowheads="1" noChangeShapeType="1" noTextEdit="1"/>
+          </p:cNvSpPr>
+          <p:nvPr>
+            <p:extLst>
+              <p:ext uri="{386F3935-93C4-4BCD-93E2-E3B085C9AB24}">
+                <p16:designElem xmlns:p16="http://schemas.microsoft.com/office/powerpoint/2015/main" val="1"/>
+              </p:ext>
+            </p:extLst>
           </p:nvPr>
         </p:nvSpPr>
         <p:spPr>
           <a:xfrm>
-            <a:off x="838200" y="2434201"/>
-            <a:ext cx="3822189" cy="3742762"/>
+            <a:off x="481029" y="4546920"/>
+            <a:ext cx="4023360" cy="18288"/>
           </a:xfrm>
+          <a:prstGeom prst="rect">
+            <a:avLst/>
+          </a:prstGeom>
+          <a:solidFill>
+            <a:srgbClr val="D5D5D5"/>
+          </a:solidFill>
+          <a:ln w="3175">
+            <a:noFill/>
+          </a:ln>
+          <a:effectLst/>
         </p:spPr>
+        <p:style>
+          <a:lnRef idx="2">
+            <a:schemeClr val="accent1">
+              <a:shade val="50000"/>
+            </a:schemeClr>
+          </a:lnRef>
+          <a:fillRef idx="1">
+            <a:schemeClr val="accent1"/>
+          </a:fillRef>
+          <a:effectRef idx="0">
+            <a:schemeClr val="accent1"/>
+          </a:effectRef>
+          <a:fontRef idx="minor">
+            <a:schemeClr val="lt1"/>
+          </a:fontRef>
+        </p:style>
         <p:txBody>
-          <a:bodyPr>
-            <a:normAutofit/>
-          </a:bodyPr>
+          <a:bodyPr rtlCol="0" anchor="ctr"/>
           <a:lstStyle/>
           <a:p>
-            <a:endParaRPr lang="en-US" sz="2000"/>
+            <a:pPr marL="0" marR="0" lvl="0" indent="0" algn="ctr" defTabSz="914400" rtl="0" eaLnBrk="1" fontAlgn="auto" latinLnBrk="0" hangingPunct="1">
+              <a:lnSpc>
+                <a:spcPct val="100000"/>
+              </a:lnSpc>
+              <a:spcBef>
+                <a:spcPts val="0"/>
+              </a:spcBef>
+              <a:spcAft>
+                <a:spcPts val="0"/>
+              </a:spcAft>
+              <a:buClrTx/>
+              <a:buSzTx/>
+              <a:buFontTx/>
+              <a:buNone/>
+              <a:tabLst/>
+              <a:defRPr/>
+            </a:pPr>
+            <a:endParaRPr kumimoji="0" lang="en-US" sz="1800" b="0" i="0" u="none" strike="noStrike" kern="1200" cap="none" spc="0" normalizeH="0" baseline="0" noProof="0">
+              <a:ln>
+                <a:noFill/>
+              </a:ln>
+              <a:solidFill>
+                <a:prstClr val="white"/>
+              </a:solidFill>
+              <a:effectLst/>
+              <a:uLnTx/>
+              <a:uFillTx/>
+              <a:latin typeface="Calibri" panose="020F0502020204030204"/>
+              <a:ea typeface="+mn-ea"/>
+              <a:cs typeface="+mn-cs"/>
+            </a:endParaRPr>
           </a:p>
         </p:txBody>
       </p:sp>
+      <p:pic>
+        <p:nvPicPr>
+          <p:cNvPr id="5" name="Picture 4">
+            <a:extLst>
+              <a:ext uri="{FF2B5EF4-FFF2-40B4-BE49-F238E27FC236}">
+                <a16:creationId xmlns:a16="http://schemas.microsoft.com/office/drawing/2014/main" id="{A1F25ADF-37DC-DFB8-3BAE-BDDBA9851DDE}"/>
+              </a:ext>
+            </a:extLst>
+          </p:cNvPr>
+          <p:cNvPicPr>
+            <a:picLocks noChangeAspect="1"/>
+          </p:cNvPicPr>
+          <p:nvPr/>
+        </p:nvPicPr>
+        <p:blipFill>
+          <a:blip r:embed="rId2"/>
+          <a:stretch>
+            <a:fillRect/>
+          </a:stretch>
+        </p:blipFill>
+        <p:spPr>
+          <a:xfrm>
+            <a:off x="6865052" y="843495"/>
+            <a:ext cx="3124636" cy="2267266"/>
+          </a:xfrm>
+          <a:prstGeom prst="rect">
+            <a:avLst/>
+          </a:prstGeom>
+        </p:spPr>
+      </p:pic>
+      <p:pic>
+        <p:nvPicPr>
+          <p:cNvPr id="8" name="Picture 7">
+            <a:extLst>
+              <a:ext uri="{FF2B5EF4-FFF2-40B4-BE49-F238E27FC236}">
+                <a16:creationId xmlns:a16="http://schemas.microsoft.com/office/drawing/2014/main" id="{AEF2CFC0-080E-F711-E0F7-DB65149046BC}"/>
+              </a:ext>
+            </a:extLst>
+          </p:cNvPr>
+          <p:cNvPicPr>
+            <a:picLocks noChangeAspect="1"/>
+          </p:cNvPicPr>
+          <p:nvPr/>
+        </p:nvPicPr>
+        <p:blipFill>
+          <a:blip r:embed="rId3"/>
+          <a:stretch>
+            <a:fillRect/>
+          </a:stretch>
+        </p:blipFill>
+        <p:spPr>
+          <a:xfrm>
+            <a:off x="6960316" y="3697148"/>
+            <a:ext cx="2934109" cy="2172003"/>
+          </a:xfrm>
+          <a:prstGeom prst="rect">
+            <a:avLst/>
+          </a:prstGeom>
+        </p:spPr>
+      </p:pic>
     </p:spTree>
     <p:extLst>
       <p:ext uri="{BB962C8B-B14F-4D97-AF65-F5344CB8AC3E}">
-        <p14:creationId xmlns:p14="http://schemas.microsoft.com/office/powerpoint/2010/main" val="4240213321"/>
+        <p14:creationId xmlns:p14="http://schemas.microsoft.com/office/powerpoint/2010/main" val="3658104191"/>
       </p:ext>
     </p:extLst>
   </p:cSld>

</xml_diff>

<commit_message>
Add notes for intro and conclusion
</commit_message>
<xml_diff>
--- a/Group Presentation.pptx
+++ b/Group Presentation.pptx
@@ -607,8 +607,42 @@
           <a:p>
             <a:r>
               <a:rPr lang="en-US" dirty="0"/>
-              <a:t>Andrew</a:t>
-            </a:r>
+              <a:t>Andrew:</a:t>
+            </a:r>
+          </a:p>
+          <a:p>
+            <a:pPr algn="l"/>
+            <a:r>
+              <a:rPr lang="en-US" sz="1800" b="0" i="0" u="none" strike="noStrike" baseline="0" dirty="0">
+                <a:latin typeface="NimbusRomNo9L-Regu"/>
+              </a:rPr>
+              <a:t>In this work we have demonstrated a new framework to theoretically describe proof-of-stake blockchain networks, and have created Python code to simulate efficiency metrics when certain independent variables are varied. This work could be used in the future to optimize the block window of time based on the expected empty transaction time slices (</a:t>
+            </a:r>
+            <a:r>
+              <a:rPr lang="en-US" sz="1800" b="0" i="0" u="none" strike="noStrike" baseline="0" dirty="0">
+                <a:latin typeface="CMMI10"/>
+              </a:rPr>
+              <a:t>j</a:t>
+            </a:r>
+            <a:r>
+              <a:rPr lang="en-US" sz="1800" b="0" i="0" u="none" strike="noStrike" baseline="0" dirty="0">
+                <a:latin typeface="NimbusRomNo9L-Regu"/>
+              </a:rPr>
+              <a:t>) to be seen in the next block window of time </a:t>
+            </a:r>
+            <a:r>
+              <a:rPr lang="en-US" sz="1800" b="0" i="0" u="none" strike="noStrike" baseline="0">
+                <a:latin typeface="NimbusRomNo9L-Regu"/>
+              </a:rPr>
+              <a:t>based off of </a:t>
+            </a:r>
+            <a:r>
+              <a:rPr lang="en-US" sz="1800" b="0" i="0" u="none" strike="noStrike" baseline="0" dirty="0">
+                <a:latin typeface="NimbusRomNo9L-Regu"/>
+              </a:rPr>
+              <a:t>past history and the cyclical nature of transaction activity.</a:t>
+            </a:r>
+            <a:endParaRPr lang="en-US" dirty="0"/>
           </a:p>
         </p:txBody>
       </p:sp>
@@ -807,8 +841,17 @@
                 <a:effectLst/>
                 <a:latin typeface="Open Sans" panose="020B0606030504020204" pitchFamily="34" charset="0"/>
               </a:rPr>
-              <a:t>This work aims to establish a theoretical model to simulate how blockchain transactions are grouped, validated, processed, and purged from a network based on a proof-of-stake consensus algorithm.</a:t>
-            </a:r>
+              <a:t>This work aims to establish a theoretical model to simulate how blockchain transactions are grouped, validated, processed, and purged from a network based on a proof-of-stake consensus algorithm. O</a:t>
+            </a:r>
+            <a:r>
+              <a:rPr lang="en-US" sz="1800" b="0" i="0" u="none" strike="noStrike" baseline="0" dirty="0">
+                <a:latin typeface="NimbusRomNo9L-Regu"/>
+              </a:rPr>
+              <a:t>riginally blockchain utilized a proof-of-work concept which established a means of validating incoming transactions through a distributed network of participants. Such solutions implemented methods with a focus on the accuracy and redundancy of the various transactions with minimal effort given to reduce individual transactional waiting time and increase the efficiency of processing transactions. This approach remains true for Bitcoin; however, Ethereum changed this consensus mechanism in 2022 with the update to proof-of-stake. This changed the blockchain to be more efficient in reducing complexity in the work computations while decreasing the barrier to entry hence providing reduced centralized risk with the potential of more nodes securing the network. Where under the proof-of-work consensus algorithm, the timing of blocks was determined by the mining difficulty, the new approach, proof-of-stake, the timing is fixed. Time in the Ethereum proof-of-stake consensus algorithm is divided into twelve second increments in which a block is created.</a:t>
+            </a:r>
+          </a:p>
+          <a:p>
+            <a:pPr algn="l"/>
             <a:endParaRPr lang="en-US" dirty="0"/>
           </a:p>
         </p:txBody>
@@ -6253,36 +6296,6 @@
               </a:solidFill>
               <a:latin typeface="Calibri" panose="020F0502020204030204"/>
             </a:endParaRPr>
-          </a:p>
-        </p:txBody>
-      </p:sp>
-      <p:sp>
-        <p:nvSpPr>
-          <p:cNvPr id="5" name="Content Placeholder 4">
-            <a:extLst>
-              <a:ext uri="{FF2B5EF4-FFF2-40B4-BE49-F238E27FC236}">
-                <a16:creationId xmlns:a16="http://schemas.microsoft.com/office/drawing/2014/main" id="{31F08EF0-E10A-B5F6-F6E5-CAFE56BA5B8C}"/>
-              </a:ext>
-            </a:extLst>
-          </p:cNvPr>
-          <p:cNvSpPr>
-            <a:spLocks noGrp="1"/>
-          </p:cNvSpPr>
-          <p:nvPr>
-            <p:ph idx="1"/>
-          </p:nvPr>
-        </p:nvSpPr>
-        <p:spPr>
-          <a:xfrm>
-            <a:off x="801586" y="674285"/>
-            <a:ext cx="9082310" cy="978337"/>
-          </a:xfrm>
-        </p:spPr>
-        <p:txBody>
-          <a:bodyPr/>
-          <a:lstStyle/>
-          <a:p>
-            <a:endParaRPr lang="en-US" dirty="0"/>
           </a:p>
         </p:txBody>
       </p:sp>

</xml_diff>

<commit_message>
Related Works Slide updated in PPT
</commit_message>
<xml_diff>
--- a/Group Presentation.pptx
+++ b/Group Presentation.pptx
@@ -207,7 +207,7 @@
           <a:p>
             <a:fld id="{90821DF8-0FE3-4A22-A328-1A05EEE24AD8}" type="datetimeFigureOut">
               <a:rPr lang="en-US" smtClean="0"/>
-              <a:t>4/24/2023</a:t>
+              <a:t>24-Apr-23</a:t>
             </a:fld>
             <a:endParaRPr lang="en-US"/>
           </a:p>
@@ -1652,7 +1652,7 @@
           <a:p>
             <a:fld id="{D9E4FD32-2B89-411F-B9A9-D05298A1215C}" type="datetimeFigureOut">
               <a:rPr lang="en-US" smtClean="0"/>
-              <a:t>4/24/2023</a:t>
+              <a:t>24-Apr-23</a:t>
             </a:fld>
             <a:endParaRPr lang="en-US"/>
           </a:p>
@@ -1850,7 +1850,7 @@
           <a:p>
             <a:fld id="{D9E4FD32-2B89-411F-B9A9-D05298A1215C}" type="datetimeFigureOut">
               <a:rPr lang="en-US" smtClean="0"/>
-              <a:t>4/24/2023</a:t>
+              <a:t>24-Apr-23</a:t>
             </a:fld>
             <a:endParaRPr lang="en-US"/>
           </a:p>
@@ -2058,7 +2058,7 @@
           <a:p>
             <a:fld id="{D9E4FD32-2B89-411F-B9A9-D05298A1215C}" type="datetimeFigureOut">
               <a:rPr lang="en-US" smtClean="0"/>
-              <a:t>4/24/2023</a:t>
+              <a:t>24-Apr-23</a:t>
             </a:fld>
             <a:endParaRPr lang="en-US"/>
           </a:p>
@@ -2256,7 +2256,7 @@
           <a:p>
             <a:fld id="{D9E4FD32-2B89-411F-B9A9-D05298A1215C}" type="datetimeFigureOut">
               <a:rPr lang="en-US" smtClean="0"/>
-              <a:t>4/24/2023</a:t>
+              <a:t>24-Apr-23</a:t>
             </a:fld>
             <a:endParaRPr lang="en-US"/>
           </a:p>
@@ -2531,7 +2531,7 @@
           <a:p>
             <a:fld id="{D9E4FD32-2B89-411F-B9A9-D05298A1215C}" type="datetimeFigureOut">
               <a:rPr lang="en-US" smtClean="0"/>
-              <a:t>4/24/2023</a:t>
+              <a:t>24-Apr-23</a:t>
             </a:fld>
             <a:endParaRPr lang="en-US"/>
           </a:p>
@@ -2796,7 +2796,7 @@
           <a:p>
             <a:fld id="{D9E4FD32-2B89-411F-B9A9-D05298A1215C}" type="datetimeFigureOut">
               <a:rPr lang="en-US" smtClean="0"/>
-              <a:t>4/24/2023</a:t>
+              <a:t>24-Apr-23</a:t>
             </a:fld>
             <a:endParaRPr lang="en-US"/>
           </a:p>
@@ -3208,7 +3208,7 @@
           <a:p>
             <a:fld id="{D9E4FD32-2B89-411F-B9A9-D05298A1215C}" type="datetimeFigureOut">
               <a:rPr lang="en-US" smtClean="0"/>
-              <a:t>4/24/2023</a:t>
+              <a:t>24-Apr-23</a:t>
             </a:fld>
             <a:endParaRPr lang="en-US"/>
           </a:p>
@@ -3349,7 +3349,7 @@
           <a:p>
             <a:fld id="{D9E4FD32-2B89-411F-B9A9-D05298A1215C}" type="datetimeFigureOut">
               <a:rPr lang="en-US" smtClean="0"/>
-              <a:t>4/24/2023</a:t>
+              <a:t>24-Apr-23</a:t>
             </a:fld>
             <a:endParaRPr lang="en-US"/>
           </a:p>
@@ -3462,7 +3462,7 @@
           <a:p>
             <a:fld id="{D9E4FD32-2B89-411F-B9A9-D05298A1215C}" type="datetimeFigureOut">
               <a:rPr lang="en-US" smtClean="0"/>
-              <a:t>4/24/2023</a:t>
+              <a:t>24-Apr-23</a:t>
             </a:fld>
             <a:endParaRPr lang="en-US"/>
           </a:p>
@@ -3773,7 +3773,7 @@
           <a:p>
             <a:fld id="{D9E4FD32-2B89-411F-B9A9-D05298A1215C}" type="datetimeFigureOut">
               <a:rPr lang="en-US" smtClean="0"/>
-              <a:t>4/24/2023</a:t>
+              <a:t>24-Apr-23</a:t>
             </a:fld>
             <a:endParaRPr lang="en-US"/>
           </a:p>
@@ -4061,7 +4061,7 @@
           <a:p>
             <a:fld id="{D9E4FD32-2B89-411F-B9A9-D05298A1215C}" type="datetimeFigureOut">
               <a:rPr lang="en-US" smtClean="0"/>
-              <a:t>4/24/2023</a:t>
+              <a:t>24-Apr-23</a:t>
             </a:fld>
             <a:endParaRPr lang="en-US"/>
           </a:p>
@@ -4302,7 +4302,7 @@
           <a:p>
             <a:fld id="{D9E4FD32-2B89-411F-B9A9-D05298A1215C}" type="datetimeFigureOut">
               <a:rPr lang="en-US" smtClean="0"/>
-              <a:t>4/24/2023</a:t>
+              <a:t>24-Apr-23</a:t>
             </a:fld>
             <a:endParaRPr lang="en-US"/>
           </a:p>
@@ -6475,8 +6475,8 @@
         </p:nvSpPr>
         <p:spPr>
           <a:xfrm>
-            <a:off x="4553733" y="548464"/>
-            <a:ext cx="6798541" cy="1675623"/>
+            <a:off x="4553733" y="548465"/>
+            <a:ext cx="6798541" cy="912036"/>
           </a:xfrm>
         </p:spPr>
         <p:txBody>
@@ -6556,48 +6556,185 @@
         </p:nvSpPr>
         <p:spPr>
           <a:xfrm>
-            <a:off x="4553734" y="2409830"/>
-            <a:ext cx="6798539" cy="3705217"/>
+            <a:off x="4553734" y="1460501"/>
+            <a:ext cx="7041366" cy="4849034"/>
           </a:xfrm>
         </p:spPr>
         <p:txBody>
           <a:bodyPr>
-            <a:normAutofit/>
+            <a:normAutofit lnSpcReduction="10000"/>
           </a:bodyPr>
           <a:lstStyle/>
           <a:p>
-            <a:pPr marL="0" indent="0" algn="l">
-              <a:buNone/>
-            </a:pPr>
-            <a:r>
-              <a:rPr lang="en-US" sz="1800" b="0" i="0" u="none" strike="noStrike" baseline="0" dirty="0">
-                <a:latin typeface="NimbusRomNo9L-Regu"/>
+            <a:pPr algn="l"/>
+            <a:r>
+              <a:rPr lang="en-US" sz="2000" b="0" i="0" dirty="0">
+                <a:solidFill>
+                  <a:srgbClr val="374151"/>
+                </a:solidFill>
+                <a:effectLst/>
               </a:rPr>
-              <a:t>Performance optimization for blockchain-enabled distributed network function virtualization management</a:t>
+              <a:t>The slow transaction rates with proof-of-work consensus algorithms have been a major issue for cryptocurrencies. </a:t>
             </a:r>
           </a:p>
           <a:p>
             <a:pPr algn="l"/>
             <a:r>
-              <a:rPr lang="en-US" sz="1800" b="0" i="0" u="none" strike="noStrike" baseline="0" dirty="0">
-                <a:latin typeface="NimbusRomNo9L-Regu"/>
+              <a:rPr lang="en-US" sz="2000" b="0" i="0" dirty="0">
+                <a:solidFill>
+                  <a:srgbClr val="374151"/>
+                </a:solidFill>
+                <a:effectLst/>
               </a:rPr>
-              <a:t>and orchestration</a:t>
-            </a:r>
-            <a:endParaRPr lang="en-US" sz="1800" b="0" i="0" u="none" strike="noStrike" baseline="0" dirty="0">
-              <a:latin typeface="NimbusRomNo9L-ReguItal"/>
+              <a:t>Fu [1] focuses on improving blockchain optimization and increasing throughput.</a:t>
+            </a:r>
+          </a:p>
+          <a:p>
+            <a:pPr algn="l"/>
+            <a:r>
+              <a:rPr lang="en-US" sz="2000" b="0" i="0" dirty="0" err="1">
+                <a:solidFill>
+                  <a:srgbClr val="374151"/>
+                </a:solidFill>
+                <a:effectLst/>
+              </a:rPr>
+              <a:t>Mechkaroska</a:t>
+            </a:r>
+            <a:r>
+              <a:rPr lang="en-US" sz="2000" b="0" i="0" dirty="0">
+                <a:solidFill>
+                  <a:srgbClr val="374151"/>
+                </a:solidFill>
+                <a:effectLst/>
+              </a:rPr>
+              <a:t> [3] explores different methods to increase throughput, including increasing the block size and </a:t>
+            </a:r>
+            <a:r>
+              <a:rPr lang="en-US" sz="2000" b="0" i="0" dirty="0" err="1">
+                <a:solidFill>
+                  <a:srgbClr val="374151"/>
+                </a:solidFill>
+                <a:effectLst/>
+              </a:rPr>
+              <a:t>sharding</a:t>
+            </a:r>
+            <a:r>
+              <a:rPr lang="en-US" sz="2000" b="0" i="0" dirty="0">
+                <a:solidFill>
+                  <a:srgbClr val="374151"/>
+                </a:solidFill>
+                <a:effectLst/>
+              </a:rPr>
+              <a:t>.</a:t>
+            </a:r>
+          </a:p>
+          <a:p>
+            <a:pPr algn="l"/>
+            <a:r>
+              <a:rPr lang="en-US" sz="2000" b="0" i="0" dirty="0" err="1">
+                <a:solidFill>
+                  <a:srgbClr val="374151"/>
+                </a:solidFill>
+                <a:effectLst/>
+              </a:rPr>
+              <a:t>Sharding</a:t>
+            </a:r>
+            <a:r>
+              <a:rPr lang="en-US" sz="2000" b="0" i="0" dirty="0">
+                <a:solidFill>
+                  <a:srgbClr val="374151"/>
+                </a:solidFill>
+                <a:effectLst/>
+              </a:rPr>
+              <a:t> is a technique for parallel processing of transactions and has been implemented in </a:t>
+            </a:r>
+            <a:r>
+              <a:rPr lang="en-US" sz="2000" b="0" i="0" dirty="0" err="1">
+                <a:solidFill>
+                  <a:srgbClr val="374151"/>
+                </a:solidFill>
+                <a:effectLst/>
+              </a:rPr>
+              <a:t>Zilliqa</a:t>
+            </a:r>
+            <a:r>
+              <a:rPr lang="en-US" sz="2000" b="0" i="0" dirty="0">
+                <a:solidFill>
+                  <a:srgbClr val="374151"/>
+                </a:solidFill>
+                <a:effectLst/>
+              </a:rPr>
+              <a:t> [8].</a:t>
+            </a:r>
+          </a:p>
+          <a:p>
+            <a:pPr algn="l"/>
+            <a:r>
+              <a:rPr lang="en-US" sz="2000" b="0" i="0" dirty="0" err="1">
+                <a:solidFill>
+                  <a:srgbClr val="374151"/>
+                </a:solidFill>
+                <a:effectLst/>
+              </a:rPr>
+              <a:t>Gobel</a:t>
+            </a:r>
+            <a:r>
+              <a:rPr lang="en-US" sz="2000" b="0" i="0" dirty="0">
+                <a:solidFill>
+                  <a:srgbClr val="374151"/>
+                </a:solidFill>
+                <a:effectLst/>
+              </a:rPr>
+              <a:t>, Thakkar, and </a:t>
+            </a:r>
+            <a:r>
+              <a:rPr lang="en-US" sz="2000" b="0" i="0" dirty="0" err="1">
+                <a:solidFill>
+                  <a:srgbClr val="374151"/>
+                </a:solidFill>
+                <a:effectLst/>
+              </a:rPr>
+              <a:t>Mechkaroska</a:t>
+            </a:r>
+            <a:r>
+              <a:rPr lang="en-US" sz="2000" b="0" i="0" dirty="0">
+                <a:solidFill>
+                  <a:srgbClr val="374151"/>
+                </a:solidFill>
+                <a:effectLst/>
+              </a:rPr>
+              <a:t> [2], [3], [9] have suggested increasing the block size as a solution, but this lacks creativity. </a:t>
+            </a:r>
+            <a:endParaRPr lang="en-US" sz="2000" dirty="0">
+              <a:solidFill>
+                <a:srgbClr val="374151"/>
+              </a:solidFill>
             </a:endParaRPr>
           </a:p>
           <a:p>
-            <a:pPr marL="0" indent="0">
-              <a:buNone/>
-            </a:pPr>
-            <a:r>
-              <a:rPr lang="en-US" sz="1800" dirty="0">
-                <a:latin typeface="NimbusRomNo9L-ReguItal"/>
+            <a:pPr algn="l"/>
+            <a:r>
+              <a:rPr lang="en-US" sz="2000" b="0" i="0" dirty="0">
+                <a:solidFill>
+                  <a:srgbClr val="374151"/>
+                </a:solidFill>
+                <a:effectLst/>
               </a:rPr>
-              <a:t>New Performance Model – </a:t>
-            </a:r>
+              <a:t>Ethereum transitioned to a proof-of-stake consensus algorithm in 2022, which requires a new theoretical model to be considered. </a:t>
+            </a:r>
+          </a:p>
+          <a:p>
+            <a:pPr algn="l"/>
+            <a:r>
+              <a:rPr lang="en-US" sz="2000" b="0" i="0" dirty="0">
+                <a:solidFill>
+                  <a:srgbClr val="374151"/>
+                </a:solidFill>
+                <a:effectLst/>
+              </a:rPr>
+              <a:t>This paper focuses on exploring the ramifications of the new consensus algorithm in a theoretical context. </a:t>
+            </a:r>
+            <a:endParaRPr lang="en-US" sz="2000" dirty="0"/>
           </a:p>
           <a:p>
             <a:pPr marL="0" indent="0">

</xml_diff>

<commit_message>
Switched order of first two methodology slides and added to old model/new model slide. Moved figure 2 (P_0,0) to my slide since Kyle is talking about P_i,j and P_t-j,j exclusively
</commit_message>
<xml_diff>
--- a/Group Presentation.pptx
+++ b/Group Presentation.pptx
@@ -11,8 +11,8 @@
     <p:sldId id="256" r:id="rId2"/>
     <p:sldId id="257" r:id="rId3"/>
     <p:sldId id="269" r:id="rId4"/>
-    <p:sldId id="267" r:id="rId5"/>
-    <p:sldId id="263" r:id="rId6"/>
+    <p:sldId id="263" r:id="rId5"/>
+    <p:sldId id="270" r:id="rId6"/>
     <p:sldId id="264" r:id="rId7"/>
     <p:sldId id="258" r:id="rId8"/>
     <p:sldId id="265" r:id="rId9"/>
@@ -207,7 +207,7 @@
           <a:p>
             <a:fld id="{90821DF8-0FE3-4A22-A328-1A05EEE24AD8}" type="datetimeFigureOut">
               <a:rPr lang="en-US" smtClean="0"/>
-              <a:t>24-Apr-23</a:t>
+              <a:t>4/24/23</a:t>
             </a:fld>
             <a:endParaRPr lang="en-US"/>
           </a:p>
@@ -1029,7 +1029,7 @@
           <a:p>
             <a:r>
               <a:rPr lang="en-US" dirty="0"/>
-              <a:t>Nathan:</a:t>
+              <a:t>Nathan</a:t>
             </a:r>
           </a:p>
         </p:txBody>
@@ -1060,7 +1060,7 @@
     </p:spTree>
     <p:extLst>
       <p:ext uri="{BB962C8B-B14F-4D97-AF65-F5344CB8AC3E}">
-        <p14:creationId xmlns:p14="http://schemas.microsoft.com/office/powerpoint/2010/main" val="2367484438"/>
+        <p14:creationId xmlns:p14="http://schemas.microsoft.com/office/powerpoint/2010/main" val="2369491655"/>
       </p:ext>
     </p:extLst>
   </p:cSld>
@@ -1116,7 +1116,7 @@
           <a:p>
             <a:r>
               <a:rPr lang="en-US" dirty="0"/>
-              <a:t>Nathan</a:t>
+              <a:t>Nathan:</a:t>
             </a:r>
           </a:p>
         </p:txBody>
@@ -1147,7 +1147,7 @@
     </p:spTree>
     <p:extLst>
       <p:ext uri="{BB962C8B-B14F-4D97-AF65-F5344CB8AC3E}">
-        <p14:creationId xmlns:p14="http://schemas.microsoft.com/office/powerpoint/2010/main" val="2369491655"/>
+        <p14:creationId xmlns:p14="http://schemas.microsoft.com/office/powerpoint/2010/main" val="2367484438"/>
       </p:ext>
     </p:extLst>
   </p:cSld>
@@ -1652,7 +1652,7 @@
           <a:p>
             <a:fld id="{D9E4FD32-2B89-411F-B9A9-D05298A1215C}" type="datetimeFigureOut">
               <a:rPr lang="en-US" smtClean="0"/>
-              <a:t>24-Apr-23</a:t>
+              <a:t>4/24/23</a:t>
             </a:fld>
             <a:endParaRPr lang="en-US"/>
           </a:p>
@@ -1850,7 +1850,7 @@
           <a:p>
             <a:fld id="{D9E4FD32-2B89-411F-B9A9-D05298A1215C}" type="datetimeFigureOut">
               <a:rPr lang="en-US" smtClean="0"/>
-              <a:t>24-Apr-23</a:t>
+              <a:t>4/24/23</a:t>
             </a:fld>
             <a:endParaRPr lang="en-US"/>
           </a:p>
@@ -2058,7 +2058,7 @@
           <a:p>
             <a:fld id="{D9E4FD32-2B89-411F-B9A9-D05298A1215C}" type="datetimeFigureOut">
               <a:rPr lang="en-US" smtClean="0"/>
-              <a:t>24-Apr-23</a:t>
+              <a:t>4/24/23</a:t>
             </a:fld>
             <a:endParaRPr lang="en-US"/>
           </a:p>
@@ -2256,7 +2256,7 @@
           <a:p>
             <a:fld id="{D9E4FD32-2B89-411F-B9A9-D05298A1215C}" type="datetimeFigureOut">
               <a:rPr lang="en-US" smtClean="0"/>
-              <a:t>24-Apr-23</a:t>
+              <a:t>4/24/23</a:t>
             </a:fld>
             <a:endParaRPr lang="en-US"/>
           </a:p>
@@ -2531,7 +2531,7 @@
           <a:p>
             <a:fld id="{D9E4FD32-2B89-411F-B9A9-D05298A1215C}" type="datetimeFigureOut">
               <a:rPr lang="en-US" smtClean="0"/>
-              <a:t>24-Apr-23</a:t>
+              <a:t>4/24/23</a:t>
             </a:fld>
             <a:endParaRPr lang="en-US"/>
           </a:p>
@@ -2796,7 +2796,7 @@
           <a:p>
             <a:fld id="{D9E4FD32-2B89-411F-B9A9-D05298A1215C}" type="datetimeFigureOut">
               <a:rPr lang="en-US" smtClean="0"/>
-              <a:t>24-Apr-23</a:t>
+              <a:t>4/24/23</a:t>
             </a:fld>
             <a:endParaRPr lang="en-US"/>
           </a:p>
@@ -3208,7 +3208,7 @@
           <a:p>
             <a:fld id="{D9E4FD32-2B89-411F-B9A9-D05298A1215C}" type="datetimeFigureOut">
               <a:rPr lang="en-US" smtClean="0"/>
-              <a:t>24-Apr-23</a:t>
+              <a:t>4/24/23</a:t>
             </a:fld>
             <a:endParaRPr lang="en-US"/>
           </a:p>
@@ -3349,7 +3349,7 @@
           <a:p>
             <a:fld id="{D9E4FD32-2B89-411F-B9A9-D05298A1215C}" type="datetimeFigureOut">
               <a:rPr lang="en-US" smtClean="0"/>
-              <a:t>24-Apr-23</a:t>
+              <a:t>4/24/23</a:t>
             </a:fld>
             <a:endParaRPr lang="en-US"/>
           </a:p>
@@ -3462,7 +3462,7 @@
           <a:p>
             <a:fld id="{D9E4FD32-2B89-411F-B9A9-D05298A1215C}" type="datetimeFigureOut">
               <a:rPr lang="en-US" smtClean="0"/>
-              <a:t>24-Apr-23</a:t>
+              <a:t>4/24/23</a:t>
             </a:fld>
             <a:endParaRPr lang="en-US"/>
           </a:p>
@@ -3773,7 +3773,7 @@
           <a:p>
             <a:fld id="{D9E4FD32-2B89-411F-B9A9-D05298A1215C}" type="datetimeFigureOut">
               <a:rPr lang="en-US" smtClean="0"/>
-              <a:t>24-Apr-23</a:t>
+              <a:t>4/24/23</a:t>
             </a:fld>
             <a:endParaRPr lang="en-US"/>
           </a:p>
@@ -4061,7 +4061,7 @@
           <a:p>
             <a:fld id="{D9E4FD32-2B89-411F-B9A9-D05298A1215C}" type="datetimeFigureOut">
               <a:rPr lang="en-US" smtClean="0"/>
-              <a:t>24-Apr-23</a:t>
+              <a:t>4/24/23</a:t>
             </a:fld>
             <a:endParaRPr lang="en-US"/>
           </a:p>
@@ -4302,7 +4302,7 @@
           <a:p>
             <a:fld id="{D9E4FD32-2B89-411F-B9A9-D05298A1215C}" type="datetimeFigureOut">
               <a:rPr lang="en-US" smtClean="0"/>
-              <a:t>24-Apr-23</a:t>
+              <a:t>4/24/23</a:t>
             </a:fld>
             <a:endParaRPr lang="en-US"/>
           </a:p>
@@ -6784,310 +6784,6 @@
       </p:grpSpPr>
       <p:sp useBgFill="1">
         <p:nvSpPr>
-          <p:cNvPr id="3079" name="Rectangle 3078">
-            <a:extLst>
-              <a:ext uri="{FF2B5EF4-FFF2-40B4-BE49-F238E27FC236}">
-                <a16:creationId xmlns:a16="http://schemas.microsoft.com/office/drawing/2014/main" id="{E51BA4DF-2BD4-4EC2-B1DB-B27C8AC71864}"/>
-              </a:ext>
-              <a:ext uri="{C183D7F6-B498-43B3-948B-1728B52AA6E4}">
-                <adec:decorative xmlns:adec="http://schemas.microsoft.com/office/drawing/2017/decorative" val="1"/>
-              </a:ext>
-            </a:extLst>
-          </p:cNvPr>
-          <p:cNvSpPr>
-            <a:spLocks noGrp="1" noRot="1" noChangeAspect="1" noMove="1" noResize="1" noEditPoints="1" noAdjustHandles="1" noChangeArrowheads="1" noChangeShapeType="1" noTextEdit="1"/>
-          </p:cNvSpPr>
-          <p:nvPr>
-            <p:extLst>
-              <p:ext uri="{386F3935-93C4-4BCD-93E2-E3B085C9AB24}">
-                <p16:designElem xmlns:p16="http://schemas.microsoft.com/office/powerpoint/2015/main" val="1"/>
-              </p:ext>
-            </p:extLst>
-          </p:nvPr>
-        </p:nvSpPr>
-        <p:spPr>
-          <a:xfrm>
-            <a:off x="-1" y="0"/>
-            <a:ext cx="12188952" cy="6858000"/>
-          </a:xfrm>
-          <a:prstGeom prst="rect">
-            <a:avLst/>
-          </a:prstGeom>
-          <a:ln>
-            <a:noFill/>
-          </a:ln>
-        </p:spPr>
-        <p:style>
-          <a:lnRef idx="2">
-            <a:schemeClr val="accent1">
-              <a:shade val="50000"/>
-            </a:schemeClr>
-          </a:lnRef>
-          <a:fillRef idx="1">
-            <a:schemeClr val="accent1"/>
-          </a:fillRef>
-          <a:effectRef idx="0">
-            <a:schemeClr val="accent1"/>
-          </a:effectRef>
-          <a:fontRef idx="minor">
-            <a:schemeClr val="lt1"/>
-          </a:fontRef>
-        </p:style>
-        <p:txBody>
-          <a:bodyPr rtlCol="0" anchor="ctr"/>
-          <a:lstStyle/>
-          <a:p>
-            <a:pPr algn="ctr"/>
-            <a:endParaRPr lang="en-US"/>
-          </a:p>
-        </p:txBody>
-      </p:sp>
-      <p:sp>
-        <p:nvSpPr>
-          <p:cNvPr id="2" name="Title 1">
-            <a:extLst>
-              <a:ext uri="{FF2B5EF4-FFF2-40B4-BE49-F238E27FC236}">
-                <a16:creationId xmlns:a16="http://schemas.microsoft.com/office/drawing/2014/main" id="{4C812F6C-7AC4-9905-0E26-302DB45DCF3B}"/>
-              </a:ext>
-            </a:extLst>
-          </p:cNvPr>
-          <p:cNvSpPr>
-            <a:spLocks noGrp="1"/>
-          </p:cNvSpPr>
-          <p:nvPr>
-            <p:ph type="title"/>
-          </p:nvPr>
-        </p:nvSpPr>
-        <p:spPr>
-          <a:xfrm>
-            <a:off x="4553733" y="548464"/>
-            <a:ext cx="6798541" cy="1675623"/>
-          </a:xfrm>
-        </p:spPr>
-        <p:txBody>
-          <a:bodyPr anchor="b">
-            <a:normAutofit/>
-          </a:bodyPr>
-          <a:lstStyle/>
-          <a:p>
-            <a:r>
-              <a:rPr lang="en-US" sz="4000" dirty="0"/>
-              <a:t>Methodology</a:t>
-            </a:r>
-          </a:p>
-        </p:txBody>
-      </p:sp>
-      <p:pic>
-        <p:nvPicPr>
-          <p:cNvPr id="3074" name="Picture 2" descr="How blockchain can make trade safer - Beyond Borders">
-            <a:extLst>
-              <a:ext uri="{FF2B5EF4-FFF2-40B4-BE49-F238E27FC236}">
-                <a16:creationId xmlns:a16="http://schemas.microsoft.com/office/drawing/2014/main" id="{26AC6485-73B0-9E1C-1A2F-AA1E4CB87F96}"/>
-              </a:ext>
-            </a:extLst>
-          </p:cNvPr>
-          <p:cNvPicPr>
-            <a:picLocks noChangeAspect="1" noChangeArrowheads="1"/>
-          </p:cNvPicPr>
-          <p:nvPr/>
-        </p:nvPicPr>
-        <p:blipFill rotWithShape="1">
-          <a:blip r:embed="rId3">
-            <a:extLst>
-              <a:ext uri="{28A0092B-C50C-407E-A947-70E740481C1C}">
-                <a14:useLocalDpi xmlns:a14="http://schemas.microsoft.com/office/drawing/2010/main" val="0"/>
-              </a:ext>
-            </a:extLst>
-          </a:blip>
-          <a:srcRect l="13937" r="14158" b="1"/>
-          <a:stretch/>
-        </p:blipFill>
-        <p:spPr bwMode="auto">
-          <a:xfrm rot="5400000">
-            <a:off x="-1330751" y="1330752"/>
-            <a:ext cx="6858000" cy="4196496"/>
-          </a:xfrm>
-          <a:prstGeom prst="rect">
-            <a:avLst/>
-          </a:prstGeom>
-          <a:noFill/>
-          <a:effectLst/>
-          <a:extLst>
-            <a:ext uri="{909E8E84-426E-40DD-AFC4-6F175D3DCCD1}">
-              <a14:hiddenFill xmlns:a14="http://schemas.microsoft.com/office/drawing/2010/main">
-                <a:solidFill>
-                  <a:srgbClr val="FFFFFF"/>
-                </a:solidFill>
-              </a14:hiddenFill>
-            </a:ext>
-          </a:extLst>
-        </p:spPr>
-      </p:pic>
-      <p:sp>
-        <p:nvSpPr>
-          <p:cNvPr id="3" name="Content Placeholder 2">
-            <a:extLst>
-              <a:ext uri="{FF2B5EF4-FFF2-40B4-BE49-F238E27FC236}">
-                <a16:creationId xmlns:a16="http://schemas.microsoft.com/office/drawing/2014/main" id="{A3397183-8953-BA1E-3E34-8860C9D92078}"/>
-              </a:ext>
-            </a:extLst>
-          </p:cNvPr>
-          <p:cNvSpPr>
-            <a:spLocks noGrp="1"/>
-          </p:cNvSpPr>
-          <p:nvPr>
-            <p:ph idx="1"/>
-          </p:nvPr>
-        </p:nvSpPr>
-        <p:spPr>
-          <a:xfrm>
-            <a:off x="4553734" y="2409830"/>
-            <a:ext cx="6798539" cy="3705217"/>
-          </a:xfrm>
-        </p:spPr>
-        <p:txBody>
-          <a:bodyPr>
-            <a:normAutofit/>
-          </a:bodyPr>
-          <a:lstStyle/>
-          <a:p>
-            <a:pPr marL="0" indent="0">
-              <a:buNone/>
-            </a:pPr>
-            <a:r>
-              <a:rPr lang="en-US" sz="1800" b="0" i="0" u="none" strike="noStrike" baseline="0" dirty="0">
-                <a:latin typeface="NimbusRomNo9L-ReguItal"/>
-              </a:rPr>
-              <a:t>Original Performance Model –</a:t>
-            </a:r>
-          </a:p>
-          <a:p>
-            <a:pPr marL="0" indent="0">
-              <a:buNone/>
-            </a:pPr>
-            <a:endParaRPr lang="en-US" sz="1800" b="0" i="0" u="none" strike="noStrike" baseline="0" dirty="0">
-              <a:latin typeface="NimbusRomNo9L-ReguItal"/>
-            </a:endParaRPr>
-          </a:p>
-          <a:p>
-            <a:pPr marL="0" indent="0">
-              <a:buNone/>
-            </a:pPr>
-            <a:r>
-              <a:rPr lang="en-US" sz="1800" dirty="0">
-                <a:latin typeface="NimbusRomNo9L-ReguItal"/>
-              </a:rPr>
-              <a:t>New Performance Model – </a:t>
-            </a:r>
-          </a:p>
-          <a:p>
-            <a:pPr marL="0" indent="0">
-              <a:buNone/>
-            </a:pPr>
-            <a:endParaRPr lang="en-US" sz="2000" dirty="0"/>
-          </a:p>
-        </p:txBody>
-      </p:sp>
-      <p:pic>
-        <p:nvPicPr>
-          <p:cNvPr id="4" name="Content Placeholder 8">
-            <a:extLst>
-              <a:ext uri="{FF2B5EF4-FFF2-40B4-BE49-F238E27FC236}">
-                <a16:creationId xmlns:a16="http://schemas.microsoft.com/office/drawing/2014/main" id="{89EAE2D7-28D3-BFF8-D3B4-C9CA0492F023}"/>
-              </a:ext>
-            </a:extLst>
-          </p:cNvPr>
-          <p:cNvPicPr>
-            <a:picLocks noChangeAspect="1"/>
-          </p:cNvPicPr>
-          <p:nvPr/>
-        </p:nvPicPr>
-        <p:blipFill>
-          <a:blip r:embed="rId4"/>
-          <a:stretch>
-            <a:fillRect/>
-          </a:stretch>
-        </p:blipFill>
-        <p:spPr>
-          <a:xfrm>
-            <a:off x="4805018" y="4904783"/>
-            <a:ext cx="2857373" cy="887382"/>
-          </a:xfrm>
-          <a:prstGeom prst="rect">
-            <a:avLst/>
-          </a:prstGeom>
-        </p:spPr>
-      </p:pic>
-      <p:pic>
-        <p:nvPicPr>
-          <p:cNvPr id="5" name="Picture 4">
-            <a:extLst>
-              <a:ext uri="{FF2B5EF4-FFF2-40B4-BE49-F238E27FC236}">
-                <a16:creationId xmlns:a16="http://schemas.microsoft.com/office/drawing/2014/main" id="{C3F0C2EF-B84C-1F7A-61D5-385A0801CB24}"/>
-              </a:ext>
-            </a:extLst>
-          </p:cNvPr>
-          <p:cNvPicPr>
-            <a:picLocks noChangeAspect="1"/>
-          </p:cNvPicPr>
-          <p:nvPr/>
-        </p:nvPicPr>
-        <p:blipFill>
-          <a:blip r:embed="rId5"/>
-          <a:stretch>
-            <a:fillRect/>
-          </a:stretch>
-        </p:blipFill>
-        <p:spPr>
-          <a:xfrm>
-            <a:off x="8019628" y="4747932"/>
-            <a:ext cx="3234923" cy="1201085"/>
-          </a:xfrm>
-          <a:prstGeom prst="rect">
-            <a:avLst/>
-          </a:prstGeom>
-        </p:spPr>
-      </p:pic>
-    </p:spTree>
-    <p:extLst>
-      <p:ext uri="{BB962C8B-B14F-4D97-AF65-F5344CB8AC3E}">
-        <p14:creationId xmlns:p14="http://schemas.microsoft.com/office/powerpoint/2010/main" val="1475478525"/>
-      </p:ext>
-    </p:extLst>
-  </p:cSld>
-  <p:clrMapOvr>
-    <a:masterClrMapping/>
-  </p:clrMapOvr>
-</p:sld>
-</file>
-
-<file path=ppt/slides/slide5.xml><?xml version="1.0" encoding="utf-8"?>
-<p:sld xmlns:a="http://schemas.openxmlformats.org/drawingml/2006/main" xmlns:r="http://schemas.openxmlformats.org/officeDocument/2006/relationships" xmlns:p="http://schemas.openxmlformats.org/presentationml/2006/main">
-  <p:cSld>
-    <p:bg>
-      <p:bgPr>
-        <a:solidFill>
-          <a:schemeClr val="bg1"/>
-        </a:solidFill>
-        <a:effectLst/>
-      </p:bgPr>
-    </p:bg>
-    <p:spTree>
-      <p:nvGrpSpPr>
-        <p:cNvPr id="1" name=""/>
-        <p:cNvGrpSpPr/>
-        <p:nvPr/>
-      </p:nvGrpSpPr>
-      <p:grpSpPr>
-        <a:xfrm>
-          <a:off x="0" y="0"/>
-          <a:ext cx="0" cy="0"/>
-          <a:chOff x="0" y="0"/>
-          <a:chExt cx="0" cy="0"/>
-        </a:xfrm>
-      </p:grpSpPr>
-      <p:sp useBgFill="1">
-        <p:nvSpPr>
           <p:cNvPr id="10" name="Rectangle 9">
             <a:extLst>
               <a:ext uri="{FF2B5EF4-FFF2-40B4-BE49-F238E27FC236}">
@@ -7727,6 +7423,362 @@
 </p:sld>
 </file>
 
+<file path=ppt/slides/slide5.xml><?xml version="1.0" encoding="utf-8"?>
+<p:sld xmlns:a="http://schemas.openxmlformats.org/drawingml/2006/main" xmlns:r="http://schemas.openxmlformats.org/officeDocument/2006/relationships" xmlns:p="http://schemas.openxmlformats.org/presentationml/2006/main">
+  <p:cSld>
+    <p:spTree>
+      <p:nvGrpSpPr>
+        <p:cNvPr id="1" name=""/>
+        <p:cNvGrpSpPr/>
+        <p:nvPr/>
+      </p:nvGrpSpPr>
+      <p:grpSpPr>
+        <a:xfrm>
+          <a:off x="0" y="0"/>
+          <a:ext cx="0" cy="0"/>
+          <a:chOff x="0" y="0"/>
+          <a:chExt cx="0" cy="0"/>
+        </a:xfrm>
+      </p:grpSpPr>
+      <p:sp>
+        <p:nvSpPr>
+          <p:cNvPr id="2" name="Title 1">
+            <a:extLst>
+              <a:ext uri="{FF2B5EF4-FFF2-40B4-BE49-F238E27FC236}">
+                <a16:creationId xmlns:a16="http://schemas.microsoft.com/office/drawing/2014/main" id="{4C812F6C-7AC4-9905-0E26-302DB45DCF3B}"/>
+              </a:ext>
+            </a:extLst>
+          </p:cNvPr>
+          <p:cNvSpPr>
+            <a:spLocks noGrp="1"/>
+          </p:cNvSpPr>
+          <p:nvPr>
+            <p:ph type="title"/>
+          </p:nvPr>
+        </p:nvSpPr>
+        <p:spPr>
+          <a:xfrm>
+            <a:off x="4553733" y="548464"/>
+            <a:ext cx="6798541" cy="729351"/>
+          </a:xfrm>
+        </p:spPr>
+        <p:txBody>
+          <a:bodyPr anchor="b">
+            <a:normAutofit/>
+          </a:bodyPr>
+          <a:lstStyle/>
+          <a:p>
+            <a:r>
+              <a:rPr lang="en-US" sz="4000" dirty="0"/>
+              <a:t>Methodology</a:t>
+            </a:r>
+          </a:p>
+        </p:txBody>
+      </p:sp>
+      <p:pic>
+        <p:nvPicPr>
+          <p:cNvPr id="3074" name="Picture 2" descr="How blockchain can make trade safer - Beyond Borders">
+            <a:extLst>
+              <a:ext uri="{FF2B5EF4-FFF2-40B4-BE49-F238E27FC236}">
+                <a16:creationId xmlns:a16="http://schemas.microsoft.com/office/drawing/2014/main" id="{26AC6485-73B0-9E1C-1A2F-AA1E4CB87F96}"/>
+              </a:ext>
+            </a:extLst>
+          </p:cNvPr>
+          <p:cNvPicPr>
+            <a:picLocks noChangeAspect="1" noChangeArrowheads="1"/>
+          </p:cNvPicPr>
+          <p:nvPr/>
+        </p:nvPicPr>
+        <p:blipFill rotWithShape="1">
+          <a:blip r:embed="rId3">
+            <a:extLst>
+              <a:ext uri="{28A0092B-C50C-407E-A947-70E740481C1C}">
+                <a14:useLocalDpi xmlns:a14="http://schemas.microsoft.com/office/drawing/2010/main" val="0"/>
+              </a:ext>
+            </a:extLst>
+          </a:blip>
+          <a:srcRect l="13937" r="14158" b="1"/>
+          <a:stretch/>
+        </p:blipFill>
+        <p:spPr bwMode="auto">
+          <a:xfrm rot="5400000">
+            <a:off x="-1330751" y="1330752"/>
+            <a:ext cx="6858000" cy="4196496"/>
+          </a:xfrm>
+          <a:prstGeom prst="rect">
+            <a:avLst/>
+          </a:prstGeom>
+          <a:noFill/>
+          <a:effectLst/>
+          <a:extLst>
+            <a:ext uri="{909E8E84-426E-40DD-AFC4-6F175D3DCCD1}">
+              <a14:hiddenFill xmlns:a14="http://schemas.microsoft.com/office/drawing/2010/main">
+                <a:solidFill>
+                  <a:srgbClr val="FFFFFF"/>
+                </a:solidFill>
+              </a14:hiddenFill>
+            </a:ext>
+          </a:extLst>
+        </p:spPr>
+      </p:pic>
+      <p:sp>
+        <p:nvSpPr>
+          <p:cNvPr id="3" name="Content Placeholder 2">
+            <a:extLst>
+              <a:ext uri="{FF2B5EF4-FFF2-40B4-BE49-F238E27FC236}">
+                <a16:creationId xmlns:a16="http://schemas.microsoft.com/office/drawing/2014/main" id="{A3397183-8953-BA1E-3E34-8860C9D92078}"/>
+              </a:ext>
+            </a:extLst>
+          </p:cNvPr>
+          <p:cNvSpPr>
+            <a:spLocks noGrp="1"/>
+          </p:cNvSpPr>
+          <p:nvPr>
+            <p:ph idx="1"/>
+          </p:nvPr>
+        </p:nvSpPr>
+        <p:spPr>
+          <a:xfrm>
+            <a:off x="4553734" y="1277816"/>
+            <a:ext cx="6798539" cy="4837232"/>
+          </a:xfrm>
+        </p:spPr>
+        <p:txBody>
+          <a:bodyPr>
+            <a:normAutofit/>
+          </a:bodyPr>
+          <a:lstStyle/>
+          <a:p>
+            <a:pPr marL="0" indent="0">
+              <a:buNone/>
+            </a:pPr>
+            <a:r>
+              <a:rPr lang="en-US" sz="1800" b="0" i="0" u="none" strike="noStrike" baseline="0" dirty="0">
+                <a:latin typeface="NimbusRomNo9L-ReguItal"/>
+              </a:rPr>
+              <a:t>Original Performance Model – block size is fixed and block is processed when all of the transaction slots in the block have been filled</a:t>
+            </a:r>
+          </a:p>
+          <a:p>
+            <a:pPr marL="0" indent="0">
+              <a:buNone/>
+            </a:pPr>
+            <a:endParaRPr lang="en-US" sz="1800" b="0" i="0" u="none" strike="noStrike" baseline="0" dirty="0">
+              <a:latin typeface="NimbusRomNo9L-ReguItal"/>
+            </a:endParaRPr>
+          </a:p>
+          <a:p>
+            <a:pPr marL="0" indent="0">
+              <a:buNone/>
+            </a:pPr>
+            <a:endParaRPr lang="en-US" sz="1800" dirty="0">
+              <a:latin typeface="NimbusRomNo9L-ReguItal"/>
+            </a:endParaRPr>
+          </a:p>
+          <a:p>
+            <a:pPr marL="0" indent="0">
+              <a:buNone/>
+            </a:pPr>
+            <a:endParaRPr lang="en-US" sz="1800" dirty="0">
+              <a:latin typeface="NimbusRomNo9L-ReguItal"/>
+            </a:endParaRPr>
+          </a:p>
+          <a:p>
+            <a:pPr marL="0" indent="0">
+              <a:lnSpc>
+                <a:spcPct val="100000"/>
+              </a:lnSpc>
+              <a:spcBef>
+                <a:spcPts val="0"/>
+              </a:spcBef>
+              <a:buNone/>
+            </a:pPr>
+            <a:r>
+              <a:rPr lang="en-US" sz="1800" dirty="0">
+                <a:latin typeface="NimbusRomNo9L-ReguItal"/>
+              </a:rPr>
+              <a:t>New Performance Model – Time </a:t>
+            </a:r>
+          </a:p>
+          <a:p>
+            <a:pPr marL="0" indent="0">
+              <a:lnSpc>
+                <a:spcPct val="100000"/>
+              </a:lnSpc>
+              <a:spcBef>
+                <a:spcPts val="0"/>
+              </a:spcBef>
+              <a:buNone/>
+            </a:pPr>
+            <a:r>
+              <a:rPr lang="en-US" sz="1800" dirty="0">
+                <a:latin typeface="NimbusRomNo9L-ReguItal"/>
+              </a:rPr>
+              <a:t>between blocks being processed is </a:t>
+            </a:r>
+          </a:p>
+          <a:p>
+            <a:pPr marL="0" indent="0">
+              <a:lnSpc>
+                <a:spcPct val="100000"/>
+              </a:lnSpc>
+              <a:spcBef>
+                <a:spcPts val="0"/>
+              </a:spcBef>
+              <a:buNone/>
+            </a:pPr>
+            <a:r>
+              <a:rPr lang="en-US" sz="1800" dirty="0">
+                <a:latin typeface="NimbusRomNo9L-ReguItal"/>
+              </a:rPr>
+              <a:t>fixed and block size fluctuates </a:t>
+            </a:r>
+          </a:p>
+          <a:p>
+            <a:pPr marL="0" indent="0">
+              <a:lnSpc>
+                <a:spcPct val="100000"/>
+              </a:lnSpc>
+              <a:spcBef>
+                <a:spcPts val="0"/>
+              </a:spcBef>
+              <a:buNone/>
+            </a:pPr>
+            <a:r>
+              <a:rPr lang="en-US" sz="1800" dirty="0">
+                <a:latin typeface="NimbusRomNo9L-ReguItal"/>
+              </a:rPr>
+              <a:t>depending on transactions seen in </a:t>
+            </a:r>
+          </a:p>
+          <a:p>
+            <a:pPr marL="0" indent="0">
+              <a:lnSpc>
+                <a:spcPct val="100000"/>
+              </a:lnSpc>
+              <a:spcBef>
+                <a:spcPts val="0"/>
+              </a:spcBef>
+              <a:buNone/>
+            </a:pPr>
+            <a:r>
+              <a:rPr lang="en-US" sz="1800" dirty="0">
+                <a:latin typeface="NimbusRomNo9L-ReguItal"/>
+              </a:rPr>
+              <a:t>the block window of time.</a:t>
+            </a:r>
+          </a:p>
+          <a:p>
+            <a:pPr marL="0" indent="0">
+              <a:buNone/>
+            </a:pPr>
+            <a:endParaRPr lang="en-US" sz="2000" dirty="0"/>
+          </a:p>
+        </p:txBody>
+      </p:sp>
+      <p:pic>
+        <p:nvPicPr>
+          <p:cNvPr id="5" name="Picture 4">
+            <a:extLst>
+              <a:ext uri="{FF2B5EF4-FFF2-40B4-BE49-F238E27FC236}">
+                <a16:creationId xmlns:a16="http://schemas.microsoft.com/office/drawing/2014/main" id="{C3F0C2EF-B84C-1F7A-61D5-385A0801CB24}"/>
+              </a:ext>
+            </a:extLst>
+          </p:cNvPr>
+          <p:cNvPicPr>
+            <a:picLocks noChangeAspect="1"/>
+          </p:cNvPicPr>
+          <p:nvPr/>
+        </p:nvPicPr>
+        <p:blipFill>
+          <a:blip r:embed="rId4"/>
+          <a:stretch>
+            <a:fillRect/>
+          </a:stretch>
+        </p:blipFill>
+        <p:spPr>
+          <a:xfrm>
+            <a:off x="4663771" y="4612266"/>
+            <a:ext cx="3234923" cy="1201085"/>
+          </a:xfrm>
+          <a:prstGeom prst="rect">
+            <a:avLst/>
+          </a:prstGeom>
+        </p:spPr>
+      </p:pic>
+      <p:pic>
+        <p:nvPicPr>
+          <p:cNvPr id="6" name="Picture 5">
+            <a:extLst>
+              <a:ext uri="{FF2B5EF4-FFF2-40B4-BE49-F238E27FC236}">
+                <a16:creationId xmlns:a16="http://schemas.microsoft.com/office/drawing/2014/main" id="{E538304D-A0C8-BA54-74F2-EAC3E6B4B7CA}"/>
+              </a:ext>
+            </a:extLst>
+          </p:cNvPr>
+          <p:cNvPicPr>
+            <a:picLocks noChangeAspect="1"/>
+          </p:cNvPicPr>
+          <p:nvPr/>
+        </p:nvPicPr>
+        <p:blipFill>
+          <a:blip r:embed="rId5"/>
+          <a:stretch>
+            <a:fillRect/>
+          </a:stretch>
+        </p:blipFill>
+        <p:spPr>
+          <a:xfrm>
+            <a:off x="4663771" y="2075099"/>
+            <a:ext cx="2861408" cy="855036"/>
+          </a:xfrm>
+          <a:prstGeom prst="rect">
+            <a:avLst/>
+          </a:prstGeom>
+        </p:spPr>
+      </p:pic>
+      <p:pic>
+        <p:nvPicPr>
+          <p:cNvPr id="7" name="Picture 6">
+            <a:extLst>
+              <a:ext uri="{FF2B5EF4-FFF2-40B4-BE49-F238E27FC236}">
+                <a16:creationId xmlns:a16="http://schemas.microsoft.com/office/drawing/2014/main" id="{A8F2715F-F564-3BAC-A7A9-B56C6F380672}"/>
+              </a:ext>
+            </a:extLst>
+          </p:cNvPr>
+          <p:cNvPicPr>
+            <a:picLocks noChangeAspect="1"/>
+          </p:cNvPicPr>
+          <p:nvPr/>
+        </p:nvPicPr>
+        <p:blipFill>
+          <a:blip r:embed="rId6"/>
+          <a:stretch>
+            <a:fillRect/>
+          </a:stretch>
+        </p:blipFill>
+        <p:spPr>
+          <a:xfrm>
+            <a:off x="8396969" y="2930135"/>
+            <a:ext cx="2680143" cy="3364263"/>
+          </a:xfrm>
+          <a:prstGeom prst="rect">
+            <a:avLst/>
+          </a:prstGeom>
+        </p:spPr>
+      </p:pic>
+    </p:spTree>
+    <p:extLst>
+      <p:ext uri="{BB962C8B-B14F-4D97-AF65-F5344CB8AC3E}">
+        <p14:creationId xmlns:p14="http://schemas.microsoft.com/office/powerpoint/2010/main" val="4169474114"/>
+      </p:ext>
+    </p:extLst>
+  </p:cSld>
+  <p:clrMapOvr>
+    <a:masterClrMapping/>
+  </p:clrMapOvr>
+</p:sld>
+</file>
+
 <file path=ppt/slides/slide6.xml><?xml version="1.0" encoding="utf-8"?>
 <p:sld xmlns:a="http://schemas.openxmlformats.org/drawingml/2006/main" xmlns:r="http://schemas.openxmlformats.org/officeDocument/2006/relationships" xmlns:p="http://schemas.openxmlformats.org/presentationml/2006/main">
   <p:cSld>
@@ -8352,10 +8404,10 @@
       </p:sp>
       <p:pic>
         <p:nvPicPr>
-          <p:cNvPr id="4" name="Picture 3">
-            <a:extLst>
-              <a:ext uri="{FF2B5EF4-FFF2-40B4-BE49-F238E27FC236}">
-                <a16:creationId xmlns:a16="http://schemas.microsoft.com/office/drawing/2014/main" id="{0968A508-923E-2020-79E7-DE71E6B39CCF}"/>
+          <p:cNvPr id="7" name="Picture 6">
+            <a:extLst>
+              <a:ext uri="{FF2B5EF4-FFF2-40B4-BE49-F238E27FC236}">
+                <a16:creationId xmlns:a16="http://schemas.microsoft.com/office/drawing/2014/main" id="{09BF6C36-7479-939B-FC64-1CB42D5BA39E}"/>
               </a:ext>
             </a:extLst>
           </p:cNvPr>
@@ -8366,36 +8418,6 @@
         </p:nvPicPr>
         <p:blipFill>
           <a:blip r:embed="rId3"/>
-          <a:stretch>
-            <a:fillRect/>
-          </a:stretch>
-        </p:blipFill>
-        <p:spPr>
-          <a:xfrm>
-            <a:off x="5403255" y="942166"/>
-            <a:ext cx="3172268" cy="3982006"/>
-          </a:xfrm>
-          <a:prstGeom prst="rect">
-            <a:avLst/>
-          </a:prstGeom>
-        </p:spPr>
-      </p:pic>
-      <p:pic>
-        <p:nvPicPr>
-          <p:cNvPr id="7" name="Picture 6">
-            <a:extLst>
-              <a:ext uri="{FF2B5EF4-FFF2-40B4-BE49-F238E27FC236}">
-                <a16:creationId xmlns:a16="http://schemas.microsoft.com/office/drawing/2014/main" id="{09BF6C36-7479-939B-FC64-1CB42D5BA39E}"/>
-              </a:ext>
-            </a:extLst>
-          </p:cNvPr>
-          <p:cNvPicPr>
-            <a:picLocks noChangeAspect="1"/>
-          </p:cNvPicPr>
-          <p:nvPr/>
-        </p:nvPicPr>
-        <p:blipFill>
-          <a:blip r:embed="rId4"/>
           <a:stretch>
             <a:fillRect/>
           </a:stretch>
@@ -8425,7 +8447,7 @@
           <p:nvPr/>
         </p:nvPicPr>
         <p:blipFill>
-          <a:blip r:embed="rId5"/>
+          <a:blip r:embed="rId4"/>
           <a:stretch>
             <a:fillRect/>
           </a:stretch>

</xml_diff>

<commit_message>
Added conclusion and references, changed some of the graphics
</commit_message>
<xml_diff>
--- a/Group Presentation.pptx
+++ b/Group Presentation.pptx
@@ -17,11 +17,11 @@
     <p:sldId id="272" r:id="rId8"/>
     <p:sldId id="273" r:id="rId9"/>
     <p:sldId id="274" r:id="rId10"/>
-    <p:sldId id="258" r:id="rId11"/>
-    <p:sldId id="265" r:id="rId12"/>
-    <p:sldId id="266" r:id="rId13"/>
-    <p:sldId id="261" r:id="rId14"/>
-    <p:sldId id="268" r:id="rId15"/>
+    <p:sldId id="265" r:id="rId11"/>
+    <p:sldId id="266" r:id="rId12"/>
+    <p:sldId id="261" r:id="rId13"/>
+    <p:sldId id="268" r:id="rId14"/>
+    <p:sldId id="275" r:id="rId15"/>
   </p:sldIdLst>
   <p:sldSz cx="12192000" cy="6858000"/>
   <p:notesSz cx="6858000" cy="9144000"/>
@@ -610,7 +610,7 @@
           <a:p>
             <a:r>
               <a:rPr lang="en-US" dirty="0"/>
-              <a:t>Abdulla</a:t>
+              <a:t>Abdulla:</a:t>
             </a:r>
           </a:p>
         </p:txBody>
@@ -641,7 +641,7 @@
     </p:spTree>
     <p:extLst>
       <p:ext uri="{BB962C8B-B14F-4D97-AF65-F5344CB8AC3E}">
-        <p14:creationId xmlns:p14="http://schemas.microsoft.com/office/powerpoint/2010/main" val="3806064623"/>
+        <p14:creationId xmlns:p14="http://schemas.microsoft.com/office/powerpoint/2010/main" val="1922970483"/>
       </p:ext>
     </p:extLst>
   </p:cSld>
@@ -697,7 +697,7 @@
           <a:p>
             <a:r>
               <a:rPr lang="en-US" dirty="0"/>
-              <a:t>Abdulla:</a:t>
+              <a:t>Abdulla</a:t>
             </a:r>
           </a:p>
         </p:txBody>
@@ -728,7 +728,7 @@
     </p:spTree>
     <p:extLst>
       <p:ext uri="{BB962C8B-B14F-4D97-AF65-F5344CB8AC3E}">
-        <p14:creationId xmlns:p14="http://schemas.microsoft.com/office/powerpoint/2010/main" val="1922970483"/>
+        <p14:creationId xmlns:p14="http://schemas.microsoft.com/office/powerpoint/2010/main" val="587987722"/>
       </p:ext>
     </p:extLst>
   </p:cSld>
@@ -784,8 +784,42 @@
           <a:p>
             <a:r>
               <a:rPr lang="en-US" dirty="0"/>
-              <a:t>Abdulla</a:t>
-            </a:r>
+              <a:t>Andrew:</a:t>
+            </a:r>
+          </a:p>
+          <a:p>
+            <a:pPr algn="l"/>
+            <a:r>
+              <a:rPr lang="en-US" sz="1800" b="0" i="0" u="none" strike="noStrike" baseline="0" dirty="0">
+                <a:latin typeface="NimbusRomNo9L-Regu"/>
+              </a:rPr>
+              <a:t>In this work we have demonstrated a new framework to theoretically describe proof-of-stake blockchain networks, and have created Python code to simulate efficiency metrics when certain independent variables are varied. This work could be used in the future to optimize the block window of time based on the expected empty transaction time slices (</a:t>
+            </a:r>
+            <a:r>
+              <a:rPr lang="en-US" sz="1800" b="0" i="0" u="none" strike="noStrike" baseline="0" dirty="0">
+                <a:latin typeface="CMMI10"/>
+              </a:rPr>
+              <a:t>j</a:t>
+            </a:r>
+            <a:r>
+              <a:rPr lang="en-US" sz="1800" b="0" i="0" u="none" strike="noStrike" baseline="0" dirty="0">
+                <a:latin typeface="NimbusRomNo9L-Regu"/>
+              </a:rPr>
+              <a:t>) to be seen in the next block window of time </a:t>
+            </a:r>
+            <a:r>
+              <a:rPr lang="en-US" sz="1800" b="0" i="0" u="none" strike="noStrike" baseline="0">
+                <a:latin typeface="NimbusRomNo9L-Regu"/>
+              </a:rPr>
+              <a:t>based off of </a:t>
+            </a:r>
+            <a:r>
+              <a:rPr lang="en-US" sz="1800" b="0" i="0" u="none" strike="noStrike" baseline="0" dirty="0">
+                <a:latin typeface="NimbusRomNo9L-Regu"/>
+              </a:rPr>
+              <a:t>past history and the cyclical nature of transaction activity.</a:t>
+            </a:r>
+            <a:endParaRPr lang="en-US" dirty="0"/>
           </a:p>
         </p:txBody>
       </p:sp>
@@ -815,7 +849,7 @@
     </p:spTree>
     <p:extLst>
       <p:ext uri="{BB962C8B-B14F-4D97-AF65-F5344CB8AC3E}">
-        <p14:creationId xmlns:p14="http://schemas.microsoft.com/office/powerpoint/2010/main" val="587987722"/>
+        <p14:creationId xmlns:p14="http://schemas.microsoft.com/office/powerpoint/2010/main" val="688593522"/>
       </p:ext>
     </p:extLst>
   </p:cSld>
@@ -871,42 +905,8 @@
           <a:p>
             <a:r>
               <a:rPr lang="en-US" dirty="0"/>
-              <a:t>Andrew:</a:t>
-            </a:r>
-          </a:p>
-          <a:p>
-            <a:pPr algn="l"/>
-            <a:r>
-              <a:rPr lang="en-US" sz="1800" b="0" i="0" u="none" strike="noStrike" baseline="0" dirty="0">
-                <a:latin typeface="NimbusRomNo9L-Regu"/>
-              </a:rPr>
-              <a:t>In this work we have demonstrated a new framework to theoretically describe proof-of-stake blockchain networks, and have created Python code to simulate efficiency metrics when certain independent variables are varied. This work could be used in the future to optimize the block window of time based on the expected empty transaction time slices (</a:t>
-            </a:r>
-            <a:r>
-              <a:rPr lang="en-US" sz="1800" b="0" i="0" u="none" strike="noStrike" baseline="0" dirty="0">
-                <a:latin typeface="CMMI10"/>
-              </a:rPr>
-              <a:t>j</a:t>
-            </a:r>
-            <a:r>
-              <a:rPr lang="en-US" sz="1800" b="0" i="0" u="none" strike="noStrike" baseline="0" dirty="0">
-                <a:latin typeface="NimbusRomNo9L-Regu"/>
-              </a:rPr>
-              <a:t>) to be seen in the next block window of time </a:t>
-            </a:r>
-            <a:r>
-              <a:rPr lang="en-US" sz="1800" b="0" i="0" u="none" strike="noStrike" baseline="0">
-                <a:latin typeface="NimbusRomNo9L-Regu"/>
-              </a:rPr>
-              <a:t>based off of </a:t>
-            </a:r>
-            <a:r>
-              <a:rPr lang="en-US" sz="1800" b="0" i="0" u="none" strike="noStrike" baseline="0" dirty="0">
-                <a:latin typeface="NimbusRomNo9L-Regu"/>
-              </a:rPr>
-              <a:t>past history and the cyclical nature of transaction activity.</a:t>
-            </a:r>
-            <a:endParaRPr lang="en-US" dirty="0"/>
+              <a:t>Team</a:t>
+            </a:r>
           </a:p>
         </p:txBody>
       </p:sp>
@@ -928,93 +928,6 @@
             <a:fld id="{CA76F190-DC31-4DF0-961C-5D676364CFAF}" type="slidenum">
               <a:rPr lang="en-US" smtClean="0"/>
               <a:t>13</a:t>
-            </a:fld>
-            <a:endParaRPr lang="en-US"/>
-          </a:p>
-        </p:txBody>
-      </p:sp>
-    </p:spTree>
-    <p:extLst>
-      <p:ext uri="{BB962C8B-B14F-4D97-AF65-F5344CB8AC3E}">
-        <p14:creationId xmlns:p14="http://schemas.microsoft.com/office/powerpoint/2010/main" val="688593522"/>
-      </p:ext>
-    </p:extLst>
-  </p:cSld>
-  <p:clrMapOvr>
-    <a:masterClrMapping/>
-  </p:clrMapOvr>
-</p:notes>
-</file>
-
-<file path=ppt/notesSlides/notesSlide14.xml><?xml version="1.0" encoding="utf-8"?>
-<p:notes xmlns:a="http://schemas.openxmlformats.org/drawingml/2006/main" xmlns:r="http://schemas.openxmlformats.org/officeDocument/2006/relationships" xmlns:p="http://schemas.openxmlformats.org/presentationml/2006/main">
-  <p:cSld>
-    <p:spTree>
-      <p:nvGrpSpPr>
-        <p:cNvPr id="1" name=""/>
-        <p:cNvGrpSpPr/>
-        <p:nvPr/>
-      </p:nvGrpSpPr>
-      <p:grpSpPr>
-        <a:xfrm>
-          <a:off x="0" y="0"/>
-          <a:ext cx="0" cy="0"/>
-          <a:chOff x="0" y="0"/>
-          <a:chExt cx="0" cy="0"/>
-        </a:xfrm>
-      </p:grpSpPr>
-      <p:sp>
-        <p:nvSpPr>
-          <p:cNvPr id="2" name="Slide Image Placeholder 1"/>
-          <p:cNvSpPr>
-            <a:spLocks noGrp="1" noRot="1" noChangeAspect="1"/>
-          </p:cNvSpPr>
-          <p:nvPr>
-            <p:ph type="sldImg"/>
-          </p:nvPr>
-        </p:nvSpPr>
-        <p:spPr/>
-      </p:sp>
-      <p:sp>
-        <p:nvSpPr>
-          <p:cNvPr id="3" name="Notes Placeholder 2"/>
-          <p:cNvSpPr>
-            <a:spLocks noGrp="1"/>
-          </p:cNvSpPr>
-          <p:nvPr>
-            <p:ph type="body" idx="1"/>
-          </p:nvPr>
-        </p:nvSpPr>
-        <p:spPr/>
-        <p:txBody>
-          <a:bodyPr/>
-          <a:lstStyle/>
-          <a:p>
-            <a:r>
-              <a:rPr lang="en-US" dirty="0"/>
-              <a:t>Team</a:t>
-            </a:r>
-          </a:p>
-        </p:txBody>
-      </p:sp>
-      <p:sp>
-        <p:nvSpPr>
-          <p:cNvPr id="4" name="Slide Number Placeholder 3"/>
-          <p:cNvSpPr>
-            <a:spLocks noGrp="1"/>
-          </p:cNvSpPr>
-          <p:nvPr>
-            <p:ph type="sldNum" sz="quarter" idx="5"/>
-          </p:nvPr>
-        </p:nvSpPr>
-        <p:spPr/>
-        <p:txBody>
-          <a:bodyPr/>
-          <a:lstStyle/>
-          <a:p>
-            <a:fld id="{CA76F190-DC31-4DF0-961C-5D676364CFAF}" type="slidenum">
-              <a:rPr lang="en-US" smtClean="0"/>
-              <a:t>14</a:t>
             </a:fld>
             <a:endParaRPr lang="en-US"/>
           </a:p>
@@ -5513,245 +5426,6 @@
       </p:grpSpPr>
       <p:sp useBgFill="1">
         <p:nvSpPr>
-          <p:cNvPr id="3079" name="Rectangle 3078">
-            <a:extLst>
-              <a:ext uri="{FF2B5EF4-FFF2-40B4-BE49-F238E27FC236}">
-                <a16:creationId xmlns:a16="http://schemas.microsoft.com/office/drawing/2014/main" id="{E51BA4DF-2BD4-4EC2-B1DB-B27C8AC71864}"/>
-              </a:ext>
-              <a:ext uri="{C183D7F6-B498-43B3-948B-1728B52AA6E4}">
-                <adec:decorative xmlns:adec="http://schemas.microsoft.com/office/drawing/2017/decorative" val="1"/>
-              </a:ext>
-            </a:extLst>
-          </p:cNvPr>
-          <p:cNvSpPr>
-            <a:spLocks noGrp="1" noRot="1" noChangeAspect="1" noMove="1" noResize="1" noEditPoints="1" noAdjustHandles="1" noChangeArrowheads="1" noChangeShapeType="1" noTextEdit="1"/>
-          </p:cNvSpPr>
-          <p:nvPr>
-            <p:extLst>
-              <p:ext uri="{386F3935-93C4-4BCD-93E2-E3B085C9AB24}">
-                <p16:designElem xmlns:p16="http://schemas.microsoft.com/office/powerpoint/2015/main" val="1"/>
-              </p:ext>
-            </p:extLst>
-          </p:nvPr>
-        </p:nvSpPr>
-        <p:spPr>
-          <a:xfrm>
-            <a:off x="-1" y="0"/>
-            <a:ext cx="12188952" cy="6858000"/>
-          </a:xfrm>
-          <a:prstGeom prst="rect">
-            <a:avLst/>
-          </a:prstGeom>
-          <a:ln>
-            <a:noFill/>
-          </a:ln>
-        </p:spPr>
-        <p:style>
-          <a:lnRef idx="2">
-            <a:schemeClr val="accent1">
-              <a:shade val="50000"/>
-            </a:schemeClr>
-          </a:lnRef>
-          <a:fillRef idx="1">
-            <a:schemeClr val="accent1"/>
-          </a:fillRef>
-          <a:effectRef idx="0">
-            <a:schemeClr val="accent1"/>
-          </a:effectRef>
-          <a:fontRef idx="minor">
-            <a:schemeClr val="lt1"/>
-          </a:fontRef>
-        </p:style>
-        <p:txBody>
-          <a:bodyPr rtlCol="0" anchor="ctr"/>
-          <a:lstStyle/>
-          <a:p>
-            <a:pPr algn="ctr"/>
-            <a:endParaRPr lang="en-US"/>
-          </a:p>
-        </p:txBody>
-      </p:sp>
-      <p:sp>
-        <p:nvSpPr>
-          <p:cNvPr id="2" name="Title 1">
-            <a:extLst>
-              <a:ext uri="{FF2B5EF4-FFF2-40B4-BE49-F238E27FC236}">
-                <a16:creationId xmlns:a16="http://schemas.microsoft.com/office/drawing/2014/main" id="{4C812F6C-7AC4-9905-0E26-302DB45DCF3B}"/>
-              </a:ext>
-            </a:extLst>
-          </p:cNvPr>
-          <p:cNvSpPr>
-            <a:spLocks noGrp="1"/>
-          </p:cNvSpPr>
-          <p:nvPr>
-            <p:ph type="title"/>
-          </p:nvPr>
-        </p:nvSpPr>
-        <p:spPr>
-          <a:xfrm>
-            <a:off x="4553733" y="548464"/>
-            <a:ext cx="6798541" cy="1675623"/>
-          </a:xfrm>
-        </p:spPr>
-        <p:txBody>
-          <a:bodyPr anchor="b">
-            <a:normAutofit/>
-          </a:bodyPr>
-          <a:lstStyle/>
-          <a:p>
-            <a:r>
-              <a:rPr lang="en-US" sz="4000" dirty="0"/>
-              <a:t>Results</a:t>
-            </a:r>
-          </a:p>
-        </p:txBody>
-      </p:sp>
-      <p:pic>
-        <p:nvPicPr>
-          <p:cNvPr id="3074" name="Picture 2" descr="How blockchain can make trade safer - Beyond Borders">
-            <a:extLst>
-              <a:ext uri="{FF2B5EF4-FFF2-40B4-BE49-F238E27FC236}">
-                <a16:creationId xmlns:a16="http://schemas.microsoft.com/office/drawing/2014/main" id="{26AC6485-73B0-9E1C-1A2F-AA1E4CB87F96}"/>
-              </a:ext>
-            </a:extLst>
-          </p:cNvPr>
-          <p:cNvPicPr>
-            <a:picLocks noChangeAspect="1" noChangeArrowheads="1"/>
-          </p:cNvPicPr>
-          <p:nvPr/>
-        </p:nvPicPr>
-        <p:blipFill rotWithShape="1">
-          <a:blip r:embed="rId3">
-            <a:extLst>
-              <a:ext uri="{28A0092B-C50C-407E-A947-70E740481C1C}">
-                <a14:useLocalDpi xmlns:a14="http://schemas.microsoft.com/office/drawing/2010/main" val="0"/>
-              </a:ext>
-            </a:extLst>
-          </a:blip>
-          <a:srcRect l="13937" r="14158" b="1"/>
-          <a:stretch/>
-        </p:blipFill>
-        <p:spPr bwMode="auto">
-          <a:xfrm rot="5400000">
-            <a:off x="-1330751" y="1330752"/>
-            <a:ext cx="6858000" cy="4196496"/>
-          </a:xfrm>
-          <a:prstGeom prst="rect">
-            <a:avLst/>
-          </a:prstGeom>
-          <a:noFill/>
-          <a:effectLst/>
-          <a:extLst>
-            <a:ext uri="{909E8E84-426E-40DD-AFC4-6F175D3DCCD1}">
-              <a14:hiddenFill xmlns:a14="http://schemas.microsoft.com/office/drawing/2010/main">
-                <a:solidFill>
-                  <a:srgbClr val="FFFFFF"/>
-                </a:solidFill>
-              </a14:hiddenFill>
-            </a:ext>
-          </a:extLst>
-        </p:spPr>
-      </p:pic>
-      <p:sp>
-        <p:nvSpPr>
-          <p:cNvPr id="3" name="Content Placeholder 2">
-            <a:extLst>
-              <a:ext uri="{FF2B5EF4-FFF2-40B4-BE49-F238E27FC236}">
-                <a16:creationId xmlns:a16="http://schemas.microsoft.com/office/drawing/2014/main" id="{A3397183-8953-BA1E-3E34-8860C9D92078}"/>
-              </a:ext>
-            </a:extLst>
-          </p:cNvPr>
-          <p:cNvSpPr>
-            <a:spLocks noGrp="1"/>
-          </p:cNvSpPr>
-          <p:nvPr>
-            <p:ph idx="1"/>
-          </p:nvPr>
-        </p:nvSpPr>
-        <p:spPr>
-          <a:xfrm>
-            <a:off x="4553734" y="2409830"/>
-            <a:ext cx="6798539" cy="3705217"/>
-          </a:xfrm>
-        </p:spPr>
-        <p:txBody>
-          <a:bodyPr>
-            <a:normAutofit/>
-          </a:bodyPr>
-          <a:lstStyle/>
-          <a:p>
-            <a:pPr marL="0" indent="0">
-              <a:buNone/>
-            </a:pPr>
-            <a:r>
-              <a:rPr lang="en-US" sz="1800" b="0" i="0" u="none" strike="noStrike" baseline="0" dirty="0">
-                <a:latin typeface="NimbusRomNo9L-ReguItal"/>
-              </a:rPr>
-              <a:t>Python code generated plots available on GitHub:</a:t>
-            </a:r>
-          </a:p>
-          <a:p>
-            <a:pPr marL="0" indent="0">
-              <a:buNone/>
-            </a:pPr>
-            <a:r>
-              <a:rPr lang="en-US" sz="2000" dirty="0">
-                <a:hlinkClick r:id="rId4"/>
-              </a:rPr>
-              <a:t>https://github.com/andrewqsmith/Block-Size-Optimization-for-VBASBS-Queueing-Model-for-Blockchain/tree/main/GraphCode</a:t>
-            </a:r>
-            <a:endParaRPr lang="en-US" sz="1800" dirty="0">
-              <a:latin typeface="NimbusRomNo9L-ReguItal"/>
-            </a:endParaRPr>
-          </a:p>
-          <a:p>
-            <a:pPr marL="0" indent="0">
-              <a:buNone/>
-            </a:pPr>
-            <a:endParaRPr lang="en-US" sz="2000" dirty="0"/>
-          </a:p>
-        </p:txBody>
-      </p:sp>
-    </p:spTree>
-    <p:extLst>
-      <p:ext uri="{BB962C8B-B14F-4D97-AF65-F5344CB8AC3E}">
-        <p14:creationId xmlns:p14="http://schemas.microsoft.com/office/powerpoint/2010/main" val="2145009233"/>
-      </p:ext>
-    </p:extLst>
-  </p:cSld>
-  <p:clrMapOvr>
-    <a:masterClrMapping/>
-  </p:clrMapOvr>
-</p:sld>
-</file>
-
-<file path=ppt/slides/slide11.xml><?xml version="1.0" encoding="utf-8"?>
-<p:sld xmlns:a="http://schemas.openxmlformats.org/drawingml/2006/main" xmlns:r="http://schemas.openxmlformats.org/officeDocument/2006/relationships" xmlns:p="http://schemas.openxmlformats.org/presentationml/2006/main">
-  <p:cSld>
-    <p:bg>
-      <p:bgPr>
-        <a:solidFill>
-          <a:schemeClr val="bg1"/>
-        </a:solidFill>
-        <a:effectLst/>
-      </p:bgPr>
-    </p:bg>
-    <p:spTree>
-      <p:nvGrpSpPr>
-        <p:cNvPr id="1" name=""/>
-        <p:cNvGrpSpPr/>
-        <p:nvPr/>
-      </p:nvGrpSpPr>
-      <p:grpSpPr>
-        <a:xfrm>
-          <a:off x="0" y="0"/>
-          <a:ext cx="0" cy="0"/>
-          <a:chOff x="0" y="0"/>
-          <a:chExt cx="0" cy="0"/>
-        </a:xfrm>
-      </p:grpSpPr>
-      <p:sp useBgFill="1">
-        <p:nvSpPr>
           <p:cNvPr id="10" name="Rectangle 9">
             <a:extLst>
               <a:ext uri="{FF2B5EF4-FFF2-40B4-BE49-F238E27FC236}">
@@ -6497,7 +6171,7 @@
 </p:sld>
 </file>
 
-<file path=ppt/slides/slide12.xml><?xml version="1.0" encoding="utf-8"?>
+<file path=ppt/slides/slide11.xml><?xml version="1.0" encoding="utf-8"?>
 <p:sld xmlns:a="http://schemas.openxmlformats.org/drawingml/2006/main" xmlns:r="http://schemas.openxmlformats.org/officeDocument/2006/relationships" xmlns:p="http://schemas.openxmlformats.org/presentationml/2006/main">
   <p:cSld>
     <p:bg>
@@ -7269,7 +6943,7 @@
 </p:sld>
 </file>
 
-<file path=ppt/slides/slide13.xml><?xml version="1.0" encoding="utf-8"?>
+<file path=ppt/slides/slide12.xml><?xml version="1.0" encoding="utf-8"?>
 <p:sld xmlns:a="http://schemas.openxmlformats.org/drawingml/2006/main" xmlns:r="http://schemas.openxmlformats.org/officeDocument/2006/relationships" xmlns:p="http://schemas.openxmlformats.org/presentationml/2006/main">
   <p:cSld>
     <p:bg>
@@ -7514,7 +7188,7 @@
           <a:lstStyle/>
           <a:p>
             <a:r>
-              <a:rPr lang="en-US" sz="4000"/>
+              <a:rPr lang="en-US" sz="4000" dirty="0"/>
               <a:t>Conclusion</a:t>
             </a:r>
           </a:p>
@@ -7544,11 +7218,37 @@
         </p:spPr>
         <p:txBody>
           <a:bodyPr>
-            <a:normAutofit/>
+            <a:normAutofit lnSpcReduction="10000"/>
           </a:bodyPr>
           <a:lstStyle/>
           <a:p>
-            <a:endParaRPr lang="en-US" sz="2000"/>
+            <a:r>
+              <a:rPr lang="en-US" sz="2000" dirty="0"/>
+              <a:t>This model proposes a blockchain system utilizing a deadline system based on Proof of Stake</a:t>
+            </a:r>
+          </a:p>
+          <a:p>
+            <a:r>
+              <a:rPr lang="en-US" sz="2000" dirty="0"/>
+              <a:t>Discrete time steps allow probabilities for the state space to be calculated for variable </a:t>
+            </a:r>
+            <a:r>
+              <a:rPr lang="en-US" sz="2000" dirty="0" err="1"/>
+              <a:t>blocksizes</a:t>
+            </a:r>
+            <a:endParaRPr lang="en-US" sz="2000" dirty="0"/>
+          </a:p>
+          <a:p>
+            <a:r>
+              <a:rPr lang="en-US" sz="2000" dirty="0"/>
+              <a:t>Results of increasing the time window for building blocks produced mostly intuitive results</a:t>
+            </a:r>
+          </a:p>
+          <a:p>
+            <a:r>
+              <a:rPr lang="en-US" sz="2000" dirty="0"/>
+              <a:t>Potential for optimization of time window</a:t>
+            </a:r>
           </a:p>
         </p:txBody>
       </p:sp>
@@ -7565,7 +7265,7 @@
 </p:sld>
 </file>
 
-<file path=ppt/slides/slide14.xml><?xml version="1.0" encoding="utf-8"?>
+<file path=ppt/slides/slide13.xml><?xml version="1.0" encoding="utf-8"?>
 <p:sld xmlns:a="http://schemas.openxmlformats.org/drawingml/2006/main" xmlns:r="http://schemas.openxmlformats.org/officeDocument/2006/relationships" xmlns:p="http://schemas.openxmlformats.org/presentationml/2006/main">
   <p:cSld>
     <p:bg>
@@ -7815,39 +7515,6 @@
       </p:sp>
       <p:sp>
         <p:nvSpPr>
-          <p:cNvPr id="5" name="Subtitle 4">
-            <a:extLst>
-              <a:ext uri="{FF2B5EF4-FFF2-40B4-BE49-F238E27FC236}">
-                <a16:creationId xmlns:a16="http://schemas.microsoft.com/office/drawing/2014/main" id="{B5BDDB39-EE86-78C8-84DE-B3D0D7F8F340}"/>
-              </a:ext>
-            </a:extLst>
-          </p:cNvPr>
-          <p:cNvSpPr>
-            <a:spLocks noGrp="1"/>
-          </p:cNvSpPr>
-          <p:nvPr>
-            <p:ph type="subTitle" idx="1"/>
-          </p:nvPr>
-        </p:nvSpPr>
-        <p:spPr>
-          <a:xfrm>
-            <a:off x="477980" y="4872922"/>
-            <a:ext cx="4023359" cy="1208141"/>
-          </a:xfrm>
-        </p:spPr>
-        <p:txBody>
-          <a:bodyPr>
-            <a:normAutofit/>
-          </a:bodyPr>
-          <a:lstStyle/>
-          <a:p>
-            <a:pPr algn="l"/>
-            <a:endParaRPr lang="en-US" sz="2000"/>
-          </a:p>
-        </p:txBody>
-      </p:sp>
-      <p:sp>
-        <p:nvSpPr>
           <p:cNvPr id="1048" name="Rectangle 1047">
             <a:extLst>
               <a:ext uri="{FF2B5EF4-FFF2-40B4-BE49-F238E27FC236}">
@@ -8016,6 +7683,324 @@
   </p:cSld>
   <p:clrMapOvr>
     <a:overrideClrMapping bg1="dk1" tx1="lt1" bg2="dk2" tx2="lt2" accent1="accent1" accent2="accent2" accent3="accent3" accent4="accent4" accent5="accent5" accent6="accent6" hlink="hlink" folHlink="folHlink"/>
+  </p:clrMapOvr>
+</p:sld>
+</file>
+
+<file path=ppt/slides/slide14.xml><?xml version="1.0" encoding="utf-8"?>
+<p:sld xmlns:a="http://schemas.openxmlformats.org/drawingml/2006/main" xmlns:r="http://schemas.openxmlformats.org/officeDocument/2006/relationships" xmlns:p="http://schemas.openxmlformats.org/presentationml/2006/main">
+  <p:cSld>
+    <p:spTree>
+      <p:nvGrpSpPr>
+        <p:cNvPr id="1" name=""/>
+        <p:cNvGrpSpPr/>
+        <p:nvPr/>
+      </p:nvGrpSpPr>
+      <p:grpSpPr>
+        <a:xfrm>
+          <a:off x="0" y="0"/>
+          <a:ext cx="0" cy="0"/>
+          <a:chOff x="0" y="0"/>
+          <a:chExt cx="0" cy="0"/>
+        </a:xfrm>
+      </p:grpSpPr>
+      <p:sp>
+        <p:nvSpPr>
+          <p:cNvPr id="5" name="TextBox 4">
+            <a:extLst>
+              <a:ext uri="{FF2B5EF4-FFF2-40B4-BE49-F238E27FC236}">
+                <a16:creationId xmlns:a16="http://schemas.microsoft.com/office/drawing/2014/main" id="{CE40D22D-B7F8-B7D4-2BFA-7327B99A6564}"/>
+              </a:ext>
+            </a:extLst>
+          </p:cNvPr>
+          <p:cNvSpPr txBox="1"/>
+          <p:nvPr/>
+        </p:nvSpPr>
+        <p:spPr>
+          <a:xfrm>
+            <a:off x="167640" y="2032000"/>
+            <a:ext cx="11582400" cy="3323987"/>
+          </a:xfrm>
+          <a:prstGeom prst="rect">
+            <a:avLst/>
+          </a:prstGeom>
+          <a:noFill/>
+        </p:spPr>
+        <p:txBody>
+          <a:bodyPr wrap="square">
+            <a:spAutoFit/>
+          </a:bodyPr>
+          <a:lstStyle/>
+          <a:p>
+            <a:r>
+              <a:rPr lang="en-US" sz="1000" dirty="0"/>
+              <a:t>[1] X. Fu, R. Yu, J. Wang, Q. Qi, and J. Liao, “Performance optimization</a:t>
+            </a:r>
+          </a:p>
+          <a:p>
+            <a:r>
+              <a:rPr lang="en-US" sz="1000" dirty="0"/>
+              <a:t>for blockchain-enabled distributed network function virtualization </a:t>
+            </a:r>
+            <a:r>
+              <a:rPr lang="en-US" sz="1000" dirty="0" err="1"/>
+              <a:t>management</a:t>
+            </a:r>
+            <a:r>
+              <a:rPr lang="en-US" sz="1000" dirty="0"/>
+              <a:t> and orchestration,” IEEE Transactions on Vehicular Technology, 2020.</a:t>
+            </a:r>
+          </a:p>
+          <a:p>
+            <a:endParaRPr lang="en-US" sz="1000" dirty="0"/>
+          </a:p>
+          <a:p>
+            <a:r>
+              <a:rPr lang="en-US" sz="1000" dirty="0"/>
+              <a:t>[2] J. </a:t>
+            </a:r>
+            <a:r>
+              <a:rPr lang="en-US" sz="1000" dirty="0" err="1"/>
+              <a:t>Gobel</a:t>
+            </a:r>
+            <a:r>
+              <a:rPr lang="en-US" sz="1000" dirty="0"/>
+              <a:t> and A. E. </a:t>
+            </a:r>
+            <a:r>
+              <a:rPr lang="en-US" sz="1000" dirty="0" err="1"/>
+              <a:t>Krzesinski</a:t>
+            </a:r>
+            <a:r>
+              <a:rPr lang="en-US" sz="1000" dirty="0"/>
+              <a:t>, “Increased block size and bitcoin “blockchain dynamics,” in 2017 27th International Telecommunication Networks and Applications Conference (ITNAC). IEEE, 2017, pp. 1–6.</a:t>
+            </a:r>
+          </a:p>
+          <a:p>
+            <a:endParaRPr lang="en-US" sz="1000" dirty="0"/>
+          </a:p>
+          <a:p>
+            <a:r>
+              <a:rPr lang="en-US" sz="1000" dirty="0"/>
+              <a:t>[3] D. </a:t>
+            </a:r>
+            <a:r>
+              <a:rPr lang="en-US" sz="1000" dirty="0" err="1"/>
+              <a:t>Mechkaroska</a:t>
+            </a:r>
+            <a:r>
+              <a:rPr lang="en-US" sz="1000" dirty="0"/>
+              <a:t>, V. Dimitrova, and A. </a:t>
+            </a:r>
+            <a:r>
+              <a:rPr lang="en-US" sz="1000" dirty="0" err="1"/>
+              <a:t>Popovska-Mitrovikj</a:t>
+            </a:r>
+            <a:r>
+              <a:rPr lang="en-US" sz="1000" dirty="0"/>
+              <a:t>, “Analysis of the possibilities for improvement of blockchain technology,” in 2018 26</a:t>
+            </a:r>
+            <a:r>
+              <a:rPr lang="en-US" sz="1000" baseline="30000" dirty="0"/>
+              <a:t>th</a:t>
+            </a:r>
+            <a:r>
+              <a:rPr lang="en-US" sz="1000" dirty="0"/>
+              <a:t> Telecommunications Forum (TELFOR). IEEE, 2018, pp. 1–4.</a:t>
+            </a:r>
+          </a:p>
+          <a:p>
+            <a:endParaRPr lang="en-US" sz="1000" dirty="0"/>
+          </a:p>
+          <a:p>
+            <a:r>
+              <a:rPr lang="en-US" sz="1000" dirty="0"/>
+              <a:t>[4] S. Nakamoto, “Bitcoin: A peer-to-peer electronic cash system,” Bitcoin White Paper, 2008. [Online]. Available: https://bitcoin.org/bitcoin.pdf</a:t>
+            </a:r>
+          </a:p>
+          <a:p>
+            <a:endParaRPr lang="en-US" sz="1000" dirty="0"/>
+          </a:p>
+          <a:p>
+            <a:r>
+              <a:rPr lang="en-US" sz="1000" dirty="0"/>
+              <a:t>[5] L. </a:t>
+            </a:r>
+            <a:r>
+              <a:rPr lang="en-US" sz="1000" dirty="0" err="1"/>
+              <a:t>Pennella</a:t>
+            </a:r>
+            <a:r>
+              <a:rPr lang="en-US" sz="1000" dirty="0"/>
+              <a:t>. Proof-of-stake (pos). https://ethereum.org/en/developers/docs/consensus-mechanisms/pos/. Accessed:04-11-2023, Last Edit: Luca </a:t>
+            </a:r>
+            <a:r>
+              <a:rPr lang="en-US" sz="1000" dirty="0" err="1"/>
+              <a:t>Pennella</a:t>
+            </a:r>
+            <a:r>
+              <a:rPr lang="en-US" sz="1000" dirty="0"/>
+              <a:t> on 04-07-2023.</a:t>
+            </a:r>
+          </a:p>
+          <a:p>
+            <a:endParaRPr lang="en-US" sz="1000" dirty="0"/>
+          </a:p>
+          <a:p>
+            <a:r>
+              <a:rPr lang="en-US" sz="1000" dirty="0"/>
+              <a:t>[6] M. Platt, J. </a:t>
+            </a:r>
+            <a:r>
+              <a:rPr lang="en-US" sz="1000" dirty="0" err="1"/>
+              <a:t>Sedlmeir</a:t>
+            </a:r>
+            <a:r>
+              <a:rPr lang="en-US" sz="1000" dirty="0"/>
+              <a:t>, D. Platt, J. Xu, P. </a:t>
+            </a:r>
+            <a:r>
+              <a:rPr lang="en-US" sz="1000" dirty="0" err="1"/>
+              <a:t>Tasca</a:t>
+            </a:r>
+            <a:r>
+              <a:rPr lang="en-US" sz="1000" dirty="0"/>
+              <a:t>, N. </a:t>
+            </a:r>
+            <a:r>
+              <a:rPr lang="en-US" sz="1000" dirty="0" err="1"/>
+              <a:t>Vadgama</a:t>
+            </a:r>
+            <a:r>
+              <a:rPr lang="en-US" sz="1000" dirty="0"/>
+              <a:t>, and J. I. Ibanez, “The energy footprint of blockchain consensus mechanisms beyond proof-of-work,” in 2021 IEEE 21st International Conference on</a:t>
+            </a:r>
+          </a:p>
+          <a:p>
+            <a:r>
+              <a:rPr lang="en-US" sz="1000" dirty="0"/>
+              <a:t>Software Quality, Reliability and Security Companion (QRS-C). IEEE, 2021, pp. 1135–1144.</a:t>
+            </a:r>
+          </a:p>
+          <a:p>
+            <a:endParaRPr lang="en-US" sz="1000" dirty="0"/>
+          </a:p>
+          <a:p>
+            <a:r>
+              <a:rPr lang="en-US" sz="1000" dirty="0"/>
+              <a:t>[7] J. Seol, A. Kancharla, Z. </a:t>
+            </a:r>
+            <a:r>
+              <a:rPr lang="en-US" sz="1000" dirty="0" err="1"/>
+              <a:t>Ke</a:t>
+            </a:r>
+            <a:r>
+              <a:rPr lang="en-US" sz="1000" dirty="0"/>
+              <a:t>, H. Kim, and N. Park, “A variable bulk arrival and static bulk service queueing model for blockchain,” in Proceedings of the 2nd ACM International Symposium on Blockchain and Secure Critical</a:t>
+            </a:r>
+          </a:p>
+          <a:p>
+            <a:r>
+              <a:rPr lang="en-US" sz="1000" dirty="0"/>
+              <a:t>Infrastructure, 2020, pp. 63–72.</a:t>
+            </a:r>
+          </a:p>
+          <a:p>
+            <a:endParaRPr lang="en-US" sz="1000" dirty="0"/>
+          </a:p>
+          <a:p>
+            <a:r>
+              <a:rPr lang="en-US" sz="1000" dirty="0"/>
+              <a:t>[8] Z. Team et al., “The </a:t>
+            </a:r>
+            <a:r>
+              <a:rPr lang="en-US" sz="1000" dirty="0" err="1"/>
+              <a:t>zilliqa</a:t>
+            </a:r>
+            <a:r>
+              <a:rPr lang="en-US" sz="1000" dirty="0"/>
+              <a:t> technical whitepaper,” </a:t>
+            </a:r>
+            <a:r>
+              <a:rPr lang="en-US" sz="1000" dirty="0" err="1"/>
+              <a:t>Zilliqa</a:t>
+            </a:r>
+            <a:r>
+              <a:rPr lang="en-US" sz="1000" dirty="0"/>
+              <a:t> Whitepaper, 2017.</a:t>
+            </a:r>
+          </a:p>
+          <a:p>
+            <a:endParaRPr lang="en-US" sz="1000" dirty="0"/>
+          </a:p>
+          <a:p>
+            <a:r>
+              <a:rPr lang="en-US" sz="1000" dirty="0"/>
+              <a:t>[9] P. Thakkar, S. Nathan, and B. Viswanathan, “Performance benchmarking and optimizing </a:t>
+            </a:r>
+            <a:r>
+              <a:rPr lang="en-US" sz="1000" dirty="0" err="1"/>
+              <a:t>hyperledger</a:t>
+            </a:r>
+            <a:r>
+              <a:rPr lang="en-US" sz="1000" dirty="0"/>
+              <a:t> fabric blockchain platform,” in 2018 IEEE 26th International Symposium on Modeling, Analysis, and Simulation of Computer and Telecommunication Systems (MASCOTS). IEEE, 2018, pp. 264–276.</a:t>
+            </a:r>
+          </a:p>
+        </p:txBody>
+      </p:sp>
+      <p:sp>
+        <p:nvSpPr>
+          <p:cNvPr id="7" name="TextBox 6">
+            <a:extLst>
+              <a:ext uri="{FF2B5EF4-FFF2-40B4-BE49-F238E27FC236}">
+                <a16:creationId xmlns:a16="http://schemas.microsoft.com/office/drawing/2014/main" id="{7311B3F4-138D-2789-EEE9-F3CAEDDDCA1E}"/>
+              </a:ext>
+            </a:extLst>
+          </p:cNvPr>
+          <p:cNvSpPr txBox="1"/>
+          <p:nvPr/>
+        </p:nvSpPr>
+        <p:spPr>
+          <a:xfrm>
+            <a:off x="167640" y="1114028"/>
+            <a:ext cx="6096000" cy="707886"/>
+          </a:xfrm>
+          <a:prstGeom prst="rect">
+            <a:avLst/>
+          </a:prstGeom>
+          <a:noFill/>
+        </p:spPr>
+        <p:txBody>
+          <a:bodyPr wrap="square">
+            <a:spAutoFit/>
+          </a:bodyPr>
+          <a:lstStyle/>
+          <a:p>
+            <a:r>
+              <a:rPr lang="en-US" sz="4000" kern="1200" dirty="0">
+                <a:solidFill>
+                  <a:schemeClr val="tx1"/>
+                </a:solidFill>
+                <a:latin typeface="+mj-lt"/>
+                <a:ea typeface="+mj-ea"/>
+                <a:cs typeface="+mj-cs"/>
+              </a:rPr>
+              <a:t>References</a:t>
+            </a:r>
+            <a:endParaRPr lang="en-US" sz="4000" dirty="0"/>
+          </a:p>
+        </p:txBody>
+      </p:sp>
+    </p:spTree>
+    <p:extLst>
+      <p:ext uri="{BB962C8B-B14F-4D97-AF65-F5344CB8AC3E}">
+        <p14:creationId xmlns:p14="http://schemas.microsoft.com/office/powerpoint/2010/main" val="756704086"/>
+      </p:ext>
+    </p:extLst>
+  </p:cSld>
+  <p:clrMapOvr>
+    <a:masterClrMapping/>
   </p:clrMapOvr>
 </p:sld>
 </file>
@@ -8779,7 +8764,15 @@
                 </a:solidFill>
                 <a:effectLst/>
               </a:rPr>
-              <a:t>This paper focuses on exploring the ramifications of the new consensus algorithm in a theoretical context. </a:t>
+              <a:t>This paper focuses on exploring the ramifications of the new consensus algorithm in a theoretical context</a:t>
+            </a:r>
+            <a:r>
+              <a:rPr lang="en-US" sz="2000" dirty="0">
+                <a:solidFill>
+                  <a:srgbClr val="374151"/>
+                </a:solidFill>
+              </a:rPr>
+              <a:t>, using the VBASBS model proposed by Seol, et al. as a basis [7].</a:t>
             </a:r>
             <a:endParaRPr lang="en-US" sz="2000" dirty="0"/>
           </a:p>
@@ -9253,7 +9246,7 @@
           <a:lstStyle/>
           <a:p>
             <a:r>
-              <a:rPr lang="en-US" sz="4800" kern="1200">
+              <a:rPr lang="en-US" sz="4800" kern="1200" dirty="0">
                 <a:solidFill>
                   <a:schemeClr val="tx1"/>
                 </a:solidFill>
@@ -9522,52 +9515,6 @@
           </a:p>
         </p:txBody>
       </p:sp>
-      <p:pic>
-        <p:nvPicPr>
-          <p:cNvPr id="3074" name="Picture 2" descr="How blockchain can make trade safer - Beyond Borders">
-            <a:extLst>
-              <a:ext uri="{FF2B5EF4-FFF2-40B4-BE49-F238E27FC236}">
-                <a16:creationId xmlns:a16="http://schemas.microsoft.com/office/drawing/2014/main" id="{26AC6485-73B0-9E1C-1A2F-AA1E4CB87F96}"/>
-              </a:ext>
-            </a:extLst>
-          </p:cNvPr>
-          <p:cNvPicPr>
-            <a:picLocks noChangeAspect="1" noChangeArrowheads="1"/>
-          </p:cNvPicPr>
-          <p:nvPr/>
-        </p:nvPicPr>
-        <p:blipFill rotWithShape="1">
-          <a:blip r:embed="rId3">
-            <a:extLst>
-              <a:ext uri="{28A0092B-C50C-407E-A947-70E740481C1C}">
-                <a14:useLocalDpi xmlns:a14="http://schemas.microsoft.com/office/drawing/2010/main" val="0"/>
-              </a:ext>
-            </a:extLst>
-          </a:blip>
-          <a:srcRect l="13937" r="14158" b="1"/>
-          <a:stretch/>
-        </p:blipFill>
-        <p:spPr bwMode="auto">
-          <a:xfrm rot="5400000">
-            <a:off x="-1330751" y="1330752"/>
-            <a:ext cx="6858000" cy="4196496"/>
-          </a:xfrm>
-          <a:prstGeom prst="rect">
-            <a:avLst/>
-          </a:prstGeom>
-          <a:noFill/>
-          <a:effectLst/>
-          <a:extLst>
-            <a:ext uri="{909E8E84-426E-40DD-AFC4-6F175D3DCCD1}">
-              <a14:hiddenFill xmlns:a14="http://schemas.microsoft.com/office/drawing/2010/main">
-                <a:solidFill>
-                  <a:srgbClr val="FFFFFF"/>
-                </a:solidFill>
-              </a14:hiddenFill>
-            </a:ext>
-          </a:extLst>
-        </p:spPr>
-      </p:pic>
       <p:sp>
         <p:nvSpPr>
           <p:cNvPr id="3" name="Content Placeholder 2">
@@ -9603,7 +9550,19 @@
               <a:rPr lang="en-US" sz="1800" b="0" i="0" u="none" strike="noStrike" baseline="0" dirty="0">
                 <a:latin typeface="NimbusRomNo9L-ReguItal"/>
               </a:rPr>
-              <a:t>Original Performance Model – block size is fixed and block is processed when all of the transaction slots in the block have been filled</a:t>
+              <a:t>Original Performance Model – </a:t>
+            </a:r>
+            <a:r>
+              <a:rPr lang="en-US" sz="1800" b="0" i="0" u="none" strike="noStrike" baseline="0">
+                <a:latin typeface="NimbusRomNo9L-ReguItal"/>
+              </a:rPr>
+              <a:t>Blocksize</a:t>
+            </a:r>
+            <a:r>
+              <a:rPr lang="en-US" sz="1800" b="0" i="0" u="none" strike="noStrike" baseline="0" dirty="0">
+                <a:latin typeface="NimbusRomNo9L-ReguItal"/>
+              </a:rPr>
+              <a:t> is fixed and block is processed when all of the transaction slots in the block have been filled. [7]</a:t>
             </a:r>
           </a:p>
           <a:p>
@@ -9738,7 +9697,7 @@
           <p:nvPr/>
         </p:nvPicPr>
         <p:blipFill>
-          <a:blip r:embed="rId4"/>
+          <a:blip r:embed="rId3"/>
           <a:stretch>
             <a:fillRect/>
           </a:stretch>
@@ -9768,7 +9727,7 @@
           <p:nvPr/>
         </p:nvPicPr>
         <p:blipFill>
-          <a:blip r:embed="rId5"/>
+          <a:blip r:embed="rId4"/>
           <a:stretch>
             <a:fillRect/>
           </a:stretch>
@@ -9798,7 +9757,7 @@
           <p:nvPr/>
         </p:nvPicPr>
         <p:blipFill>
-          <a:blip r:embed="rId6"/>
+          <a:blip r:embed="rId5"/>
           <a:stretch>
             <a:fillRect/>
           </a:stretch>
@@ -9807,6 +9766,41 @@
           <a:xfrm>
             <a:off x="8396969" y="2930135"/>
             <a:ext cx="2680143" cy="3364263"/>
+          </a:xfrm>
+          <a:prstGeom prst="rect">
+            <a:avLst/>
+          </a:prstGeom>
+        </p:spPr>
+      </p:pic>
+      <p:pic>
+        <p:nvPicPr>
+          <p:cNvPr id="8" name="Picture 7" descr="Technological background">
+            <a:extLst>
+              <a:ext uri="{FF2B5EF4-FFF2-40B4-BE49-F238E27FC236}">
+                <a16:creationId xmlns:a16="http://schemas.microsoft.com/office/drawing/2014/main" id="{F70A05C7-91DB-31C0-D7EF-527370F03F4D}"/>
+              </a:ext>
+            </a:extLst>
+          </p:cNvPr>
+          <p:cNvPicPr>
+            <a:picLocks noChangeAspect="1"/>
+          </p:cNvPicPr>
+          <p:nvPr/>
+        </p:nvPicPr>
+        <p:blipFill rotWithShape="1">
+          <a:blip r:embed="rId6">
+            <a:extLst>
+              <a:ext uri="{28A0092B-C50C-407E-A947-70E740481C1C}">
+                <a14:useLocalDpi xmlns:a14="http://schemas.microsoft.com/office/drawing/2010/main" val="0"/>
+              </a:ext>
+            </a:extLst>
+          </a:blip>
+          <a:srcRect r="57349"/>
+          <a:stretch/>
+        </p:blipFill>
+        <p:spPr>
+          <a:xfrm>
+            <a:off x="0" y="0"/>
+            <a:ext cx="4388610" cy="6858000"/>
           </a:xfrm>
           <a:prstGeom prst="rect">
             <a:avLst/>
@@ -12359,8 +12353,8 @@
           </a:prstGeom>
         </p:spPr>
       </p:pic>
-      <mc:AlternateContent xmlns:mc="http://schemas.openxmlformats.org/markup-compatibility/2006">
-        <mc:Choice xmlns:a14="http://schemas.microsoft.com/office/drawing/2010/main" Requires="a14">
+      <mc:AlternateContent xmlns:mc="http://schemas.openxmlformats.org/markup-compatibility/2006" xmlns:a14="http://schemas.microsoft.com/office/drawing/2010/main">
+        <mc:Choice Requires="a14">
           <p:sp>
             <p:nvSpPr>
               <p:cNvPr id="3" name="TextBox 2">
@@ -12582,7 +12576,7 @@
             </p:txBody>
           </p:sp>
         </mc:Choice>
-        <mc:Fallback>
+        <mc:Fallback xmlns="">
           <p:sp>
             <p:nvSpPr>
               <p:cNvPr id="3" name="TextBox 2">
@@ -12662,8 +12656,8 @@
           </a:p>
         </p:txBody>
       </p:sp>
-      <mc:AlternateContent xmlns:mc="http://schemas.openxmlformats.org/markup-compatibility/2006">
-        <mc:Choice xmlns:a14="http://schemas.microsoft.com/office/drawing/2010/main" Requires="a14">
+      <mc:AlternateContent xmlns:mc="http://schemas.openxmlformats.org/markup-compatibility/2006" xmlns:a14="http://schemas.microsoft.com/office/drawing/2010/main">
+        <mc:Choice Requires="a14">
           <p:sp>
             <p:nvSpPr>
               <p:cNvPr id="5" name="TextBox 4">
@@ -12853,7 +12847,7 @@
             </p:txBody>
           </p:sp>
         </mc:Choice>
-        <mc:Fallback>
+        <mc:Fallback xmlns="">
           <p:sp>
             <p:nvSpPr>
               <p:cNvPr id="5" name="TextBox 4">

</xml_diff>

<commit_message>
Fixed captions in the review section
</commit_message>
<xml_diff>
--- a/Group Presentation.pptx
+++ b/Group Presentation.pptx
@@ -4991,7 +4991,7 @@
         </p:blipFill>
         <p:spPr bwMode="auto">
           <a:xfrm>
-            <a:off x="3523488" y="-195933"/>
+            <a:off x="3523488" y="715"/>
             <a:ext cx="8668512" cy="6857990"/>
           </a:xfrm>
           <a:prstGeom prst="rect">
@@ -6135,7 +6135,7 @@
         <p:spPr>
           <a:xfrm>
             <a:off x="5437028" y="4038558"/>
-            <a:ext cx="3035903" cy="1754326"/>
+            <a:ext cx="3035903" cy="2031325"/>
           </a:xfrm>
           <a:prstGeom prst="rect">
             <a:avLst/>
@@ -6152,7 +6152,7 @@
               <a:rPr lang="en-US" dirty="0">
                 <a:effectLst/>
               </a:rPr>
-              <a:t>Varying time taken to post and purge the block in the network with constant block window time (T) and number of time slices (t) to examine changes in throughput</a:t>
+              <a:t>Varying time taken to post and purge the block in the network (Omega) with constant block window time (T) and number of time slices (t) to examine changes in average filled slots</a:t>
             </a:r>
             <a:endParaRPr lang="en-US" dirty="0"/>
           </a:p>
@@ -6907,7 +6907,7 @@
         <p:spPr>
           <a:xfrm>
             <a:off x="5451499" y="3860024"/>
-            <a:ext cx="2988964" cy="2031325"/>
+            <a:ext cx="2988964" cy="1754326"/>
           </a:xfrm>
           <a:prstGeom prst="rect">
             <a:avLst/>
@@ -6924,7 +6924,7 @@
               <a:rPr lang="en-US" dirty="0">
                 <a:effectLst/>
               </a:rPr>
-              <a:t>Varying time taken to post and purge the block in the network (Omega) with constant block window time (T) and number of time slices (t) to examine changes in average filled slots</a:t>
+              <a:t>Varying time taken to post and purge the block in the network with constant block window time (T) and number of time slices (t) to examine changes in throughput</a:t>
             </a:r>
             <a:endParaRPr lang="en-US" dirty="0"/>
           </a:p>

</xml_diff>